<commit_message>
Update no PowerPoint Final
</commit_message>
<xml_diff>
--- a/documentacao/Apresentações/Sprint 3.pptx
+++ b/documentacao/Apresentações/Sprint 3.pptx
@@ -5,28 +5,27 @@
     <p:sldMasterId id="2147483672" r:id="rId1"/>
   </p:sldMasterIdLst>
   <p:notesMasterIdLst>
-    <p:notesMasterId r:id="rId21"/>
+    <p:notesMasterId r:id="rId20"/>
   </p:notesMasterIdLst>
   <p:sldIdLst>
     <p:sldId id="270" r:id="rId2"/>
     <p:sldId id="257" r:id="rId3"/>
     <p:sldId id="259" r:id="rId4"/>
     <p:sldId id="269" r:id="rId5"/>
-    <p:sldId id="273" r:id="rId6"/>
-    <p:sldId id="263" r:id="rId7"/>
-    <p:sldId id="280" r:id="rId8"/>
-    <p:sldId id="258" r:id="rId9"/>
-    <p:sldId id="278" r:id="rId10"/>
-    <p:sldId id="260" r:id="rId11"/>
-    <p:sldId id="266" r:id="rId12"/>
-    <p:sldId id="274" r:id="rId13"/>
-    <p:sldId id="264" r:id="rId14"/>
-    <p:sldId id="272" r:id="rId15"/>
-    <p:sldId id="267" r:id="rId16"/>
-    <p:sldId id="277" r:id="rId17"/>
-    <p:sldId id="265" r:id="rId18"/>
-    <p:sldId id="279" r:id="rId19"/>
-    <p:sldId id="275" r:id="rId20"/>
+    <p:sldId id="263" r:id="rId6"/>
+    <p:sldId id="273" r:id="rId7"/>
+    <p:sldId id="260" r:id="rId8"/>
+    <p:sldId id="266" r:id="rId9"/>
+    <p:sldId id="274" r:id="rId10"/>
+    <p:sldId id="278" r:id="rId11"/>
+    <p:sldId id="280" r:id="rId12"/>
+    <p:sldId id="264" r:id="rId13"/>
+    <p:sldId id="272" r:id="rId14"/>
+    <p:sldId id="267" r:id="rId15"/>
+    <p:sldId id="277" r:id="rId16"/>
+    <p:sldId id="265" r:id="rId17"/>
+    <p:sldId id="279" r:id="rId18"/>
+    <p:sldId id="275" r:id="rId19"/>
   </p:sldIdLst>
   <p:sldSz cx="12192000" cy="6858000"/>
   <p:notesSz cx="6858000" cy="9144000"/>
@@ -217,20 +216,6 @@
 
 <file path=ppt/comments/comment6.xml><?xml version="1.0" encoding="utf-8"?>
 <p:cmLst xmlns:a="http://schemas.openxmlformats.org/drawingml/2006/main" xmlns:r="http://schemas.openxmlformats.org/officeDocument/2006/relationships" xmlns:p="http://schemas.openxmlformats.org/presentationml/2006/main">
-  <p:cm authorId="1" dt="2020-05-06T20:47:14.589" idx="2">
-    <p:pos x="10" y="10"/>
-    <p:text>Danile Rocha</p:text>
-    <p:extLst>
-      <p:ext uri="{C676402C-5697-4E1C-873F-D02D1690AC5C}">
-        <p15:threadingInfo xmlns:p15="http://schemas.microsoft.com/office/powerpoint/2012/main" timeZoneBias="180"/>
-      </p:ext>
-    </p:extLst>
-  </p:cm>
-</p:cmLst>
-</file>
-
-<file path=ppt/comments/comment7.xml><?xml version="1.0" encoding="utf-8"?>
-<p:cmLst xmlns:a="http://schemas.openxmlformats.org/drawingml/2006/main" xmlns:r="http://schemas.openxmlformats.org/officeDocument/2006/relationships" xmlns:p="http://schemas.openxmlformats.org/presentationml/2006/main">
   <p:cm authorId="1" dt="2020-05-06T20:47:56.027" idx="5">
     <p:pos x="10" y="10"/>
     <p:text>Diogo Ivan</p:text>
@@ -243,7 +228,7 @@
 </p:cmLst>
 </file>
 
-<file path=ppt/comments/comment8.xml><?xml version="1.0" encoding="utf-8"?>
+<file path=ppt/comments/comment7.xml><?xml version="1.0" encoding="utf-8"?>
 <p:cmLst xmlns:a="http://schemas.openxmlformats.org/drawingml/2006/main" xmlns:r="http://schemas.openxmlformats.org/officeDocument/2006/relationships" xmlns:p="http://schemas.openxmlformats.org/presentationml/2006/main">
   <p:cm authorId="1" dt="2020-05-06T20:52:33.165" idx="6">
     <p:pos x="7680" y="-244"/>
@@ -257,7 +242,7 @@
 </p:cmLst>
 </file>
 
-<file path=ppt/comments/comment9.xml><?xml version="1.0" encoding="utf-8"?>
+<file path=ppt/comments/comment8.xml><?xml version="1.0" encoding="utf-8"?>
 <p:cmLst xmlns:a="http://schemas.openxmlformats.org/drawingml/2006/main" xmlns:r="http://schemas.openxmlformats.org/officeDocument/2006/relationships" xmlns:p="http://schemas.openxmlformats.org/presentationml/2006/main">
   <p:cm authorId="1" dt="2020-05-06T20:52:45.387" idx="7">
     <p:pos x="10" y="10"/>
@@ -353,7 +338,7 @@
           <a:p>
             <a:fld id="{6B8A6EFA-F786-4350-B5C0-B2D15D16C623}" type="datetimeFigureOut">
               <a:rPr lang="pt-BR" smtClean="0"/>
-              <a:t>26/06/2020</a:t>
+              <a:t>29/06/2020</a:t>
             </a:fld>
             <a:endParaRPr lang="pt-BR"/>
           </a:p>
@@ -751,7 +736,7 @@
           <a:p>
             <a:fld id="{04EB4EB8-E196-44D9-8FC3-6021E77C51A4}" type="datetimeFigureOut">
               <a:rPr lang="pt-BR" smtClean="0"/>
-              <a:t>26/06/2020</a:t>
+              <a:t>29/06/2020</a:t>
             </a:fld>
             <a:endParaRPr lang="pt-BR"/>
           </a:p>
@@ -921,7 +906,7 @@
           <a:p>
             <a:fld id="{04EB4EB8-E196-44D9-8FC3-6021E77C51A4}" type="datetimeFigureOut">
               <a:rPr lang="pt-BR" smtClean="0"/>
-              <a:t>26/06/2020</a:t>
+              <a:t>29/06/2020</a:t>
             </a:fld>
             <a:endParaRPr lang="pt-BR"/>
           </a:p>
@@ -1101,7 +1086,7 @@
           <a:p>
             <a:fld id="{04EB4EB8-E196-44D9-8FC3-6021E77C51A4}" type="datetimeFigureOut">
               <a:rPr lang="pt-BR" smtClean="0"/>
-              <a:t>26/06/2020</a:t>
+              <a:t>29/06/2020</a:t>
             </a:fld>
             <a:endParaRPr lang="pt-BR"/>
           </a:p>
@@ -1271,7 +1256,7 @@
           <a:p>
             <a:fld id="{04EB4EB8-E196-44D9-8FC3-6021E77C51A4}" type="datetimeFigureOut">
               <a:rPr lang="pt-BR" smtClean="0"/>
-              <a:t>26/06/2020</a:t>
+              <a:t>29/06/2020</a:t>
             </a:fld>
             <a:endParaRPr lang="pt-BR"/>
           </a:p>
@@ -1517,7 +1502,7 @@
           <a:p>
             <a:fld id="{04EB4EB8-E196-44D9-8FC3-6021E77C51A4}" type="datetimeFigureOut">
               <a:rPr lang="pt-BR" smtClean="0"/>
-              <a:t>26/06/2020</a:t>
+              <a:t>29/06/2020</a:t>
             </a:fld>
             <a:endParaRPr lang="pt-BR"/>
           </a:p>
@@ -1749,7 +1734,7 @@
           <a:p>
             <a:fld id="{04EB4EB8-E196-44D9-8FC3-6021E77C51A4}" type="datetimeFigureOut">
               <a:rPr lang="pt-BR" smtClean="0"/>
-              <a:t>26/06/2020</a:t>
+              <a:t>29/06/2020</a:t>
             </a:fld>
             <a:endParaRPr lang="pt-BR"/>
           </a:p>
@@ -2116,7 +2101,7 @@
           <a:p>
             <a:fld id="{04EB4EB8-E196-44D9-8FC3-6021E77C51A4}" type="datetimeFigureOut">
               <a:rPr lang="pt-BR" smtClean="0"/>
-              <a:t>26/06/2020</a:t>
+              <a:t>29/06/2020</a:t>
             </a:fld>
             <a:endParaRPr lang="pt-BR"/>
           </a:p>
@@ -2234,7 +2219,7 @@
           <a:p>
             <a:fld id="{04EB4EB8-E196-44D9-8FC3-6021E77C51A4}" type="datetimeFigureOut">
               <a:rPr lang="pt-BR" smtClean="0"/>
-              <a:t>26/06/2020</a:t>
+              <a:t>29/06/2020</a:t>
             </a:fld>
             <a:endParaRPr lang="pt-BR"/>
           </a:p>
@@ -2329,7 +2314,7 @@
           <a:p>
             <a:fld id="{04EB4EB8-E196-44D9-8FC3-6021E77C51A4}" type="datetimeFigureOut">
               <a:rPr lang="pt-BR" smtClean="0"/>
-              <a:t>26/06/2020</a:t>
+              <a:t>29/06/2020</a:t>
             </a:fld>
             <a:endParaRPr lang="pt-BR"/>
           </a:p>
@@ -2606,7 +2591,7 @@
           <a:p>
             <a:fld id="{04EB4EB8-E196-44D9-8FC3-6021E77C51A4}" type="datetimeFigureOut">
               <a:rPr lang="pt-BR" smtClean="0"/>
-              <a:t>26/06/2020</a:t>
+              <a:t>29/06/2020</a:t>
             </a:fld>
             <a:endParaRPr lang="pt-BR"/>
           </a:p>
@@ -2863,7 +2848,7 @@
           <a:p>
             <a:fld id="{04EB4EB8-E196-44D9-8FC3-6021E77C51A4}" type="datetimeFigureOut">
               <a:rPr lang="pt-BR" smtClean="0"/>
-              <a:t>26/06/2020</a:t>
+              <a:t>29/06/2020</a:t>
             </a:fld>
             <a:endParaRPr lang="pt-BR"/>
           </a:p>
@@ -3076,7 +3061,7 @@
           <a:p>
             <a:fld id="{04EB4EB8-E196-44D9-8FC3-6021E77C51A4}" type="datetimeFigureOut">
               <a:rPr lang="pt-BR" smtClean="0"/>
-              <a:t>26/06/2020</a:t>
+              <a:t>29/06/2020</a:t>
             </a:fld>
             <a:endParaRPr lang="pt-BR"/>
           </a:p>
@@ -3677,8 +3662,8 @@
         </p:nvSpPr>
         <p:spPr>
           <a:xfrm>
-            <a:off x="646082" y="333768"/>
-            <a:ext cx="4747552" cy="758825"/>
+            <a:off x="454478" y="450851"/>
+            <a:ext cx="4409069" cy="758825"/>
           </a:xfrm>
         </p:spPr>
         <p:txBody>
@@ -3688,52 +3673,18 @@
           <a:lstStyle/>
           <a:p>
             <a:r>
-              <a:rPr lang="pt-BR" sz="3600" dirty="0">
+              <a:rPr lang="pt-BR" sz="3200" dirty="0">
                 <a:solidFill>
                   <a:srgbClr val="4DB033"/>
                 </a:solidFill>
                 <a:latin typeface="Dubai Medium" panose="020B0603030403030204" pitchFamily="34" charset="-78"/>
                 <a:cs typeface="Dubai Medium" panose="020B0603030403030204" pitchFamily="34" charset="-78"/>
               </a:rPr>
-              <a:t>Nosso site</a:t>
-            </a:r>
-          </a:p>
-        </p:txBody>
-      </p:sp>
-      <p:pic>
-        <p:nvPicPr>
-          <p:cNvPr id="5" name="Espaço Reservado para Conteúdo 4" descr="Uma imagem contendo screenshot, texto&#10;&#10;Descrição gerada automaticamente">
-            <a:extLst>
-              <a:ext uri="{FF2B5EF4-FFF2-40B4-BE49-F238E27FC236}">
-                <a16:creationId xmlns:a16="http://schemas.microsoft.com/office/drawing/2014/main" id="{A5749119-35E4-4619-8C72-F0FC1080B386}"/>
-              </a:ext>
-            </a:extLst>
-          </p:cNvPr>
-          <p:cNvPicPr>
-            <a:picLocks noGrp="1" noChangeAspect="1"/>
-          </p:cNvPicPr>
-          <p:nvPr>
-            <p:ph idx="1"/>
-          </p:nvPr>
-        </p:nvPicPr>
-        <p:blipFill rotWithShape="1">
-          <a:blip r:embed="rId2">
-            <a:extLst>
-              <a:ext uri="{28A0092B-C50C-407E-A947-70E740481C1C}">
-                <a14:useLocalDpi xmlns:a14="http://schemas.microsoft.com/office/drawing/2010/main" val="0"/>
-              </a:ext>
-            </a:extLst>
-          </a:blip>
-          <a:srcRect l="9862" t="13318" r="11555"/>
-          <a:stretch/>
-        </p:blipFill>
-        <p:spPr>
-          <a:xfrm>
-            <a:off x="1400174" y="1204109"/>
-            <a:ext cx="9124951" cy="5653891"/>
-          </a:xfrm>
-        </p:spPr>
-      </p:pic>
+              <a:t>Diagrama de Arquitetura</a:t>
+            </a:r>
+          </a:p>
+        </p:txBody>
+      </p:sp>
       <p:cxnSp>
         <p:nvCxnSpPr>
           <p:cNvPr id="10" name="Conector reto 9">
@@ -3750,8 +3701,8 @@
         </p:nvCxnSpPr>
         <p:spPr>
           <a:xfrm flipH="1">
-            <a:off x="1" y="981076"/>
-            <a:ext cx="3619499" cy="0"/>
+            <a:off x="0" y="981076"/>
+            <a:ext cx="4067177" cy="0"/>
           </a:xfrm>
           <a:prstGeom prst="line">
             <a:avLst/>
@@ -3786,10 +3737,46 @@
       </p:cxnSp>
       <p:pic>
         <p:nvPicPr>
-          <p:cNvPr id="7" name="Espaço Reservado para Conteúdo 5" descr="Uma imagem contendo desenho&#10;&#10;Descrição gerada automaticamente">
-            <a:extLst>
-              <a:ext uri="{FF2B5EF4-FFF2-40B4-BE49-F238E27FC236}">
-                <a16:creationId xmlns:a16="http://schemas.microsoft.com/office/drawing/2014/main" id="{0ACEF69C-A13B-4E42-B000-34DD5A462017}"/>
+          <p:cNvPr id="5" name="Espaço Reservado para Conteúdo 5" descr="Uma imagem contendo desenho&#10;&#10;Descrição gerada automaticamente">
+            <a:extLst>
+              <a:ext uri="{FF2B5EF4-FFF2-40B4-BE49-F238E27FC236}">
+                <a16:creationId xmlns:a16="http://schemas.microsoft.com/office/drawing/2014/main" id="{E3A68BA6-C565-404A-85FD-C016A2F4F627}"/>
+              </a:ext>
+            </a:extLst>
+          </p:cNvPr>
+          <p:cNvPicPr>
+            <a:picLocks noChangeAspect="1"/>
+          </p:cNvPicPr>
+          <p:nvPr/>
+        </p:nvPicPr>
+        <p:blipFill>
+          <a:blip r:embed="rId2">
+            <a:extLst>
+              <a:ext uri="{28A0092B-C50C-407E-A947-70E740481C1C}">
+                <a14:useLocalDpi xmlns:a14="http://schemas.microsoft.com/office/drawing/2010/main" val="0"/>
+              </a:ext>
+            </a:extLst>
+          </a:blip>
+          <a:stretch>
+            <a:fillRect/>
+          </a:stretch>
+        </p:blipFill>
+        <p:spPr>
+          <a:xfrm>
+            <a:off x="10286734" y="-387713"/>
+            <a:ext cx="1905266" cy="1905266"/>
+          </a:xfrm>
+          <a:prstGeom prst="rect">
+            <a:avLst/>
+          </a:prstGeom>
+        </p:spPr>
+      </p:pic>
+      <p:pic>
+        <p:nvPicPr>
+          <p:cNvPr id="4" name="Imagem 3" descr="Tela de vídeo game&#10;&#10;Descrição gerada automaticamente">
+            <a:extLst>
+              <a:ext uri="{FF2B5EF4-FFF2-40B4-BE49-F238E27FC236}">
+                <a16:creationId xmlns:a16="http://schemas.microsoft.com/office/drawing/2014/main" id="{A6CDCDD0-2BF1-4931-8031-8A7C09C7DE42}"/>
               </a:ext>
             </a:extLst>
           </p:cNvPr>
@@ -3812,8 +3799,8 @@
         </p:blipFill>
         <p:spPr>
           <a:xfrm>
-            <a:off x="10286734" y="-387713"/>
-            <a:ext cx="1905266" cy="1905266"/>
+            <a:off x="2033588" y="1209676"/>
+            <a:ext cx="7775122" cy="5553658"/>
           </a:xfrm>
           <a:prstGeom prst="rect">
             <a:avLst/>
@@ -3823,7 +3810,7 @@
     </p:spTree>
     <p:extLst>
       <p:ext uri="{BB962C8B-B14F-4D97-AF65-F5344CB8AC3E}">
-        <p14:creationId xmlns:p14="http://schemas.microsoft.com/office/powerpoint/2010/main" val="3009486538"/>
+        <p14:creationId xmlns:p14="http://schemas.microsoft.com/office/powerpoint/2010/main" val="3229527684"/>
       </p:ext>
     </p:extLst>
   </p:cSld>
@@ -3868,8 +3855,8 @@
         </p:nvSpPr>
         <p:spPr>
           <a:xfrm>
-            <a:off x="476602" y="444965"/>
-            <a:ext cx="6056720" cy="660399"/>
+            <a:off x="454478" y="450851"/>
+            <a:ext cx="4682497" cy="758825"/>
           </a:xfrm>
         </p:spPr>
         <p:txBody>
@@ -3886,17 +3873,17 @@
                 <a:latin typeface="Dubai Medium" panose="020B0603030403030204" pitchFamily="34" charset="-78"/>
                 <a:cs typeface="Dubai Medium" panose="020B0603030403030204" pitchFamily="34" charset="-78"/>
               </a:rPr>
-              <a:t>E como o sistema funciona?</a:t>
+              <a:t>Orçamento e Custos</a:t>
             </a:r>
           </a:p>
         </p:txBody>
       </p:sp>
       <p:pic>
         <p:nvPicPr>
-          <p:cNvPr id="8" name="Espaço Reservado para Conteúdo 7">
-            <a:extLst>
-              <a:ext uri="{FF2B5EF4-FFF2-40B4-BE49-F238E27FC236}">
-                <a16:creationId xmlns:a16="http://schemas.microsoft.com/office/drawing/2014/main" id="{1229AD75-F048-4077-A97A-C33B146C46B0}"/>
+          <p:cNvPr id="6" name="Espaço Reservado para Conteúdo 5" descr="Uma imagem contendo desenho&#10;&#10;Descrição gerada automaticamente">
+            <a:extLst>
+              <a:ext uri="{FF2B5EF4-FFF2-40B4-BE49-F238E27FC236}">
+                <a16:creationId xmlns:a16="http://schemas.microsoft.com/office/drawing/2014/main" id="{2791291C-2F25-4C38-8180-07D1AFDDB93F}"/>
               </a:ext>
             </a:extLst>
           </p:cNvPr>
@@ -3907,19 +3894,23 @@
             <p:ph idx="1"/>
           </p:nvPr>
         </p:nvPicPr>
-        <p:blipFill rotWithShape="1">
-          <a:blip r:embed="rId2"/>
-          <a:srcRect l="180" t="672" r="361" b="983"/>
-          <a:stretch/>
+        <p:blipFill>
+          <a:blip r:embed="rId2">
+            <a:extLst>
+              <a:ext uri="{28A0092B-C50C-407E-A947-70E740481C1C}">
+                <a14:useLocalDpi xmlns:a14="http://schemas.microsoft.com/office/drawing/2010/main" val="0"/>
+              </a:ext>
+            </a:extLst>
+          </a:blip>
+          <a:stretch>
+            <a:fillRect/>
+          </a:stretch>
         </p:blipFill>
         <p:spPr>
           <a:xfrm>
-            <a:off x="2724282" y="1379073"/>
-            <a:ext cx="6743435" cy="5033961"/>
-          </a:xfrm>
-          <a:prstGeom prst="rect">
-            <a:avLst/>
-          </a:prstGeom>
+            <a:off x="10286734" y="-387713"/>
+            <a:ext cx="1905266" cy="1905266"/>
+          </a:xfrm>
         </p:spPr>
       </p:pic>
       <p:cxnSp>
@@ -3939,7 +3930,7 @@
         <p:spPr>
           <a:xfrm flipH="1">
             <a:off x="2" y="981076"/>
-            <a:ext cx="3156153" cy="0"/>
+            <a:ext cx="4859865" cy="0"/>
           </a:xfrm>
           <a:prstGeom prst="line">
             <a:avLst/>
@@ -3972,82 +3963,582 @@
           </a:fontRef>
         </p:style>
       </p:cxnSp>
-      <p:pic>
-        <p:nvPicPr>
-          <p:cNvPr id="6" name="Espaço Reservado para Conteúdo 5" descr="Uma imagem contendo desenho&#10;&#10;Descrição gerada automaticamente">
-            <a:extLst>
-              <a:ext uri="{FF2B5EF4-FFF2-40B4-BE49-F238E27FC236}">
-                <a16:creationId xmlns:a16="http://schemas.microsoft.com/office/drawing/2014/main" id="{47A08B82-963C-4891-9394-22966D814E73}"/>
-              </a:ext>
-            </a:extLst>
-          </p:cNvPr>
-          <p:cNvPicPr>
-            <a:picLocks noChangeAspect="1"/>
-          </p:cNvPicPr>
+      <p:sp>
+        <p:nvSpPr>
+          <p:cNvPr id="9" name="Título 1">
+            <a:extLst>
+              <a:ext uri="{FF2B5EF4-FFF2-40B4-BE49-F238E27FC236}">
+                <a16:creationId xmlns:a16="http://schemas.microsoft.com/office/drawing/2014/main" id="{B3E1F8AF-9C2D-4A4A-B128-57FA6CB66969}"/>
+              </a:ext>
+            </a:extLst>
+          </p:cNvPr>
+          <p:cNvSpPr txBox="1">
+            <a:spLocks/>
+          </p:cNvSpPr>
           <p:nvPr/>
-        </p:nvPicPr>
-        <p:blipFill>
-          <a:blip r:embed="rId3">
-            <a:extLst>
-              <a:ext uri="{28A0092B-C50C-407E-A947-70E740481C1C}">
-                <a14:useLocalDpi xmlns:a14="http://schemas.microsoft.com/office/drawing/2010/main" val="0"/>
-              </a:ext>
-            </a:extLst>
-          </a:blip>
-          <a:stretch>
-            <a:fillRect/>
-          </a:stretch>
-        </p:blipFill>
-        <p:spPr>
-          <a:xfrm>
-            <a:off x="10286734" y="-387713"/>
-            <a:ext cx="1905266" cy="1905266"/>
+        </p:nvSpPr>
+        <p:spPr>
+          <a:xfrm>
+            <a:off x="4498666" y="2173361"/>
+            <a:ext cx="929234" cy="758826"/>
           </a:xfrm>
           <a:prstGeom prst="rect">
             <a:avLst/>
           </a:prstGeom>
         </p:spPr>
-      </p:pic>
-      <p:pic>
-        <p:nvPicPr>
-          <p:cNvPr id="20" name="Imagem 19" descr="Uma imagem contendo animal, invertebrado, luz, desenho&#10;&#10;Descrição gerada automaticamente">
-            <a:extLst>
-              <a:ext uri="{FF2B5EF4-FFF2-40B4-BE49-F238E27FC236}">
-                <a16:creationId xmlns:a16="http://schemas.microsoft.com/office/drawing/2014/main" id="{B8A26010-3201-4C94-A90B-94D89BEF6E37}"/>
-              </a:ext>
-            </a:extLst>
-          </p:cNvPr>
-          <p:cNvPicPr>
-            <a:picLocks noChangeAspect="1"/>
-          </p:cNvPicPr>
+        <p:txBody>
+          <a:bodyPr vert="horz" lIns="91440" tIns="45720" rIns="91440" bIns="45720" rtlCol="0" anchor="ctr">
+            <a:normAutofit fontScale="97500"/>
+          </a:bodyPr>
+          <a:lstStyle>
+            <a:lvl1pPr algn="l" defTabSz="914400" rtl="0" eaLnBrk="1" latinLnBrk="0" hangingPunct="1">
+              <a:lnSpc>
+                <a:spcPct val="90000"/>
+              </a:lnSpc>
+              <a:spcBef>
+                <a:spcPct val="0"/>
+              </a:spcBef>
+              <a:buNone/>
+              <a:defRPr sz="4400" kern="1200">
+                <a:solidFill>
+                  <a:schemeClr val="tx1"/>
+                </a:solidFill>
+                <a:latin typeface="+mj-lt"/>
+                <a:ea typeface="+mj-ea"/>
+                <a:cs typeface="+mj-cs"/>
+              </a:defRPr>
+            </a:lvl1pPr>
+          </a:lstStyle>
+          <a:p>
+            <a:r>
+              <a:rPr lang="pt-BR" sz="2800" dirty="0">
+                <a:solidFill>
+                  <a:srgbClr val="FFC000"/>
+                </a:solidFill>
+                <a:latin typeface="Dubai Medium" panose="020B0603030403030204" pitchFamily="34" charset="-78"/>
+                <a:cs typeface="Dubai Medium" panose="020B0603030403030204" pitchFamily="34" charset="-78"/>
+              </a:rPr>
+              <a:t>AWS</a:t>
+            </a:r>
+          </a:p>
+        </p:txBody>
+      </p:sp>
+      <p:sp>
+        <p:nvSpPr>
+          <p:cNvPr id="19" name="Título 1">
+            <a:extLst>
+              <a:ext uri="{FF2B5EF4-FFF2-40B4-BE49-F238E27FC236}">
+                <a16:creationId xmlns:a16="http://schemas.microsoft.com/office/drawing/2014/main" id="{E17DFFA1-7804-47BA-AADD-CF79917C97E2}"/>
+              </a:ext>
+            </a:extLst>
+          </p:cNvPr>
+          <p:cNvSpPr txBox="1">
+            <a:spLocks/>
+          </p:cNvSpPr>
           <p:nvPr/>
-        </p:nvPicPr>
-        <p:blipFill>
-          <a:blip r:embed="rId4">
-            <a:extLst>
-              <a:ext uri="{28A0092B-C50C-407E-A947-70E740481C1C}">
-                <a14:useLocalDpi xmlns:a14="http://schemas.microsoft.com/office/drawing/2010/main" val="0"/>
-              </a:ext>
-            </a:extLst>
-          </a:blip>
-          <a:stretch>
-            <a:fillRect/>
-          </a:stretch>
-        </p:blipFill>
-        <p:spPr>
-          <a:xfrm>
-            <a:off x="8988782" y="2546698"/>
-            <a:ext cx="3481514" cy="1442121"/>
+        </p:nvSpPr>
+        <p:spPr>
+          <a:xfrm>
+            <a:off x="454478" y="3116532"/>
+            <a:ext cx="2264949" cy="624936"/>
           </a:xfrm>
           <a:prstGeom prst="rect">
             <a:avLst/>
           </a:prstGeom>
         </p:spPr>
-      </p:pic>
+        <p:txBody>
+          <a:bodyPr vert="horz" lIns="91440" tIns="45720" rIns="91440" bIns="45720" rtlCol="0" anchor="ctr">
+            <a:normAutofit fontScale="97500"/>
+          </a:bodyPr>
+          <a:lstStyle>
+            <a:lvl1pPr algn="l" defTabSz="914400" rtl="0" eaLnBrk="1" latinLnBrk="0" hangingPunct="1">
+              <a:lnSpc>
+                <a:spcPct val="90000"/>
+              </a:lnSpc>
+              <a:spcBef>
+                <a:spcPct val="0"/>
+              </a:spcBef>
+              <a:buNone/>
+              <a:defRPr sz="4400" kern="1200">
+                <a:solidFill>
+                  <a:schemeClr val="tx1"/>
+                </a:solidFill>
+                <a:latin typeface="+mj-lt"/>
+                <a:ea typeface="+mj-ea"/>
+                <a:cs typeface="+mj-cs"/>
+              </a:defRPr>
+            </a:lvl1pPr>
+          </a:lstStyle>
+          <a:p>
+            <a:pPr marL="342900" indent="-342900">
+              <a:buFont typeface="Arial" panose="020B0604020202020204" pitchFamily="34" charset="0"/>
+              <a:buChar char="•"/>
+            </a:pPr>
+            <a:r>
+              <a:rPr lang="pt-BR" sz="2000" dirty="0">
+                <a:solidFill>
+                  <a:srgbClr val="4D3495"/>
+                </a:solidFill>
+                <a:latin typeface="Dubai Medium" panose="020B0603030403030204" pitchFamily="34" charset="-78"/>
+                <a:cs typeface="Dubai Medium" panose="020B0603030403030204" pitchFamily="34" charset="-78"/>
+              </a:rPr>
+              <a:t>Maquina Virtual</a:t>
+            </a:r>
+          </a:p>
+        </p:txBody>
+      </p:sp>
+      <p:sp>
+        <p:nvSpPr>
+          <p:cNvPr id="21" name="Título 1">
+            <a:extLst>
+              <a:ext uri="{FF2B5EF4-FFF2-40B4-BE49-F238E27FC236}">
+                <a16:creationId xmlns:a16="http://schemas.microsoft.com/office/drawing/2014/main" id="{7BDB8907-E996-491E-8C66-0FF68089ADAC}"/>
+              </a:ext>
+            </a:extLst>
+          </p:cNvPr>
+          <p:cNvSpPr txBox="1">
+            <a:spLocks/>
+          </p:cNvSpPr>
+          <p:nvPr/>
+        </p:nvSpPr>
+        <p:spPr>
+          <a:xfrm>
+            <a:off x="9587511" y="2173361"/>
+            <a:ext cx="1236826" cy="758826"/>
+          </a:xfrm>
+          <a:prstGeom prst="rect">
+            <a:avLst/>
+          </a:prstGeom>
+        </p:spPr>
+        <p:txBody>
+          <a:bodyPr vert="horz" lIns="91440" tIns="45720" rIns="91440" bIns="45720" rtlCol="0" anchor="ctr">
+            <a:normAutofit fontScale="97500"/>
+          </a:bodyPr>
+          <a:lstStyle>
+            <a:lvl1pPr algn="l" defTabSz="914400" rtl="0" eaLnBrk="1" latinLnBrk="0" hangingPunct="1">
+              <a:lnSpc>
+                <a:spcPct val="90000"/>
+              </a:lnSpc>
+              <a:spcBef>
+                <a:spcPct val="0"/>
+              </a:spcBef>
+              <a:buNone/>
+              <a:defRPr sz="4400" kern="1200">
+                <a:solidFill>
+                  <a:schemeClr val="tx1"/>
+                </a:solidFill>
+                <a:latin typeface="+mj-lt"/>
+                <a:ea typeface="+mj-ea"/>
+                <a:cs typeface="+mj-cs"/>
+              </a:defRPr>
+            </a:lvl1pPr>
+          </a:lstStyle>
+          <a:p>
+            <a:r>
+              <a:rPr lang="pt-BR" sz="2800" dirty="0">
+                <a:solidFill>
+                  <a:srgbClr val="0091C4"/>
+                </a:solidFill>
+                <a:latin typeface="Dubai Medium" panose="020B0603030403030204" pitchFamily="34" charset="-78"/>
+                <a:cs typeface="Dubai Medium" panose="020B0603030403030204" pitchFamily="34" charset="-78"/>
+              </a:rPr>
+              <a:t>AZURE</a:t>
+            </a:r>
+          </a:p>
+        </p:txBody>
+      </p:sp>
+      <p:sp>
+        <p:nvSpPr>
+          <p:cNvPr id="4" name="Retângulo 3">
+            <a:extLst>
+              <a:ext uri="{FF2B5EF4-FFF2-40B4-BE49-F238E27FC236}">
+                <a16:creationId xmlns:a16="http://schemas.microsoft.com/office/drawing/2014/main" id="{B9162A2E-49C7-4BCC-AA83-301EC4529547}"/>
+              </a:ext>
+            </a:extLst>
+          </p:cNvPr>
+          <p:cNvSpPr/>
+          <p:nvPr/>
+        </p:nvSpPr>
+        <p:spPr>
+          <a:xfrm>
+            <a:off x="454478" y="4282910"/>
+            <a:ext cx="2397470" cy="400110"/>
+          </a:xfrm>
+          <a:prstGeom prst="rect">
+            <a:avLst/>
+          </a:prstGeom>
+        </p:spPr>
+        <p:txBody>
+          <a:bodyPr wrap="square">
+            <a:spAutoFit/>
+          </a:bodyPr>
+          <a:lstStyle/>
+          <a:p>
+            <a:pPr marL="342900" indent="-342900">
+              <a:buFont typeface="Arial" panose="020B0604020202020204" pitchFamily="34" charset="0"/>
+              <a:buChar char="•"/>
+            </a:pPr>
+            <a:r>
+              <a:rPr lang="pt-BR" sz="2000" dirty="0">
+                <a:solidFill>
+                  <a:srgbClr val="4D3495"/>
+                </a:solidFill>
+                <a:latin typeface="Dubai Medium" panose="020B0603030403030204" pitchFamily="34" charset="-78"/>
+                <a:cs typeface="Dubai Medium" panose="020B0603030403030204" pitchFamily="34" charset="-78"/>
+              </a:rPr>
+              <a:t>Volume</a:t>
+            </a:r>
+          </a:p>
+        </p:txBody>
+      </p:sp>
+      <p:sp>
+        <p:nvSpPr>
+          <p:cNvPr id="5" name="Retângulo 4">
+            <a:extLst>
+              <a:ext uri="{FF2B5EF4-FFF2-40B4-BE49-F238E27FC236}">
+                <a16:creationId xmlns:a16="http://schemas.microsoft.com/office/drawing/2014/main" id="{3D0815CD-71A3-422E-8858-8743A189F833}"/>
+              </a:ext>
+            </a:extLst>
+          </p:cNvPr>
+          <p:cNvSpPr/>
+          <p:nvPr/>
+        </p:nvSpPr>
+        <p:spPr>
+          <a:xfrm>
+            <a:off x="8820931" y="3447059"/>
+            <a:ext cx="2769989" cy="369332"/>
+          </a:xfrm>
+          <a:prstGeom prst="rect">
+            <a:avLst/>
+          </a:prstGeom>
+        </p:spPr>
+        <p:txBody>
+          <a:bodyPr wrap="none">
+            <a:spAutoFit/>
+          </a:bodyPr>
+          <a:lstStyle/>
+          <a:p>
+            <a:r>
+              <a:rPr lang="pt-BR" dirty="0">
+                <a:solidFill>
+                  <a:srgbClr val="4D3495"/>
+                </a:solidFill>
+                <a:latin typeface="Dubai Medium" panose="020B0603030403030204" pitchFamily="34" charset="-78"/>
+                <a:cs typeface="Dubai Medium" panose="020B0603030403030204" pitchFamily="34" charset="-78"/>
+              </a:rPr>
+              <a:t>Compute </a:t>
+            </a:r>
+            <a:r>
+              <a:rPr lang="pt-BR" dirty="0" err="1">
+                <a:solidFill>
+                  <a:srgbClr val="4D3495"/>
+                </a:solidFill>
+                <a:latin typeface="Dubai Medium" panose="020B0603030403030204" pitchFamily="34" charset="-78"/>
+                <a:cs typeface="Dubai Medium" panose="020B0603030403030204" pitchFamily="34" charset="-78"/>
+              </a:rPr>
+              <a:t>Gen</a:t>
+            </a:r>
+            <a:r>
+              <a:rPr lang="pt-BR" dirty="0">
+                <a:solidFill>
+                  <a:srgbClr val="4D3495"/>
+                </a:solidFill>
+                <a:latin typeface="Dubai Medium" panose="020B0603030403030204" pitchFamily="34" charset="-78"/>
+                <a:cs typeface="Dubai Medium" panose="020B0603030403030204" pitchFamily="34" charset="-78"/>
+              </a:rPr>
+              <a:t> 5 (1 VCORE)</a:t>
+            </a:r>
+            <a:endParaRPr lang="pt-BR" dirty="0"/>
+          </a:p>
+        </p:txBody>
+      </p:sp>
+      <p:sp>
+        <p:nvSpPr>
+          <p:cNvPr id="8" name="Retângulo 7">
+            <a:extLst>
+              <a:ext uri="{FF2B5EF4-FFF2-40B4-BE49-F238E27FC236}">
+                <a16:creationId xmlns:a16="http://schemas.microsoft.com/office/drawing/2014/main" id="{E59CAE42-A25E-4968-A308-5CE812D0A3F3}"/>
+              </a:ext>
+            </a:extLst>
+          </p:cNvPr>
+          <p:cNvSpPr/>
+          <p:nvPr/>
+        </p:nvSpPr>
+        <p:spPr>
+          <a:xfrm>
+            <a:off x="9346266" y="3045395"/>
+            <a:ext cx="1719317" cy="369332"/>
+          </a:xfrm>
+          <a:prstGeom prst="rect">
+            <a:avLst/>
+          </a:prstGeom>
+        </p:spPr>
+        <p:txBody>
+          <a:bodyPr wrap="none">
+            <a:spAutoFit/>
+          </a:bodyPr>
+          <a:lstStyle/>
+          <a:p>
+            <a:r>
+              <a:rPr lang="pt-BR" dirty="0">
+                <a:solidFill>
+                  <a:srgbClr val="4D3495"/>
+                </a:solidFill>
+                <a:latin typeface="Dubai Medium" panose="020B0603030403030204" pitchFamily="34" charset="-78"/>
+                <a:cs typeface="Dubai Medium" panose="020B0603030403030204" pitchFamily="34" charset="-78"/>
+              </a:rPr>
+              <a:t>24,48 USD/mês</a:t>
+            </a:r>
+            <a:endParaRPr lang="pt-BR" dirty="0"/>
+          </a:p>
+        </p:txBody>
+      </p:sp>
+      <p:sp>
+        <p:nvSpPr>
+          <p:cNvPr id="11" name="Retângulo 10">
+            <a:extLst>
+              <a:ext uri="{FF2B5EF4-FFF2-40B4-BE49-F238E27FC236}">
+                <a16:creationId xmlns:a16="http://schemas.microsoft.com/office/drawing/2014/main" id="{724617D7-E480-4F10-9F09-7063FDC9C622}"/>
+              </a:ext>
+            </a:extLst>
+          </p:cNvPr>
+          <p:cNvSpPr/>
+          <p:nvPr/>
+        </p:nvSpPr>
+        <p:spPr>
+          <a:xfrm>
+            <a:off x="4226057" y="3077727"/>
+            <a:ext cx="1719317" cy="369332"/>
+          </a:xfrm>
+          <a:prstGeom prst="rect">
+            <a:avLst/>
+          </a:prstGeom>
+        </p:spPr>
+        <p:txBody>
+          <a:bodyPr wrap="none">
+            <a:spAutoFit/>
+          </a:bodyPr>
+          <a:lstStyle/>
+          <a:p>
+            <a:r>
+              <a:rPr lang="pt-BR" dirty="0">
+                <a:solidFill>
+                  <a:srgbClr val="4D3495"/>
+                </a:solidFill>
+                <a:latin typeface="Dubai Medium" panose="020B0603030403030204" pitchFamily="34" charset="-78"/>
+                <a:cs typeface="Dubai Medium" panose="020B0603030403030204" pitchFamily="34" charset="-78"/>
+              </a:rPr>
+              <a:t>8,352 USD/mês</a:t>
+            </a:r>
+            <a:endParaRPr lang="pt-BR" dirty="0"/>
+          </a:p>
+        </p:txBody>
+      </p:sp>
+      <p:sp>
+        <p:nvSpPr>
+          <p:cNvPr id="12" name="Retângulo 11">
+            <a:extLst>
+              <a:ext uri="{FF2B5EF4-FFF2-40B4-BE49-F238E27FC236}">
+                <a16:creationId xmlns:a16="http://schemas.microsoft.com/office/drawing/2014/main" id="{BB4BC6E9-6867-4E77-B839-8E5DFC02120D}"/>
+              </a:ext>
+            </a:extLst>
+          </p:cNvPr>
+          <p:cNvSpPr/>
+          <p:nvPr/>
+        </p:nvSpPr>
+        <p:spPr>
+          <a:xfrm>
+            <a:off x="4498666" y="3446499"/>
+            <a:ext cx="1023229" cy="369332"/>
+          </a:xfrm>
+          <a:prstGeom prst="rect">
+            <a:avLst/>
+          </a:prstGeom>
+        </p:spPr>
+        <p:txBody>
+          <a:bodyPr wrap="none">
+            <a:spAutoFit/>
+          </a:bodyPr>
+          <a:lstStyle/>
+          <a:p>
+            <a:r>
+              <a:rPr lang="pt-BR" dirty="0">
+                <a:solidFill>
+                  <a:srgbClr val="4D3495"/>
+                </a:solidFill>
+                <a:latin typeface="Dubai Medium" panose="020B0603030403030204" pitchFamily="34" charset="-78"/>
+                <a:cs typeface="Dubai Medium" panose="020B0603030403030204" pitchFamily="34" charset="-78"/>
+              </a:rPr>
+              <a:t>T2.micro</a:t>
+            </a:r>
+            <a:endParaRPr lang="pt-BR" dirty="0"/>
+          </a:p>
+        </p:txBody>
+      </p:sp>
+      <p:sp>
+        <p:nvSpPr>
+          <p:cNvPr id="27" name="Retângulo 26">
+            <a:extLst>
+              <a:ext uri="{FF2B5EF4-FFF2-40B4-BE49-F238E27FC236}">
+                <a16:creationId xmlns:a16="http://schemas.microsoft.com/office/drawing/2014/main" id="{9709D8A1-E82B-42F3-B724-C1A812834B21}"/>
+              </a:ext>
+            </a:extLst>
+          </p:cNvPr>
+          <p:cNvSpPr/>
+          <p:nvPr/>
+        </p:nvSpPr>
+        <p:spPr>
+          <a:xfrm>
+            <a:off x="9587514" y="4683020"/>
+            <a:ext cx="1170219" cy="400110"/>
+          </a:xfrm>
+          <a:prstGeom prst="rect">
+            <a:avLst/>
+          </a:prstGeom>
+        </p:spPr>
+        <p:txBody>
+          <a:bodyPr wrap="square">
+            <a:spAutoFit/>
+          </a:bodyPr>
+          <a:lstStyle/>
+          <a:p>
+            <a:r>
+              <a:rPr lang="pt-BR" sz="2000" dirty="0">
+                <a:solidFill>
+                  <a:srgbClr val="4D3495"/>
+                </a:solidFill>
+                <a:latin typeface="Dubai Medium" panose="020B0603030403030204" pitchFamily="34" charset="-78"/>
+                <a:cs typeface="Dubai Medium" panose="020B0603030403030204" pitchFamily="34" charset="-78"/>
+              </a:rPr>
+              <a:t>1000 GB</a:t>
+            </a:r>
+          </a:p>
+        </p:txBody>
+      </p:sp>
+      <p:sp>
+        <p:nvSpPr>
+          <p:cNvPr id="29" name="Retângulo 28">
+            <a:extLst>
+              <a:ext uri="{FF2B5EF4-FFF2-40B4-BE49-F238E27FC236}">
+                <a16:creationId xmlns:a16="http://schemas.microsoft.com/office/drawing/2014/main" id="{C5141A75-FF48-4A91-AD78-DC381DE67A3C}"/>
+              </a:ext>
+            </a:extLst>
+          </p:cNvPr>
+          <p:cNvSpPr/>
+          <p:nvPr/>
+        </p:nvSpPr>
+        <p:spPr>
+          <a:xfrm>
+            <a:off x="9237534" y="4299433"/>
+            <a:ext cx="2397470" cy="400110"/>
+          </a:xfrm>
+          <a:prstGeom prst="rect">
+            <a:avLst/>
+          </a:prstGeom>
+        </p:spPr>
+        <p:txBody>
+          <a:bodyPr wrap="square">
+            <a:spAutoFit/>
+          </a:bodyPr>
+          <a:lstStyle/>
+          <a:p>
+            <a:r>
+              <a:rPr lang="pt-BR" sz="2000" dirty="0">
+                <a:solidFill>
+                  <a:srgbClr val="4D3495"/>
+                </a:solidFill>
+                <a:latin typeface="Dubai Medium" panose="020B0603030403030204" pitchFamily="34" charset="-78"/>
+                <a:cs typeface="Dubai Medium" panose="020B0603030403030204" pitchFamily="34" charset="-78"/>
+              </a:rPr>
+              <a:t>100 USD/mês</a:t>
+            </a:r>
+          </a:p>
+        </p:txBody>
+      </p:sp>
+      <p:sp>
+        <p:nvSpPr>
+          <p:cNvPr id="30" name="Retângulo 29">
+            <a:extLst>
+              <a:ext uri="{FF2B5EF4-FFF2-40B4-BE49-F238E27FC236}">
+                <a16:creationId xmlns:a16="http://schemas.microsoft.com/office/drawing/2014/main" id="{1AC2BADF-4D98-4C57-8BD4-817204128E02}"/>
+              </a:ext>
+            </a:extLst>
+          </p:cNvPr>
+          <p:cNvSpPr/>
+          <p:nvPr/>
+        </p:nvSpPr>
+        <p:spPr>
+          <a:xfrm>
+            <a:off x="4226057" y="4261145"/>
+            <a:ext cx="2397470" cy="400110"/>
+          </a:xfrm>
+          <a:prstGeom prst="rect">
+            <a:avLst/>
+          </a:prstGeom>
+        </p:spPr>
+        <p:txBody>
+          <a:bodyPr wrap="square">
+            <a:spAutoFit/>
+          </a:bodyPr>
+          <a:lstStyle/>
+          <a:p>
+            <a:r>
+              <a:rPr lang="pt-BR" sz="2000" dirty="0">
+                <a:solidFill>
+                  <a:srgbClr val="4D3495"/>
+                </a:solidFill>
+                <a:latin typeface="Dubai Medium" panose="020B0603030403030204" pitchFamily="34" charset="-78"/>
+                <a:cs typeface="Dubai Medium" panose="020B0603030403030204" pitchFamily="34" charset="-78"/>
+              </a:rPr>
+              <a:t>2075 USD/mês</a:t>
+            </a:r>
+          </a:p>
+        </p:txBody>
+      </p:sp>
+      <p:sp>
+        <p:nvSpPr>
+          <p:cNvPr id="31" name="Retângulo 30">
+            <a:extLst>
+              <a:ext uri="{FF2B5EF4-FFF2-40B4-BE49-F238E27FC236}">
+                <a16:creationId xmlns:a16="http://schemas.microsoft.com/office/drawing/2014/main" id="{69B0868B-5A57-4096-A28A-E6A4A41EABD4}"/>
+              </a:ext>
+            </a:extLst>
+          </p:cNvPr>
+          <p:cNvSpPr/>
+          <p:nvPr/>
+        </p:nvSpPr>
+        <p:spPr>
+          <a:xfrm>
+            <a:off x="3886980" y="4629917"/>
+            <a:ext cx="2397470" cy="400110"/>
+          </a:xfrm>
+          <a:prstGeom prst="rect">
+            <a:avLst/>
+          </a:prstGeom>
+        </p:spPr>
+        <p:txBody>
+          <a:bodyPr wrap="square">
+            <a:spAutoFit/>
+          </a:bodyPr>
+          <a:lstStyle/>
+          <a:p>
+            <a:r>
+              <a:rPr lang="pt-BR" sz="2000" dirty="0">
+                <a:solidFill>
+                  <a:srgbClr val="4D3495"/>
+                </a:solidFill>
+                <a:latin typeface="Dubai Medium" panose="020B0603030403030204" pitchFamily="34" charset="-78"/>
+                <a:cs typeface="Dubai Medium" panose="020B0603030403030204" pitchFamily="34" charset="-78"/>
+              </a:rPr>
+              <a:t>1000 GB  3000 IOPS </a:t>
+            </a:r>
+          </a:p>
+        </p:txBody>
+      </p:sp>
     </p:spTree>
     <p:extLst>
       <p:ext uri="{BB962C8B-B14F-4D97-AF65-F5344CB8AC3E}">
-        <p14:creationId xmlns:p14="http://schemas.microsoft.com/office/powerpoint/2010/main" val="1105126272"/>
+        <p14:creationId xmlns:p14="http://schemas.microsoft.com/office/powerpoint/2010/main" val="2595325839"/>
       </p:ext>
     </p:extLst>
   </p:cSld>
@@ -4092,8 +4583,8 @@
         </p:nvSpPr>
         <p:spPr>
           <a:xfrm>
-            <a:off x="473529" y="462039"/>
-            <a:ext cx="3393621" cy="679383"/>
+            <a:off x="454478" y="419099"/>
+            <a:ext cx="4498522" cy="790577"/>
           </a:xfrm>
         </p:spPr>
         <p:txBody>
@@ -4103,25 +4594,73 @@
           <a:lstStyle/>
           <a:p>
             <a:r>
-              <a:rPr lang="pt-BR" sz="3600" dirty="0">
+              <a:rPr lang="pt-BR" sz="3200" dirty="0">
                 <a:solidFill>
                   <a:srgbClr val="4DB033"/>
                 </a:solidFill>
                 <a:latin typeface="Dubai Medium" panose="020B0603030403030204" pitchFamily="34" charset="-78"/>
                 <a:cs typeface="Dubai Medium" panose="020B0603030403030204" pitchFamily="34" charset="-78"/>
               </a:rPr>
-              <a:t>Inovação - RPA</a:t>
-            </a:r>
-            <a:endParaRPr lang="pt-BR" sz="3200" dirty="0">
-              <a:solidFill>
-                <a:srgbClr val="4DB033"/>
-              </a:solidFill>
-              <a:latin typeface="Dubai Medium" panose="020B0603030403030204" pitchFamily="34" charset="-78"/>
-              <a:cs typeface="Dubai Medium" panose="020B0603030403030204" pitchFamily="34" charset="-78"/>
-            </a:endParaRPr>
-          </a:p>
-        </p:txBody>
-      </p:sp>
+              <a:t>Virtual </a:t>
+            </a:r>
+            <a:r>
+              <a:rPr lang="pt-BR" sz="3200" dirty="0" err="1">
+                <a:solidFill>
+                  <a:srgbClr val="4DB033"/>
+                </a:solidFill>
+                <a:latin typeface="Dubai Medium" panose="020B0603030403030204" pitchFamily="34" charset="-78"/>
+                <a:cs typeface="Dubai Medium" panose="020B0603030403030204" pitchFamily="34" charset="-78"/>
+              </a:rPr>
+              <a:t>Machine</a:t>
+            </a:r>
+            <a:r>
+              <a:rPr lang="pt-BR" sz="3200" dirty="0">
+                <a:solidFill>
+                  <a:srgbClr val="4DB033"/>
+                </a:solidFill>
+                <a:latin typeface="Dubai Medium" panose="020B0603030403030204" pitchFamily="34" charset="-78"/>
+                <a:cs typeface="Dubai Medium" panose="020B0603030403030204" pitchFamily="34" charset="-78"/>
+              </a:rPr>
+              <a:t> - Linux</a:t>
+            </a:r>
+          </a:p>
+        </p:txBody>
+      </p:sp>
+      <p:pic>
+        <p:nvPicPr>
+          <p:cNvPr id="7" name="Espaço Reservado para Conteúdo 6" descr="Tela de computador com fundo azul&#10;&#10;Descrição gerada automaticamente">
+            <a:extLst>
+              <a:ext uri="{FF2B5EF4-FFF2-40B4-BE49-F238E27FC236}">
+                <a16:creationId xmlns:a16="http://schemas.microsoft.com/office/drawing/2014/main" id="{DE1D7D90-463E-4A07-BEEA-48DC9239D3D3}"/>
+              </a:ext>
+            </a:extLst>
+          </p:cNvPr>
+          <p:cNvPicPr>
+            <a:picLocks noGrp="1" noChangeAspect="1"/>
+          </p:cNvPicPr>
+          <p:nvPr>
+            <p:ph idx="1"/>
+          </p:nvPr>
+        </p:nvPicPr>
+        <p:blipFill>
+          <a:blip r:embed="rId2">
+            <a:extLst>
+              <a:ext uri="{28A0092B-C50C-407E-A947-70E740481C1C}">
+                <a14:useLocalDpi xmlns:a14="http://schemas.microsoft.com/office/drawing/2010/main" val="0"/>
+              </a:ext>
+            </a:extLst>
+          </a:blip>
+          <a:stretch>
+            <a:fillRect/>
+          </a:stretch>
+        </p:blipFill>
+        <p:spPr>
+          <a:xfrm>
+            <a:off x="1588780" y="1209688"/>
+            <a:ext cx="8366740" cy="5229213"/>
+          </a:xfrm>
+        </p:spPr>
+      </p:pic>
       <p:cxnSp>
         <p:nvCxnSpPr>
           <p:cNvPr id="10" name="Conector reto 9">
@@ -4138,8 +4677,8 @@
         </p:nvCxnSpPr>
         <p:spPr>
           <a:xfrm flipH="1">
-            <a:off x="1" y="981076"/>
-            <a:ext cx="2000249" cy="0"/>
+            <a:off x="2" y="981076"/>
+            <a:ext cx="4686298" cy="0"/>
           </a:xfrm>
           <a:prstGeom prst="line">
             <a:avLst/>
@@ -4174,10 +4713,10 @@
       </p:cxnSp>
       <p:pic>
         <p:nvPicPr>
-          <p:cNvPr id="6" name="Espaço Reservado para Conteúdo 5" descr="Uma imagem contendo desenho&#10;&#10;Descrição gerada automaticamente">
-            <a:extLst>
-              <a:ext uri="{FF2B5EF4-FFF2-40B4-BE49-F238E27FC236}">
-                <a16:creationId xmlns:a16="http://schemas.microsoft.com/office/drawing/2014/main" id="{91101F4B-3D5E-4DA2-B01E-F889604FDF48}"/>
+          <p:cNvPr id="9" name="Imagem 8" descr="Uma imagem contendo mesa, amarelo&#10;&#10;Descrição gerada automaticamente">
+            <a:extLst>
+              <a:ext uri="{FF2B5EF4-FFF2-40B4-BE49-F238E27FC236}">
+                <a16:creationId xmlns:a16="http://schemas.microsoft.com/office/drawing/2014/main" id="{BA1C26B1-4AE2-401B-8DD0-5EE7C03BC070}"/>
               </a:ext>
             </a:extLst>
           </p:cNvPr>
@@ -4187,7 +4726,7 @@
           <p:nvPr/>
         </p:nvPicPr>
         <p:blipFill>
-          <a:blip r:embed="rId2">
+          <a:blip r:embed="rId3">
             <a:extLst>
               <a:ext uri="{28A0092B-C50C-407E-A947-70E740481C1C}">
                 <a14:useLocalDpi xmlns:a14="http://schemas.microsoft.com/office/drawing/2010/main" val="0"/>
@@ -4200,187 +4739,54 @@
         </p:blipFill>
         <p:spPr>
           <a:xfrm>
-            <a:off x="10286734" y="-387713"/>
-            <a:ext cx="1905266" cy="1905266"/>
+            <a:off x="8748558" y="3733800"/>
+            <a:ext cx="2716040" cy="3200400"/>
           </a:xfrm>
           <a:prstGeom prst="rect">
             <a:avLst/>
           </a:prstGeom>
         </p:spPr>
       </p:pic>
-      <p:sp>
-        <p:nvSpPr>
-          <p:cNvPr id="7" name="Título 1">
-            <a:extLst>
-              <a:ext uri="{FF2B5EF4-FFF2-40B4-BE49-F238E27FC236}">
-                <a16:creationId xmlns:a16="http://schemas.microsoft.com/office/drawing/2014/main" id="{5ABAEEBF-E8EA-48ED-A9D5-D5A1A7CBD0FD}"/>
-              </a:ext>
-            </a:extLst>
-          </p:cNvPr>
-          <p:cNvSpPr txBox="1">
-            <a:spLocks/>
-          </p:cNvSpPr>
-          <p:nvPr/>
-        </p:nvSpPr>
-        <p:spPr>
-          <a:xfrm>
-            <a:off x="344875" y="1533424"/>
-            <a:ext cx="8838882" cy="3522455"/>
-          </a:xfrm>
-          <a:prstGeom prst="rect">
-            <a:avLst/>
-          </a:prstGeom>
-        </p:spPr>
-        <p:txBody>
-          <a:bodyPr vert="horz" lIns="91440" tIns="45720" rIns="91440" bIns="45720" rtlCol="0" anchor="ctr">
-            <a:normAutofit fontScale="97500"/>
-          </a:bodyPr>
-          <a:lstStyle>
-            <a:lvl1pPr algn="l" defTabSz="914400" rtl="0" eaLnBrk="1" latinLnBrk="0" hangingPunct="1">
-              <a:lnSpc>
-                <a:spcPct val="90000"/>
-              </a:lnSpc>
-              <a:spcBef>
-                <a:spcPct val="0"/>
-              </a:spcBef>
-              <a:buNone/>
-              <a:defRPr sz="4400" kern="1200">
-                <a:solidFill>
-                  <a:schemeClr val="tx1"/>
-                </a:solidFill>
-                <a:latin typeface="+mj-lt"/>
-                <a:ea typeface="+mj-ea"/>
-                <a:cs typeface="+mj-cs"/>
-              </a:defRPr>
-            </a:lvl1pPr>
-          </a:lstStyle>
-          <a:p>
-            <a:pPr marL="342900" indent="-342900">
-              <a:buFont typeface="Arial" panose="020B0604020202020204" pitchFamily="34" charset="0"/>
-              <a:buChar char="•"/>
-            </a:pPr>
-            <a:r>
-              <a:rPr lang="pt-BR" sz="2800" dirty="0">
-                <a:solidFill>
-                  <a:srgbClr val="4D3495"/>
-                </a:solidFill>
-                <a:latin typeface="Dubai Medium" panose="020B0603030403030204" pitchFamily="34" charset="-78"/>
-                <a:cs typeface="Dubai Medium" panose="020B0603030403030204" pitchFamily="34" charset="-78"/>
-              </a:rPr>
-              <a:t>O que é um “RPA”?</a:t>
-            </a:r>
-          </a:p>
-          <a:p>
-            <a:pPr marL="342900" indent="-342900">
-              <a:buFont typeface="Arial" panose="020B0604020202020204" pitchFamily="34" charset="0"/>
-              <a:buChar char="•"/>
-            </a:pPr>
-            <a:endParaRPr lang="pt-BR" sz="2800" dirty="0">
-              <a:solidFill>
-                <a:srgbClr val="4D3495"/>
-              </a:solidFill>
-              <a:latin typeface="Dubai Medium" panose="020B0603030403030204" pitchFamily="34" charset="-78"/>
-              <a:cs typeface="Dubai Medium" panose="020B0603030403030204" pitchFamily="34" charset="-78"/>
-            </a:endParaRPr>
-          </a:p>
-          <a:p>
-            <a:pPr marL="342900" indent="-342900">
-              <a:buFont typeface="Arial" panose="020B0604020202020204" pitchFamily="34" charset="0"/>
-              <a:buChar char="•"/>
-            </a:pPr>
-            <a:r>
-              <a:rPr lang="pt-BR" sz="2800" dirty="0">
-                <a:solidFill>
-                  <a:srgbClr val="4D3495"/>
-                </a:solidFill>
-                <a:latin typeface="Dubai Medium" panose="020B0603030403030204" pitchFamily="34" charset="-78"/>
-                <a:cs typeface="Dubai Medium" panose="020B0603030403030204" pitchFamily="34" charset="-78"/>
-              </a:rPr>
-              <a:t>A importância do RPA no mercado</a:t>
-            </a:r>
-          </a:p>
-          <a:p>
-            <a:pPr marL="342900" indent="-342900">
-              <a:buFont typeface="Arial" panose="020B0604020202020204" pitchFamily="34" charset="0"/>
-              <a:buChar char="•"/>
-            </a:pPr>
-            <a:endParaRPr lang="pt-BR" sz="2800" dirty="0">
-              <a:solidFill>
-                <a:srgbClr val="4D3495"/>
-              </a:solidFill>
-              <a:latin typeface="Dubai Medium" panose="020B0603030403030204" pitchFamily="34" charset="-78"/>
-              <a:cs typeface="Dubai Medium" panose="020B0603030403030204" pitchFamily="34" charset="-78"/>
-            </a:endParaRPr>
-          </a:p>
-          <a:p>
-            <a:pPr marL="342900" indent="-342900">
-              <a:buFont typeface="Arial" panose="020B0604020202020204" pitchFamily="34" charset="0"/>
-              <a:buChar char="•"/>
-            </a:pPr>
-            <a:r>
-              <a:rPr lang="pt-BR" sz="2800" dirty="0">
-                <a:solidFill>
-                  <a:srgbClr val="4D3495"/>
-                </a:solidFill>
-                <a:latin typeface="Dubai Medium" panose="020B0603030403030204" pitchFamily="34" charset="-78"/>
-                <a:cs typeface="Dubai Medium" panose="020B0603030403030204" pitchFamily="34" charset="-78"/>
-              </a:rPr>
-              <a:t>Como o RPA fez a diferença em nossa empresa</a:t>
-            </a:r>
-          </a:p>
-        </p:txBody>
-      </p:sp>
       <p:pic>
         <p:nvPicPr>
-          <p:cNvPr id="1026" name="Picture 2" descr="PRTi Digital: Parceiro Autorizado da UiPath no Brasil - PRTi Digital">
-            <a:extLst>
-              <a:ext uri="{FF2B5EF4-FFF2-40B4-BE49-F238E27FC236}">
-                <a16:creationId xmlns:a16="http://schemas.microsoft.com/office/drawing/2014/main" id="{41114AAA-660E-404C-B12E-B78F415A3FF9}"/>
+          <p:cNvPr id="11" name="Espaço Reservado para Conteúdo 5" descr="Uma imagem contendo desenho&#10;&#10;Descrição gerada automaticamente">
+            <a:extLst>
+              <a:ext uri="{FF2B5EF4-FFF2-40B4-BE49-F238E27FC236}">
+                <a16:creationId xmlns:a16="http://schemas.microsoft.com/office/drawing/2014/main" id="{FA212766-4571-40CD-B384-D4F3FF0E2A39}"/>
               </a:ext>
             </a:extLst>
           </p:cNvPr>
           <p:cNvPicPr>
-            <a:picLocks noChangeAspect="1" noChangeArrowheads="1"/>
+            <a:picLocks noChangeAspect="1"/>
           </p:cNvPicPr>
           <p:nvPr/>
         </p:nvPicPr>
         <p:blipFill>
-          <a:blip r:embed="rId3">
+          <a:blip r:embed="rId4">
             <a:extLst>
               <a:ext uri="{28A0092B-C50C-407E-A947-70E740481C1C}">
                 <a14:useLocalDpi xmlns:a14="http://schemas.microsoft.com/office/drawing/2010/main" val="0"/>
               </a:ext>
             </a:extLst>
           </a:blip>
-          <a:srcRect/>
           <a:stretch>
             <a:fillRect/>
           </a:stretch>
         </p:blipFill>
-        <p:spPr bwMode="auto">
-          <a:xfrm>
-            <a:off x="8082766" y="2036588"/>
-            <a:ext cx="3764359" cy="1362698"/>
+        <p:spPr>
+          <a:xfrm>
+            <a:off x="10286734" y="-387713"/>
+            <a:ext cx="1905266" cy="1905266"/>
           </a:xfrm>
           <a:prstGeom prst="rect">
             <a:avLst/>
           </a:prstGeom>
-          <a:noFill/>
-          <a:extLst>
-            <a:ext uri="{909E8E84-426E-40DD-AFC4-6F175D3DCCD1}">
-              <a14:hiddenFill xmlns:a14="http://schemas.microsoft.com/office/drawing/2010/main">
-                <a:solidFill>
-                  <a:srgbClr val="FFFFFF"/>
-                </a:solidFill>
-              </a14:hiddenFill>
-            </a:ext>
-          </a:extLst>
         </p:spPr>
       </p:pic>
     </p:spTree>
     <p:extLst>
       <p:ext uri="{BB962C8B-B14F-4D97-AF65-F5344CB8AC3E}">
-        <p14:creationId xmlns:p14="http://schemas.microsoft.com/office/powerpoint/2010/main" val="3480676095"/>
+        <p14:creationId xmlns:p14="http://schemas.microsoft.com/office/powerpoint/2010/main" val="514807920"/>
       </p:ext>
     </p:extLst>
   </p:cSld>
@@ -4407,254 +4813,6 @@
           <a:chExt cx="0" cy="0"/>
         </a:xfrm>
       </p:grpSpPr>
-      <p:sp>
-        <p:nvSpPr>
-          <p:cNvPr id="2" name="Título 1">
-            <a:extLst>
-              <a:ext uri="{FF2B5EF4-FFF2-40B4-BE49-F238E27FC236}">
-                <a16:creationId xmlns:a16="http://schemas.microsoft.com/office/drawing/2014/main" id="{BE6D8F10-9168-4897-A64A-2723EE6250FA}"/>
-              </a:ext>
-            </a:extLst>
-          </p:cNvPr>
-          <p:cNvSpPr>
-            <a:spLocks noGrp="1"/>
-          </p:cNvSpPr>
-          <p:nvPr>
-            <p:ph type="title"/>
-          </p:nvPr>
-        </p:nvSpPr>
-        <p:spPr>
-          <a:xfrm>
-            <a:off x="454478" y="419099"/>
-            <a:ext cx="4498522" cy="790577"/>
-          </a:xfrm>
-        </p:spPr>
-        <p:txBody>
-          <a:bodyPr>
-            <a:normAutofit/>
-          </a:bodyPr>
-          <a:lstStyle/>
-          <a:p>
-            <a:r>
-              <a:rPr lang="pt-BR" sz="3200" dirty="0">
-                <a:solidFill>
-                  <a:srgbClr val="4DB033"/>
-                </a:solidFill>
-                <a:latin typeface="Dubai Medium" panose="020B0603030403030204" pitchFamily="34" charset="-78"/>
-                <a:cs typeface="Dubai Medium" panose="020B0603030403030204" pitchFamily="34" charset="-78"/>
-              </a:rPr>
-              <a:t>Virtual </a:t>
-            </a:r>
-            <a:r>
-              <a:rPr lang="pt-BR" sz="3200" dirty="0" err="1">
-                <a:solidFill>
-                  <a:srgbClr val="4DB033"/>
-                </a:solidFill>
-                <a:latin typeface="Dubai Medium" panose="020B0603030403030204" pitchFamily="34" charset="-78"/>
-                <a:cs typeface="Dubai Medium" panose="020B0603030403030204" pitchFamily="34" charset="-78"/>
-              </a:rPr>
-              <a:t>Machine</a:t>
-            </a:r>
-            <a:r>
-              <a:rPr lang="pt-BR" sz="3200" dirty="0">
-                <a:solidFill>
-                  <a:srgbClr val="4DB033"/>
-                </a:solidFill>
-                <a:latin typeface="Dubai Medium" panose="020B0603030403030204" pitchFamily="34" charset="-78"/>
-                <a:cs typeface="Dubai Medium" panose="020B0603030403030204" pitchFamily="34" charset="-78"/>
-              </a:rPr>
-              <a:t> - Linux</a:t>
-            </a:r>
-          </a:p>
-        </p:txBody>
-      </p:sp>
-      <p:pic>
-        <p:nvPicPr>
-          <p:cNvPr id="7" name="Espaço Reservado para Conteúdo 6" descr="Tela de computador com fundo azul&#10;&#10;Descrição gerada automaticamente">
-            <a:extLst>
-              <a:ext uri="{FF2B5EF4-FFF2-40B4-BE49-F238E27FC236}">
-                <a16:creationId xmlns:a16="http://schemas.microsoft.com/office/drawing/2014/main" id="{DE1D7D90-463E-4A07-BEEA-48DC9239D3D3}"/>
-              </a:ext>
-            </a:extLst>
-          </p:cNvPr>
-          <p:cNvPicPr>
-            <a:picLocks noGrp="1" noChangeAspect="1"/>
-          </p:cNvPicPr>
-          <p:nvPr>
-            <p:ph idx="1"/>
-          </p:nvPr>
-        </p:nvPicPr>
-        <p:blipFill>
-          <a:blip r:embed="rId2">
-            <a:extLst>
-              <a:ext uri="{28A0092B-C50C-407E-A947-70E740481C1C}">
-                <a14:useLocalDpi xmlns:a14="http://schemas.microsoft.com/office/drawing/2010/main" val="0"/>
-              </a:ext>
-            </a:extLst>
-          </a:blip>
-          <a:stretch>
-            <a:fillRect/>
-          </a:stretch>
-        </p:blipFill>
-        <p:spPr>
-          <a:xfrm>
-            <a:off x="1588780" y="1209688"/>
-            <a:ext cx="8366740" cy="5229213"/>
-          </a:xfrm>
-        </p:spPr>
-      </p:pic>
-      <p:cxnSp>
-        <p:nvCxnSpPr>
-          <p:cNvPr id="10" name="Conector reto 9">
-            <a:extLst>
-              <a:ext uri="{FF2B5EF4-FFF2-40B4-BE49-F238E27FC236}">
-                <a16:creationId xmlns:a16="http://schemas.microsoft.com/office/drawing/2014/main" id="{B0260FB3-F747-4ADD-A7B2-81FDF008C973}"/>
-              </a:ext>
-            </a:extLst>
-          </p:cNvPr>
-          <p:cNvCxnSpPr>
-            <a:cxnSpLocks/>
-          </p:cNvCxnSpPr>
-          <p:nvPr/>
-        </p:nvCxnSpPr>
-        <p:spPr>
-          <a:xfrm flipH="1">
-            <a:off x="2" y="981076"/>
-            <a:ext cx="4686298" cy="0"/>
-          </a:xfrm>
-          <a:prstGeom prst="line">
-            <a:avLst/>
-          </a:prstGeom>
-          <a:ln>
-            <a:solidFill>
-              <a:srgbClr val="6B1979"/>
-            </a:solidFill>
-          </a:ln>
-          <a:effectLst>
-            <a:glow rad="63500">
-              <a:srgbClr val="6B1979">
-                <a:alpha val="40000"/>
-              </a:srgbClr>
-            </a:glow>
-          </a:effectLst>
-        </p:spPr>
-        <p:style>
-          <a:lnRef idx="1">
-            <a:schemeClr val="accent1"/>
-          </a:lnRef>
-          <a:fillRef idx="0">
-            <a:schemeClr val="accent1"/>
-          </a:fillRef>
-          <a:effectRef idx="0">
-            <a:schemeClr val="accent1"/>
-          </a:effectRef>
-          <a:fontRef idx="minor">
-            <a:schemeClr val="tx1"/>
-          </a:fontRef>
-        </p:style>
-      </p:cxnSp>
-      <p:pic>
-        <p:nvPicPr>
-          <p:cNvPr id="9" name="Imagem 8" descr="Uma imagem contendo mesa, amarelo&#10;&#10;Descrição gerada automaticamente">
-            <a:extLst>
-              <a:ext uri="{FF2B5EF4-FFF2-40B4-BE49-F238E27FC236}">
-                <a16:creationId xmlns:a16="http://schemas.microsoft.com/office/drawing/2014/main" id="{BA1C26B1-4AE2-401B-8DD0-5EE7C03BC070}"/>
-              </a:ext>
-            </a:extLst>
-          </p:cNvPr>
-          <p:cNvPicPr>
-            <a:picLocks noChangeAspect="1"/>
-          </p:cNvPicPr>
-          <p:nvPr/>
-        </p:nvPicPr>
-        <p:blipFill>
-          <a:blip r:embed="rId3">
-            <a:extLst>
-              <a:ext uri="{28A0092B-C50C-407E-A947-70E740481C1C}">
-                <a14:useLocalDpi xmlns:a14="http://schemas.microsoft.com/office/drawing/2010/main" val="0"/>
-              </a:ext>
-            </a:extLst>
-          </a:blip>
-          <a:stretch>
-            <a:fillRect/>
-          </a:stretch>
-        </p:blipFill>
-        <p:spPr>
-          <a:xfrm>
-            <a:off x="8748558" y="3733800"/>
-            <a:ext cx="2716040" cy="3200400"/>
-          </a:xfrm>
-          <a:prstGeom prst="rect">
-            <a:avLst/>
-          </a:prstGeom>
-        </p:spPr>
-      </p:pic>
-      <p:pic>
-        <p:nvPicPr>
-          <p:cNvPr id="11" name="Espaço Reservado para Conteúdo 5" descr="Uma imagem contendo desenho&#10;&#10;Descrição gerada automaticamente">
-            <a:extLst>
-              <a:ext uri="{FF2B5EF4-FFF2-40B4-BE49-F238E27FC236}">
-                <a16:creationId xmlns:a16="http://schemas.microsoft.com/office/drawing/2014/main" id="{FA212766-4571-40CD-B384-D4F3FF0E2A39}"/>
-              </a:ext>
-            </a:extLst>
-          </p:cNvPr>
-          <p:cNvPicPr>
-            <a:picLocks noChangeAspect="1"/>
-          </p:cNvPicPr>
-          <p:nvPr/>
-        </p:nvPicPr>
-        <p:blipFill>
-          <a:blip r:embed="rId4">
-            <a:extLst>
-              <a:ext uri="{28A0092B-C50C-407E-A947-70E740481C1C}">
-                <a14:useLocalDpi xmlns:a14="http://schemas.microsoft.com/office/drawing/2010/main" val="0"/>
-              </a:ext>
-            </a:extLst>
-          </a:blip>
-          <a:stretch>
-            <a:fillRect/>
-          </a:stretch>
-        </p:blipFill>
-        <p:spPr>
-          <a:xfrm>
-            <a:off x="10286734" y="-387713"/>
-            <a:ext cx="1905266" cy="1905266"/>
-          </a:xfrm>
-          <a:prstGeom prst="rect">
-            <a:avLst/>
-          </a:prstGeom>
-        </p:spPr>
-      </p:pic>
-    </p:spTree>
-    <p:extLst>
-      <p:ext uri="{BB962C8B-B14F-4D97-AF65-F5344CB8AC3E}">
-        <p14:creationId xmlns:p14="http://schemas.microsoft.com/office/powerpoint/2010/main" val="514807920"/>
-      </p:ext>
-    </p:extLst>
-  </p:cSld>
-  <p:clrMapOvr>
-    <a:masterClrMapping/>
-  </p:clrMapOvr>
-</p:sld>
-</file>
-
-<file path=ppt/slides/slide14.xml><?xml version="1.0" encoding="utf-8"?>
-<p:sld xmlns:a="http://schemas.openxmlformats.org/drawingml/2006/main" xmlns:r="http://schemas.openxmlformats.org/officeDocument/2006/relationships" xmlns:p="http://schemas.openxmlformats.org/presentationml/2006/main">
-  <p:cSld>
-    <p:spTree>
-      <p:nvGrpSpPr>
-        <p:cNvPr id="1" name=""/>
-        <p:cNvGrpSpPr/>
-        <p:nvPr/>
-      </p:nvGrpSpPr>
-      <p:grpSpPr>
-        <a:xfrm>
-          <a:off x="0" y="0"/>
-          <a:ext cx="0" cy="0"/>
-          <a:chOff x="0" y="0"/>
-          <a:chExt cx="0" cy="0"/>
-        </a:xfrm>
-      </p:grpSpPr>
       <p:pic>
         <p:nvPicPr>
           <p:cNvPr id="10" name="Espaço Reservado para Conteúdo 9" descr="Uma imagem contendo desenho, placar&#10;&#10;Descrição gerada automaticamente">
@@ -4849,7 +5007,7 @@
 </p:sld>
 </file>
 
-<file path=ppt/slides/slide15.xml><?xml version="1.0" encoding="utf-8"?>
+<file path=ppt/slides/slide14.xml><?xml version="1.0" encoding="utf-8"?>
 <p:sld xmlns:a="http://schemas.openxmlformats.org/drawingml/2006/main" xmlns:r="http://schemas.openxmlformats.org/officeDocument/2006/relationships" xmlns:p="http://schemas.openxmlformats.org/presentationml/2006/main">
   <p:cSld>
     <p:spTree>
@@ -5011,7 +5169,7 @@
 </p:sld>
 </file>
 
-<file path=ppt/slides/slide16.xml><?xml version="1.0" encoding="utf-8"?>
+<file path=ppt/slides/slide15.xml><?xml version="1.0" encoding="utf-8"?>
 <p:sld xmlns:a="http://schemas.openxmlformats.org/drawingml/2006/main" xmlns:r="http://schemas.openxmlformats.org/officeDocument/2006/relationships" xmlns:p="http://schemas.openxmlformats.org/presentationml/2006/main">
   <p:cSld>
     <p:spTree>
@@ -5234,7 +5392,7 @@
 </p:sld>
 </file>
 
-<file path=ppt/slides/slide17.xml><?xml version="1.0" encoding="utf-8"?>
+<file path=ppt/slides/slide16.xml><?xml version="1.0" encoding="utf-8"?>
 <p:sld xmlns:a="http://schemas.openxmlformats.org/drawingml/2006/main" xmlns:r="http://schemas.openxmlformats.org/officeDocument/2006/relationships" xmlns:p="http://schemas.openxmlformats.org/presentationml/2006/main">
   <p:cSld>
     <p:spTree>
@@ -5535,7 +5693,7 @@
 </p:sld>
 </file>
 
-<file path=ppt/slides/slide18.xml><?xml version="1.0" encoding="utf-8"?>
+<file path=ppt/slides/slide17.xml><?xml version="1.0" encoding="utf-8"?>
 <p:sld xmlns:a="http://schemas.openxmlformats.org/drawingml/2006/main" xmlns:r="http://schemas.openxmlformats.org/officeDocument/2006/relationships" xmlns:p="http://schemas.openxmlformats.org/presentationml/2006/main">
   <p:cSld>
     <p:spTree>
@@ -5717,7 +5875,7 @@
 </p:sld>
 </file>
 
-<file path=ppt/slides/slide19.xml><?xml version="1.0" encoding="utf-8"?>
+<file path=ppt/slides/slide18.xml><?xml version="1.0" encoding="utf-8"?>
 <p:sld xmlns:a="http://schemas.openxmlformats.org/drawingml/2006/main" xmlns:r="http://schemas.openxmlformats.org/officeDocument/2006/relationships" xmlns:p="http://schemas.openxmlformats.org/presentationml/2006/main">
   <p:cSld>
     <p:spTree>
@@ -9787,6 +9945,874 @@
         </p:nvSpPr>
         <p:spPr>
           <a:xfrm>
+            <a:off x="454478" y="450851"/>
+            <a:ext cx="4682497" cy="758825"/>
+          </a:xfrm>
+        </p:spPr>
+        <p:txBody>
+          <a:bodyPr>
+            <a:noAutofit/>
+          </a:bodyPr>
+          <a:lstStyle/>
+          <a:p>
+            <a:r>
+              <a:rPr lang="pt-BR" sz="3600" dirty="0">
+                <a:solidFill>
+                  <a:srgbClr val="4DB033"/>
+                </a:solidFill>
+                <a:latin typeface="Dubai Medium" panose="020B0603030403030204" pitchFamily="34" charset="-78"/>
+                <a:cs typeface="Dubai Medium" panose="020B0603030403030204" pitchFamily="34" charset="-78"/>
+              </a:rPr>
+              <a:t>Organização do Projeto</a:t>
+            </a:r>
+          </a:p>
+        </p:txBody>
+      </p:sp>
+      <p:pic>
+        <p:nvPicPr>
+          <p:cNvPr id="6" name="Espaço Reservado para Conteúdo 5" descr="Uma imagem contendo desenho&#10;&#10;Descrição gerada automaticamente">
+            <a:extLst>
+              <a:ext uri="{FF2B5EF4-FFF2-40B4-BE49-F238E27FC236}">
+                <a16:creationId xmlns:a16="http://schemas.microsoft.com/office/drawing/2014/main" id="{2791291C-2F25-4C38-8180-07D1AFDDB93F}"/>
+              </a:ext>
+            </a:extLst>
+          </p:cNvPr>
+          <p:cNvPicPr>
+            <a:picLocks noGrp="1" noChangeAspect="1"/>
+          </p:cNvPicPr>
+          <p:nvPr>
+            <p:ph idx="1"/>
+          </p:nvPr>
+        </p:nvPicPr>
+        <p:blipFill>
+          <a:blip r:embed="rId2">
+            <a:extLst>
+              <a:ext uri="{28A0092B-C50C-407E-A947-70E740481C1C}">
+                <a14:useLocalDpi xmlns:a14="http://schemas.microsoft.com/office/drawing/2010/main" val="0"/>
+              </a:ext>
+            </a:extLst>
+          </a:blip>
+          <a:stretch>
+            <a:fillRect/>
+          </a:stretch>
+        </p:blipFill>
+        <p:spPr>
+          <a:xfrm>
+            <a:off x="10286734" y="-387713"/>
+            <a:ext cx="1905266" cy="1905266"/>
+          </a:xfrm>
+        </p:spPr>
+      </p:pic>
+      <p:cxnSp>
+        <p:nvCxnSpPr>
+          <p:cNvPr id="10" name="Conector reto 9">
+            <a:extLst>
+              <a:ext uri="{FF2B5EF4-FFF2-40B4-BE49-F238E27FC236}">
+                <a16:creationId xmlns:a16="http://schemas.microsoft.com/office/drawing/2014/main" id="{B0260FB3-F747-4ADD-A7B2-81FDF008C973}"/>
+              </a:ext>
+            </a:extLst>
+          </p:cNvPr>
+          <p:cNvCxnSpPr>
+            <a:cxnSpLocks/>
+          </p:cNvCxnSpPr>
+          <p:nvPr/>
+        </p:nvCxnSpPr>
+        <p:spPr>
+          <a:xfrm flipH="1">
+            <a:off x="2" y="981076"/>
+            <a:ext cx="4114798" cy="0"/>
+          </a:xfrm>
+          <a:prstGeom prst="line">
+            <a:avLst/>
+          </a:prstGeom>
+          <a:ln>
+            <a:solidFill>
+              <a:srgbClr val="6B1979"/>
+            </a:solidFill>
+          </a:ln>
+          <a:effectLst>
+            <a:glow rad="63500">
+              <a:srgbClr val="6B1979">
+                <a:alpha val="40000"/>
+              </a:srgbClr>
+            </a:glow>
+          </a:effectLst>
+        </p:spPr>
+        <p:style>
+          <a:lnRef idx="1">
+            <a:schemeClr val="accent1"/>
+          </a:lnRef>
+          <a:fillRef idx="0">
+            <a:schemeClr val="accent1"/>
+          </a:fillRef>
+          <a:effectRef idx="0">
+            <a:schemeClr val="accent1"/>
+          </a:effectRef>
+          <a:fontRef idx="minor">
+            <a:schemeClr val="tx1"/>
+          </a:fontRef>
+        </p:style>
+      </p:cxnSp>
+      <p:sp>
+        <p:nvSpPr>
+          <p:cNvPr id="7" name="Título 1">
+            <a:extLst>
+              <a:ext uri="{FF2B5EF4-FFF2-40B4-BE49-F238E27FC236}">
+                <a16:creationId xmlns:a16="http://schemas.microsoft.com/office/drawing/2014/main" id="{3B5F7E5F-06FD-456D-A021-4E43B3F578DE}"/>
+              </a:ext>
+            </a:extLst>
+          </p:cNvPr>
+          <p:cNvSpPr txBox="1">
+            <a:spLocks/>
+          </p:cNvSpPr>
+          <p:nvPr/>
+        </p:nvSpPr>
+        <p:spPr>
+          <a:xfrm>
+            <a:off x="940041" y="3517849"/>
+            <a:ext cx="1396971" cy="622853"/>
+          </a:xfrm>
+          <a:prstGeom prst="rect">
+            <a:avLst/>
+          </a:prstGeom>
+        </p:spPr>
+        <p:txBody>
+          <a:bodyPr vert="horz" lIns="91440" tIns="45720" rIns="91440" bIns="45720" rtlCol="0" anchor="ctr">
+            <a:noAutofit/>
+          </a:bodyPr>
+          <a:lstStyle>
+            <a:lvl1pPr algn="l" defTabSz="914400" rtl="0" eaLnBrk="1" latinLnBrk="0" hangingPunct="1">
+              <a:lnSpc>
+                <a:spcPct val="90000"/>
+              </a:lnSpc>
+              <a:spcBef>
+                <a:spcPct val="0"/>
+              </a:spcBef>
+              <a:buNone/>
+              <a:defRPr sz="4400" kern="1200">
+                <a:solidFill>
+                  <a:schemeClr val="tx1"/>
+                </a:solidFill>
+                <a:latin typeface="+mj-lt"/>
+                <a:ea typeface="+mj-ea"/>
+                <a:cs typeface="+mj-cs"/>
+              </a:defRPr>
+            </a:lvl1pPr>
+          </a:lstStyle>
+          <a:p>
+            <a:pPr marL="342900" indent="-342900">
+              <a:buFont typeface="Arial" panose="020B0604020202020204" pitchFamily="34" charset="0"/>
+              <a:buChar char="•"/>
+            </a:pPr>
+            <a:r>
+              <a:rPr lang="pt-BR" sz="2000" dirty="0" err="1">
+                <a:solidFill>
+                  <a:srgbClr val="B02F75"/>
+                </a:solidFill>
+                <a:latin typeface="Dubai Medium" panose="020B0603030403030204" pitchFamily="34" charset="-78"/>
+                <a:cs typeface="Dubai Medium" panose="020B0603030403030204" pitchFamily="34" charset="-78"/>
+              </a:rPr>
+              <a:t>Kanban</a:t>
+            </a:r>
+            <a:endParaRPr lang="pt-BR" sz="2000" dirty="0">
+              <a:solidFill>
+                <a:srgbClr val="B02F75"/>
+              </a:solidFill>
+              <a:latin typeface="Dubai Medium" panose="020B0603030403030204" pitchFamily="34" charset="-78"/>
+              <a:cs typeface="Dubai Medium" panose="020B0603030403030204" pitchFamily="34" charset="-78"/>
+            </a:endParaRPr>
+          </a:p>
+        </p:txBody>
+      </p:sp>
+      <p:sp>
+        <p:nvSpPr>
+          <p:cNvPr id="9" name="Título 1">
+            <a:extLst>
+              <a:ext uri="{FF2B5EF4-FFF2-40B4-BE49-F238E27FC236}">
+                <a16:creationId xmlns:a16="http://schemas.microsoft.com/office/drawing/2014/main" id="{B3E1F8AF-9C2D-4A4A-B128-57FA6CB66969}"/>
+              </a:ext>
+            </a:extLst>
+          </p:cNvPr>
+          <p:cNvSpPr txBox="1">
+            <a:spLocks/>
+          </p:cNvSpPr>
+          <p:nvPr/>
+        </p:nvSpPr>
+        <p:spPr>
+          <a:xfrm>
+            <a:off x="454477" y="2265139"/>
+            <a:ext cx="5641523" cy="758826"/>
+          </a:xfrm>
+          <a:prstGeom prst="rect">
+            <a:avLst/>
+          </a:prstGeom>
+        </p:spPr>
+        <p:txBody>
+          <a:bodyPr vert="horz" lIns="91440" tIns="45720" rIns="91440" bIns="45720" rtlCol="0" anchor="ctr">
+            <a:normAutofit fontScale="97500"/>
+          </a:bodyPr>
+          <a:lstStyle>
+            <a:lvl1pPr algn="l" defTabSz="914400" rtl="0" eaLnBrk="1" latinLnBrk="0" hangingPunct="1">
+              <a:lnSpc>
+                <a:spcPct val="90000"/>
+              </a:lnSpc>
+              <a:spcBef>
+                <a:spcPct val="0"/>
+              </a:spcBef>
+              <a:buNone/>
+              <a:defRPr sz="4400" kern="1200">
+                <a:solidFill>
+                  <a:schemeClr val="tx1"/>
+                </a:solidFill>
+                <a:latin typeface="+mj-lt"/>
+                <a:ea typeface="+mj-ea"/>
+                <a:cs typeface="+mj-cs"/>
+              </a:defRPr>
+            </a:lvl1pPr>
+          </a:lstStyle>
+          <a:p>
+            <a:pPr marL="342900" indent="-342900">
+              <a:buFont typeface="Arial" panose="020B0604020202020204" pitchFamily="34" charset="0"/>
+              <a:buChar char="•"/>
+            </a:pPr>
+            <a:r>
+              <a:rPr lang="pt-BR" sz="2800" dirty="0">
+                <a:solidFill>
+                  <a:srgbClr val="4D3495"/>
+                </a:solidFill>
+                <a:latin typeface="Dubai Medium" panose="020B0603030403030204" pitchFamily="34" charset="-78"/>
+                <a:cs typeface="Dubai Medium" panose="020B0603030403030204" pitchFamily="34" charset="-78"/>
+              </a:rPr>
+              <a:t>Metodologia e especificação</a:t>
+            </a:r>
+          </a:p>
+        </p:txBody>
+      </p:sp>
+      <p:pic>
+        <p:nvPicPr>
+          <p:cNvPr id="13" name="Imagem 12">
+            <a:extLst>
+              <a:ext uri="{FF2B5EF4-FFF2-40B4-BE49-F238E27FC236}">
+                <a16:creationId xmlns:a16="http://schemas.microsoft.com/office/drawing/2014/main" id="{664E6004-83C7-4B41-86A9-6D389EDE7A43}"/>
+              </a:ext>
+            </a:extLst>
+          </p:cNvPr>
+          <p:cNvPicPr>
+            <a:picLocks noChangeAspect="1"/>
+          </p:cNvPicPr>
+          <p:nvPr/>
+        </p:nvPicPr>
+        <p:blipFill>
+          <a:blip r:embed="rId3">
+            <a:extLst>
+              <a:ext uri="{28A0092B-C50C-407E-A947-70E740481C1C}">
+                <a14:useLocalDpi xmlns:a14="http://schemas.microsoft.com/office/drawing/2010/main" val="0"/>
+              </a:ext>
+            </a:extLst>
+          </a:blip>
+          <a:stretch>
+            <a:fillRect/>
+          </a:stretch>
+        </p:blipFill>
+        <p:spPr>
+          <a:xfrm>
+            <a:off x="5559305" y="3006637"/>
+            <a:ext cx="1522683" cy="1522683"/>
+          </a:xfrm>
+          <a:prstGeom prst="rect">
+            <a:avLst/>
+          </a:prstGeom>
+        </p:spPr>
+      </p:pic>
+      <p:pic>
+        <p:nvPicPr>
+          <p:cNvPr id="15" name="Imagem 14" descr="Tela de computador com texto preto sobre fundo branco&#10;&#10;Descrição gerada automaticamente">
+            <a:extLst>
+              <a:ext uri="{FF2B5EF4-FFF2-40B4-BE49-F238E27FC236}">
+                <a16:creationId xmlns:a16="http://schemas.microsoft.com/office/drawing/2014/main" id="{840A4703-1C9D-45D8-A2E8-692A55113BF0}"/>
+              </a:ext>
+            </a:extLst>
+          </p:cNvPr>
+          <p:cNvPicPr>
+            <a:picLocks noChangeAspect="1"/>
+          </p:cNvPicPr>
+          <p:nvPr/>
+        </p:nvPicPr>
+        <p:blipFill>
+          <a:blip r:embed="rId4">
+            <a:extLst>
+              <a:ext uri="{28A0092B-C50C-407E-A947-70E740481C1C}">
+                <a14:useLocalDpi xmlns:a14="http://schemas.microsoft.com/office/drawing/2010/main" val="0"/>
+              </a:ext>
+            </a:extLst>
+          </a:blip>
+          <a:stretch>
+            <a:fillRect/>
+          </a:stretch>
+        </p:blipFill>
+        <p:spPr>
+          <a:xfrm>
+            <a:off x="8889763" y="2954556"/>
+            <a:ext cx="1396971" cy="1396971"/>
+          </a:xfrm>
+          <a:prstGeom prst="rect">
+            <a:avLst/>
+          </a:prstGeom>
+        </p:spPr>
+      </p:pic>
+      <p:pic>
+        <p:nvPicPr>
+          <p:cNvPr id="18" name="Imagem 17" descr="Desenho preto e branco&#10;&#10;Descrição gerada automaticamente">
+            <a:extLst>
+              <a:ext uri="{FF2B5EF4-FFF2-40B4-BE49-F238E27FC236}">
+                <a16:creationId xmlns:a16="http://schemas.microsoft.com/office/drawing/2014/main" id="{FAE33A2A-0055-4879-8B3D-9AB9AF4EF924}"/>
+              </a:ext>
+            </a:extLst>
+          </p:cNvPr>
+          <p:cNvPicPr>
+            <a:picLocks noChangeAspect="1"/>
+          </p:cNvPicPr>
+          <p:nvPr/>
+        </p:nvPicPr>
+        <p:blipFill>
+          <a:blip r:embed="rId5">
+            <a:extLst>
+              <a:ext uri="{28A0092B-C50C-407E-A947-70E740481C1C}">
+                <a14:useLocalDpi xmlns:a14="http://schemas.microsoft.com/office/drawing/2010/main" val="0"/>
+              </a:ext>
+            </a:extLst>
+          </a:blip>
+          <a:stretch>
+            <a:fillRect/>
+          </a:stretch>
+        </p:blipFill>
+        <p:spPr>
+          <a:xfrm>
+            <a:off x="8321531" y="1163546"/>
+            <a:ext cx="1266716" cy="1298517"/>
+          </a:xfrm>
+          <a:prstGeom prst="rect">
+            <a:avLst/>
+          </a:prstGeom>
+        </p:spPr>
+      </p:pic>
+      <p:sp>
+        <p:nvSpPr>
+          <p:cNvPr id="19" name="Título 1">
+            <a:extLst>
+              <a:ext uri="{FF2B5EF4-FFF2-40B4-BE49-F238E27FC236}">
+                <a16:creationId xmlns:a16="http://schemas.microsoft.com/office/drawing/2014/main" id="{E17DFFA1-7804-47BA-AADD-CF79917C97E2}"/>
+              </a:ext>
+            </a:extLst>
+          </p:cNvPr>
+          <p:cNvSpPr txBox="1">
+            <a:spLocks/>
+          </p:cNvSpPr>
+          <p:nvPr/>
+        </p:nvSpPr>
+        <p:spPr>
+          <a:xfrm>
+            <a:off x="538122" y="1507734"/>
+            <a:ext cx="5641523" cy="758826"/>
+          </a:xfrm>
+          <a:prstGeom prst="rect">
+            <a:avLst/>
+          </a:prstGeom>
+        </p:spPr>
+        <p:txBody>
+          <a:bodyPr vert="horz" lIns="91440" tIns="45720" rIns="91440" bIns="45720" rtlCol="0" anchor="ctr">
+            <a:normAutofit fontScale="97500"/>
+          </a:bodyPr>
+          <a:lstStyle>
+            <a:lvl1pPr algn="l" defTabSz="914400" rtl="0" eaLnBrk="1" latinLnBrk="0" hangingPunct="1">
+              <a:lnSpc>
+                <a:spcPct val="90000"/>
+              </a:lnSpc>
+              <a:spcBef>
+                <a:spcPct val="0"/>
+              </a:spcBef>
+              <a:buNone/>
+              <a:defRPr sz="4400" kern="1200">
+                <a:solidFill>
+                  <a:schemeClr val="tx1"/>
+                </a:solidFill>
+                <a:latin typeface="+mj-lt"/>
+                <a:ea typeface="+mj-ea"/>
+                <a:cs typeface="+mj-cs"/>
+              </a:defRPr>
+            </a:lvl1pPr>
+          </a:lstStyle>
+          <a:p>
+            <a:pPr marL="342900" indent="-342900">
+              <a:buFont typeface="Arial" panose="020B0604020202020204" pitchFamily="34" charset="0"/>
+              <a:buChar char="•"/>
+            </a:pPr>
+            <a:r>
+              <a:rPr lang="pt-BR" sz="2800" dirty="0">
+                <a:solidFill>
+                  <a:srgbClr val="4D3495"/>
+                </a:solidFill>
+                <a:latin typeface="Dubai Medium" panose="020B0603030403030204" pitchFamily="34" charset="-78"/>
+                <a:cs typeface="Dubai Medium" panose="020B0603030403030204" pitchFamily="34" charset="-78"/>
+              </a:rPr>
+              <a:t>GitHub</a:t>
+            </a:r>
+          </a:p>
+        </p:txBody>
+      </p:sp>
+      <p:sp>
+        <p:nvSpPr>
+          <p:cNvPr id="20" name="Título 1">
+            <a:extLst>
+              <a:ext uri="{FF2B5EF4-FFF2-40B4-BE49-F238E27FC236}">
+                <a16:creationId xmlns:a16="http://schemas.microsoft.com/office/drawing/2014/main" id="{1ED01C81-02A5-4ACF-9723-C0483241C695}"/>
+              </a:ext>
+            </a:extLst>
+          </p:cNvPr>
+          <p:cNvSpPr txBox="1">
+            <a:spLocks/>
+          </p:cNvSpPr>
+          <p:nvPr/>
+        </p:nvSpPr>
+        <p:spPr>
+          <a:xfrm>
+            <a:off x="518008" y="4737541"/>
+            <a:ext cx="4618968" cy="622853"/>
+          </a:xfrm>
+          <a:prstGeom prst="rect">
+            <a:avLst/>
+          </a:prstGeom>
+        </p:spPr>
+        <p:txBody>
+          <a:bodyPr vert="horz" lIns="91440" tIns="45720" rIns="91440" bIns="45720" rtlCol="0" anchor="ctr">
+            <a:noAutofit/>
+          </a:bodyPr>
+          <a:lstStyle>
+            <a:lvl1pPr algn="l" defTabSz="914400" rtl="0" eaLnBrk="1" latinLnBrk="0" hangingPunct="1">
+              <a:lnSpc>
+                <a:spcPct val="90000"/>
+              </a:lnSpc>
+              <a:spcBef>
+                <a:spcPct val="0"/>
+              </a:spcBef>
+              <a:buNone/>
+              <a:defRPr sz="4400" kern="1200">
+                <a:solidFill>
+                  <a:schemeClr val="tx1"/>
+                </a:solidFill>
+                <a:latin typeface="+mj-lt"/>
+                <a:ea typeface="+mj-ea"/>
+                <a:cs typeface="+mj-cs"/>
+              </a:defRPr>
+            </a:lvl1pPr>
+          </a:lstStyle>
+          <a:p>
+            <a:pPr marL="342900" indent="-342900">
+              <a:buFont typeface="Arial" panose="020B0604020202020204" pitchFamily="34" charset="0"/>
+              <a:buChar char="•"/>
+            </a:pPr>
+            <a:r>
+              <a:rPr lang="pt-BR" sz="2800" dirty="0">
+                <a:solidFill>
+                  <a:srgbClr val="4D3495"/>
+                </a:solidFill>
+                <a:latin typeface="Dubai Medium" panose="020B0603030403030204" pitchFamily="34" charset="-78"/>
+                <a:cs typeface="Dubai Medium" panose="020B0603030403030204" pitchFamily="34" charset="-78"/>
+              </a:rPr>
+              <a:t>Controle de Execução</a:t>
+            </a:r>
+          </a:p>
+        </p:txBody>
+      </p:sp>
+      <p:sp>
+        <p:nvSpPr>
+          <p:cNvPr id="22" name="Título 1">
+            <a:extLst>
+              <a:ext uri="{FF2B5EF4-FFF2-40B4-BE49-F238E27FC236}">
+                <a16:creationId xmlns:a16="http://schemas.microsoft.com/office/drawing/2014/main" id="{0F5474DC-6AEE-4124-9A0B-78C524B3A5DF}"/>
+              </a:ext>
+            </a:extLst>
+          </p:cNvPr>
+          <p:cNvSpPr txBox="1">
+            <a:spLocks/>
+          </p:cNvSpPr>
+          <p:nvPr/>
+        </p:nvSpPr>
+        <p:spPr>
+          <a:xfrm>
+            <a:off x="940043" y="5784296"/>
+            <a:ext cx="1396971" cy="622853"/>
+          </a:xfrm>
+          <a:prstGeom prst="rect">
+            <a:avLst/>
+          </a:prstGeom>
+        </p:spPr>
+        <p:txBody>
+          <a:bodyPr vert="horz" lIns="91440" tIns="45720" rIns="91440" bIns="45720" rtlCol="0" anchor="ctr">
+            <a:noAutofit/>
+          </a:bodyPr>
+          <a:lstStyle>
+            <a:lvl1pPr algn="l" defTabSz="914400" rtl="0" eaLnBrk="1" latinLnBrk="0" hangingPunct="1">
+              <a:lnSpc>
+                <a:spcPct val="90000"/>
+              </a:lnSpc>
+              <a:spcBef>
+                <a:spcPct val="0"/>
+              </a:spcBef>
+              <a:buNone/>
+              <a:defRPr sz="4400" kern="1200">
+                <a:solidFill>
+                  <a:schemeClr val="tx1"/>
+                </a:solidFill>
+                <a:latin typeface="+mj-lt"/>
+                <a:ea typeface="+mj-ea"/>
+                <a:cs typeface="+mj-cs"/>
+              </a:defRPr>
+            </a:lvl1pPr>
+          </a:lstStyle>
+          <a:p>
+            <a:pPr marL="342900" indent="-342900">
+              <a:buFont typeface="Arial" panose="020B0604020202020204" pitchFamily="34" charset="0"/>
+              <a:buChar char="•"/>
+            </a:pPr>
+            <a:r>
+              <a:rPr lang="pt-BR" sz="2000" dirty="0" err="1">
+                <a:solidFill>
+                  <a:srgbClr val="B02F75"/>
+                </a:solidFill>
+                <a:latin typeface="Dubai Medium" panose="020B0603030403030204" pitchFamily="34" charset="-78"/>
+                <a:cs typeface="Dubai Medium" panose="020B0603030403030204" pitchFamily="34" charset="-78"/>
+              </a:rPr>
+              <a:t>Discord</a:t>
+            </a:r>
+            <a:endParaRPr lang="pt-BR" sz="2000" dirty="0">
+              <a:solidFill>
+                <a:srgbClr val="B02F75"/>
+              </a:solidFill>
+              <a:latin typeface="Dubai Medium" panose="020B0603030403030204" pitchFamily="34" charset="-78"/>
+              <a:cs typeface="Dubai Medium" panose="020B0603030403030204" pitchFamily="34" charset="-78"/>
+            </a:endParaRPr>
+          </a:p>
+        </p:txBody>
+      </p:sp>
+      <p:pic>
+        <p:nvPicPr>
+          <p:cNvPr id="24" name="Imagem 23" descr="Uma imagem contendo chapéu, relógio, camisa, quarto&#10;&#10;Descrição gerada automaticamente">
+            <a:extLst>
+              <a:ext uri="{FF2B5EF4-FFF2-40B4-BE49-F238E27FC236}">
+                <a16:creationId xmlns:a16="http://schemas.microsoft.com/office/drawing/2014/main" id="{6FB6EF3B-78AB-4E02-82C0-465DBFE38FCD}"/>
+              </a:ext>
+            </a:extLst>
+          </p:cNvPr>
+          <p:cNvPicPr>
+            <a:picLocks noChangeAspect="1"/>
+          </p:cNvPicPr>
+          <p:nvPr/>
+        </p:nvPicPr>
+        <p:blipFill>
+          <a:blip r:embed="rId6">
+            <a:extLst>
+              <a:ext uri="{28A0092B-C50C-407E-A947-70E740481C1C}">
+                <a14:useLocalDpi xmlns:a14="http://schemas.microsoft.com/office/drawing/2010/main" val="0"/>
+              </a:ext>
+            </a:extLst>
+          </a:blip>
+          <a:stretch>
+            <a:fillRect/>
+          </a:stretch>
+        </p:blipFill>
+        <p:spPr>
+          <a:xfrm>
+            <a:off x="8978616" y="4888740"/>
+            <a:ext cx="1219263" cy="1219263"/>
+          </a:xfrm>
+          <a:prstGeom prst="rect">
+            <a:avLst/>
+          </a:prstGeom>
+        </p:spPr>
+      </p:pic>
+      <p:sp>
+        <p:nvSpPr>
+          <p:cNvPr id="25" name="Título 1">
+            <a:extLst>
+              <a:ext uri="{FF2B5EF4-FFF2-40B4-BE49-F238E27FC236}">
+                <a16:creationId xmlns:a16="http://schemas.microsoft.com/office/drawing/2014/main" id="{88F0DB40-19D6-481C-879D-D31C6B2B5C82}"/>
+              </a:ext>
+            </a:extLst>
+          </p:cNvPr>
+          <p:cNvSpPr txBox="1">
+            <a:spLocks/>
+          </p:cNvSpPr>
+          <p:nvPr/>
+        </p:nvSpPr>
+        <p:spPr>
+          <a:xfrm>
+            <a:off x="940042" y="2987436"/>
+            <a:ext cx="3174755" cy="622853"/>
+          </a:xfrm>
+          <a:prstGeom prst="rect">
+            <a:avLst/>
+          </a:prstGeom>
+        </p:spPr>
+        <p:txBody>
+          <a:bodyPr vert="horz" lIns="91440" tIns="45720" rIns="91440" bIns="45720" rtlCol="0" anchor="ctr">
+            <a:noAutofit/>
+          </a:bodyPr>
+          <a:lstStyle>
+            <a:lvl1pPr algn="l" defTabSz="914400" rtl="0" eaLnBrk="1" latinLnBrk="0" hangingPunct="1">
+              <a:lnSpc>
+                <a:spcPct val="90000"/>
+              </a:lnSpc>
+              <a:spcBef>
+                <a:spcPct val="0"/>
+              </a:spcBef>
+              <a:buNone/>
+              <a:defRPr sz="4400" kern="1200">
+                <a:solidFill>
+                  <a:schemeClr val="tx1"/>
+                </a:solidFill>
+                <a:latin typeface="+mj-lt"/>
+                <a:ea typeface="+mj-ea"/>
+                <a:cs typeface="+mj-cs"/>
+              </a:defRPr>
+            </a:lvl1pPr>
+          </a:lstStyle>
+          <a:p>
+            <a:pPr marL="342900" indent="-342900">
+              <a:buFont typeface="Arial" panose="020B0604020202020204" pitchFamily="34" charset="0"/>
+              <a:buChar char="•"/>
+            </a:pPr>
+            <a:r>
+              <a:rPr lang="pt-BR" sz="2000" dirty="0">
+                <a:solidFill>
+                  <a:srgbClr val="B02F75"/>
+                </a:solidFill>
+                <a:latin typeface="Dubai Medium" panose="020B0603030403030204" pitchFamily="34" charset="-78"/>
+                <a:cs typeface="Dubai Medium" panose="020B0603030403030204" pitchFamily="34" charset="-78"/>
+              </a:rPr>
+              <a:t>Metodologia Scrum</a:t>
+            </a:r>
+          </a:p>
+        </p:txBody>
+      </p:sp>
+      <p:sp>
+        <p:nvSpPr>
+          <p:cNvPr id="26" name="Título 1">
+            <a:extLst>
+              <a:ext uri="{FF2B5EF4-FFF2-40B4-BE49-F238E27FC236}">
+                <a16:creationId xmlns:a16="http://schemas.microsoft.com/office/drawing/2014/main" id="{11EA0AC0-54FF-4220-AE9C-CFAB5437B943}"/>
+              </a:ext>
+            </a:extLst>
+          </p:cNvPr>
+          <p:cNvSpPr txBox="1">
+            <a:spLocks/>
+          </p:cNvSpPr>
+          <p:nvPr/>
+        </p:nvSpPr>
+        <p:spPr>
+          <a:xfrm>
+            <a:off x="940042" y="5334380"/>
+            <a:ext cx="1396971" cy="622853"/>
+          </a:xfrm>
+          <a:prstGeom prst="rect">
+            <a:avLst/>
+          </a:prstGeom>
+        </p:spPr>
+        <p:txBody>
+          <a:bodyPr vert="horz" lIns="91440" tIns="45720" rIns="91440" bIns="45720" rtlCol="0" anchor="ctr">
+            <a:noAutofit/>
+          </a:bodyPr>
+          <a:lstStyle>
+            <a:lvl1pPr algn="l" defTabSz="914400" rtl="0" eaLnBrk="1" latinLnBrk="0" hangingPunct="1">
+              <a:lnSpc>
+                <a:spcPct val="90000"/>
+              </a:lnSpc>
+              <a:spcBef>
+                <a:spcPct val="0"/>
+              </a:spcBef>
+              <a:buNone/>
+              <a:defRPr sz="4400" kern="1200">
+                <a:solidFill>
+                  <a:schemeClr val="tx1"/>
+                </a:solidFill>
+                <a:latin typeface="+mj-lt"/>
+                <a:ea typeface="+mj-ea"/>
+                <a:cs typeface="+mj-cs"/>
+              </a:defRPr>
+            </a:lvl1pPr>
+          </a:lstStyle>
+          <a:p>
+            <a:pPr marL="342900" indent="-342900">
+              <a:buFont typeface="Arial" panose="020B0604020202020204" pitchFamily="34" charset="0"/>
+              <a:buChar char="•"/>
+            </a:pPr>
+            <a:r>
+              <a:rPr lang="pt-BR" sz="2000" dirty="0" err="1">
+                <a:solidFill>
+                  <a:srgbClr val="B02F75"/>
+                </a:solidFill>
+                <a:latin typeface="Dubai Medium" panose="020B0603030403030204" pitchFamily="34" charset="-78"/>
+                <a:cs typeface="Dubai Medium" panose="020B0603030403030204" pitchFamily="34" charset="-78"/>
+              </a:rPr>
+              <a:t>Planner</a:t>
+            </a:r>
+            <a:endParaRPr lang="pt-BR" sz="2000" dirty="0">
+              <a:solidFill>
+                <a:srgbClr val="B02F75"/>
+              </a:solidFill>
+              <a:latin typeface="Dubai Medium" panose="020B0603030403030204" pitchFamily="34" charset="-78"/>
+              <a:cs typeface="Dubai Medium" panose="020B0603030403030204" pitchFamily="34" charset="-78"/>
+            </a:endParaRPr>
+          </a:p>
+        </p:txBody>
+      </p:sp>
+      <p:pic>
+        <p:nvPicPr>
+          <p:cNvPr id="28" name="Imagem 27" descr="Uma imagem contendo relógio&#10;&#10;Descrição gerada automaticamente">
+            <a:extLst>
+              <a:ext uri="{FF2B5EF4-FFF2-40B4-BE49-F238E27FC236}">
+                <a16:creationId xmlns:a16="http://schemas.microsoft.com/office/drawing/2014/main" id="{E36447D3-C1F6-4088-8559-CD4D0DC20288}"/>
+              </a:ext>
+            </a:extLst>
+          </p:cNvPr>
+          <p:cNvPicPr>
+            <a:picLocks noChangeAspect="1"/>
+          </p:cNvPicPr>
+          <p:nvPr/>
+        </p:nvPicPr>
+        <p:blipFill rotWithShape="1">
+          <a:blip r:embed="rId7">
+            <a:extLst>
+              <a:ext uri="{28A0092B-C50C-407E-A947-70E740481C1C}">
+                <a14:useLocalDpi xmlns:a14="http://schemas.microsoft.com/office/drawing/2010/main" val="0"/>
+              </a:ext>
+            </a:extLst>
+          </a:blip>
+          <a:srcRect l="39889" t="28413" r="38869" b="25211"/>
+          <a:stretch/>
+        </p:blipFill>
+        <p:spPr>
+          <a:xfrm>
+            <a:off x="5823688" y="5048967"/>
+            <a:ext cx="993918" cy="1139272"/>
+          </a:xfrm>
+          <a:prstGeom prst="rect">
+            <a:avLst/>
+          </a:prstGeom>
+        </p:spPr>
+      </p:pic>
+      <p:sp>
+        <p:nvSpPr>
+          <p:cNvPr id="17" name="Título 1">
+            <a:extLst>
+              <a:ext uri="{FF2B5EF4-FFF2-40B4-BE49-F238E27FC236}">
+                <a16:creationId xmlns:a16="http://schemas.microsoft.com/office/drawing/2014/main" id="{DE9E4F40-71B9-4085-95FA-A0FEF0D7D45B}"/>
+              </a:ext>
+            </a:extLst>
+          </p:cNvPr>
+          <p:cNvSpPr txBox="1">
+            <a:spLocks/>
+          </p:cNvSpPr>
+          <p:nvPr/>
+        </p:nvSpPr>
+        <p:spPr>
+          <a:xfrm>
+            <a:off x="940041" y="4054234"/>
+            <a:ext cx="3711472" cy="622853"/>
+          </a:xfrm>
+          <a:prstGeom prst="rect">
+            <a:avLst/>
+          </a:prstGeom>
+        </p:spPr>
+        <p:txBody>
+          <a:bodyPr vert="horz" lIns="91440" tIns="45720" rIns="91440" bIns="45720" rtlCol="0" anchor="ctr">
+            <a:noAutofit/>
+          </a:bodyPr>
+          <a:lstStyle>
+            <a:lvl1pPr algn="l" defTabSz="914400" rtl="0" eaLnBrk="1" latinLnBrk="0" hangingPunct="1">
+              <a:lnSpc>
+                <a:spcPct val="90000"/>
+              </a:lnSpc>
+              <a:spcBef>
+                <a:spcPct val="0"/>
+              </a:spcBef>
+              <a:buNone/>
+              <a:defRPr sz="4400" kern="1200">
+                <a:solidFill>
+                  <a:schemeClr val="tx1"/>
+                </a:solidFill>
+                <a:latin typeface="+mj-lt"/>
+                <a:ea typeface="+mj-ea"/>
+                <a:cs typeface="+mj-cs"/>
+              </a:defRPr>
+            </a:lvl1pPr>
+          </a:lstStyle>
+          <a:p>
+            <a:pPr marL="342900" indent="-342900">
+              <a:buFont typeface="Arial" panose="020B0604020202020204" pitchFamily="34" charset="0"/>
+              <a:buChar char="•"/>
+            </a:pPr>
+            <a:r>
+              <a:rPr lang="pt-BR" sz="2000" dirty="0">
+                <a:solidFill>
+                  <a:srgbClr val="B02F75"/>
+                </a:solidFill>
+                <a:latin typeface="Dubai Medium" panose="020B0603030403030204" pitchFamily="34" charset="-78"/>
+                <a:cs typeface="Dubai Medium" panose="020B0603030403030204" pitchFamily="34" charset="-78"/>
+              </a:rPr>
+              <a:t>Padrão de projeto no Java</a:t>
+            </a:r>
+          </a:p>
+        </p:txBody>
+      </p:sp>
+    </p:spTree>
+    <p:extLst>
+      <p:ext uri="{BB962C8B-B14F-4D97-AF65-F5344CB8AC3E}">
+        <p14:creationId xmlns:p14="http://schemas.microsoft.com/office/powerpoint/2010/main" val="3470094145"/>
+      </p:ext>
+    </p:extLst>
+  </p:cSld>
+  <p:clrMapOvr>
+    <a:masterClrMapping/>
+  </p:clrMapOvr>
+</p:sld>
+</file>
+
+<file path=ppt/slides/slide6.xml><?xml version="1.0" encoding="utf-8"?>
+<p:sld xmlns:a="http://schemas.openxmlformats.org/drawingml/2006/main" xmlns:r="http://schemas.openxmlformats.org/officeDocument/2006/relationships" xmlns:p="http://schemas.openxmlformats.org/presentationml/2006/main">
+  <p:cSld>
+    <p:spTree>
+      <p:nvGrpSpPr>
+        <p:cNvPr id="1" name=""/>
+        <p:cNvGrpSpPr/>
+        <p:nvPr/>
+      </p:nvGrpSpPr>
+      <p:grpSpPr>
+        <a:xfrm>
+          <a:off x="0" y="0"/>
+          <a:ext cx="0" cy="0"/>
+          <a:chOff x="0" y="0"/>
+          <a:chExt cx="0" cy="0"/>
+        </a:xfrm>
+      </p:grpSpPr>
+      <p:sp>
+        <p:nvSpPr>
+          <p:cNvPr id="2" name="Título 1">
+            <a:extLst>
+              <a:ext uri="{FF2B5EF4-FFF2-40B4-BE49-F238E27FC236}">
+                <a16:creationId xmlns:a16="http://schemas.microsoft.com/office/drawing/2014/main" id="{BE6D8F10-9168-4897-A64A-2723EE6250FA}"/>
+              </a:ext>
+            </a:extLst>
+          </p:cNvPr>
+          <p:cNvSpPr>
+            <a:spLocks noGrp="1"/>
+          </p:cNvSpPr>
+          <p:nvPr>
+            <p:ph type="title"/>
+          </p:nvPr>
+        </p:nvSpPr>
+        <p:spPr>
+          <a:xfrm>
             <a:off x="454479" y="336873"/>
             <a:ext cx="6248467" cy="758825"/>
           </a:xfrm>
@@ -9922,7 +10948,7 @@
         </p:blipFill>
         <p:spPr>
           <a:xfrm>
-            <a:off x="6822083" y="2082618"/>
+            <a:off x="7014497" y="1892381"/>
             <a:ext cx="3368719" cy="4534812"/>
           </a:xfrm>
           <a:prstGeom prst="rect">
@@ -9946,7 +10972,7 @@
         </p:nvSpPr>
         <p:spPr>
           <a:xfrm>
-            <a:off x="1378858" y="1439861"/>
+            <a:off x="1407886" y="1133556"/>
             <a:ext cx="3403229" cy="758825"/>
           </a:xfrm>
           <a:prstGeom prst="rect">
@@ -10063,7 +11089,7 @@
         </p:nvSpPr>
         <p:spPr>
           <a:xfrm>
-            <a:off x="7014497" y="1555930"/>
+            <a:off x="7014497" y="1288400"/>
             <a:ext cx="3769617" cy="526688"/>
           </a:xfrm>
           <a:prstGeom prst="rect">
@@ -10142,7 +11168,7 @@
         </p:blipFill>
         <p:spPr>
           <a:xfrm>
-            <a:off x="1248229" y="2082618"/>
+            <a:off x="1248229" y="1892381"/>
             <a:ext cx="3816333" cy="4572875"/>
           </a:xfrm>
           <a:prstGeom prst="rect">
@@ -10213,874 +11239,6 @@
 </p:sld>
 </file>
 
-<file path=ppt/slides/slide6.xml><?xml version="1.0" encoding="utf-8"?>
-<p:sld xmlns:a="http://schemas.openxmlformats.org/drawingml/2006/main" xmlns:r="http://schemas.openxmlformats.org/officeDocument/2006/relationships" xmlns:p="http://schemas.openxmlformats.org/presentationml/2006/main">
-  <p:cSld>
-    <p:spTree>
-      <p:nvGrpSpPr>
-        <p:cNvPr id="1" name=""/>
-        <p:cNvGrpSpPr/>
-        <p:nvPr/>
-      </p:nvGrpSpPr>
-      <p:grpSpPr>
-        <a:xfrm>
-          <a:off x="0" y="0"/>
-          <a:ext cx="0" cy="0"/>
-          <a:chOff x="0" y="0"/>
-          <a:chExt cx="0" cy="0"/>
-        </a:xfrm>
-      </p:grpSpPr>
-      <p:sp>
-        <p:nvSpPr>
-          <p:cNvPr id="2" name="Título 1">
-            <a:extLst>
-              <a:ext uri="{FF2B5EF4-FFF2-40B4-BE49-F238E27FC236}">
-                <a16:creationId xmlns:a16="http://schemas.microsoft.com/office/drawing/2014/main" id="{BE6D8F10-9168-4897-A64A-2723EE6250FA}"/>
-              </a:ext>
-            </a:extLst>
-          </p:cNvPr>
-          <p:cNvSpPr>
-            <a:spLocks noGrp="1"/>
-          </p:cNvSpPr>
-          <p:nvPr>
-            <p:ph type="title"/>
-          </p:nvPr>
-        </p:nvSpPr>
-        <p:spPr>
-          <a:xfrm>
-            <a:off x="454478" y="450851"/>
-            <a:ext cx="4682497" cy="758825"/>
-          </a:xfrm>
-        </p:spPr>
-        <p:txBody>
-          <a:bodyPr>
-            <a:noAutofit/>
-          </a:bodyPr>
-          <a:lstStyle/>
-          <a:p>
-            <a:r>
-              <a:rPr lang="pt-BR" sz="3600" dirty="0">
-                <a:solidFill>
-                  <a:srgbClr val="4DB033"/>
-                </a:solidFill>
-                <a:latin typeface="Dubai Medium" panose="020B0603030403030204" pitchFamily="34" charset="-78"/>
-                <a:cs typeface="Dubai Medium" panose="020B0603030403030204" pitchFamily="34" charset="-78"/>
-              </a:rPr>
-              <a:t>Organização do Projeto</a:t>
-            </a:r>
-          </a:p>
-        </p:txBody>
-      </p:sp>
-      <p:pic>
-        <p:nvPicPr>
-          <p:cNvPr id="6" name="Espaço Reservado para Conteúdo 5" descr="Uma imagem contendo desenho&#10;&#10;Descrição gerada automaticamente">
-            <a:extLst>
-              <a:ext uri="{FF2B5EF4-FFF2-40B4-BE49-F238E27FC236}">
-                <a16:creationId xmlns:a16="http://schemas.microsoft.com/office/drawing/2014/main" id="{2791291C-2F25-4C38-8180-07D1AFDDB93F}"/>
-              </a:ext>
-            </a:extLst>
-          </p:cNvPr>
-          <p:cNvPicPr>
-            <a:picLocks noGrp="1" noChangeAspect="1"/>
-          </p:cNvPicPr>
-          <p:nvPr>
-            <p:ph idx="1"/>
-          </p:nvPr>
-        </p:nvPicPr>
-        <p:blipFill>
-          <a:blip r:embed="rId2">
-            <a:extLst>
-              <a:ext uri="{28A0092B-C50C-407E-A947-70E740481C1C}">
-                <a14:useLocalDpi xmlns:a14="http://schemas.microsoft.com/office/drawing/2010/main" val="0"/>
-              </a:ext>
-            </a:extLst>
-          </a:blip>
-          <a:stretch>
-            <a:fillRect/>
-          </a:stretch>
-        </p:blipFill>
-        <p:spPr>
-          <a:xfrm>
-            <a:off x="10286734" y="-387713"/>
-            <a:ext cx="1905266" cy="1905266"/>
-          </a:xfrm>
-        </p:spPr>
-      </p:pic>
-      <p:cxnSp>
-        <p:nvCxnSpPr>
-          <p:cNvPr id="10" name="Conector reto 9">
-            <a:extLst>
-              <a:ext uri="{FF2B5EF4-FFF2-40B4-BE49-F238E27FC236}">
-                <a16:creationId xmlns:a16="http://schemas.microsoft.com/office/drawing/2014/main" id="{B0260FB3-F747-4ADD-A7B2-81FDF008C973}"/>
-              </a:ext>
-            </a:extLst>
-          </p:cNvPr>
-          <p:cNvCxnSpPr>
-            <a:cxnSpLocks/>
-          </p:cNvCxnSpPr>
-          <p:nvPr/>
-        </p:nvCxnSpPr>
-        <p:spPr>
-          <a:xfrm flipH="1">
-            <a:off x="2" y="981076"/>
-            <a:ext cx="4114798" cy="0"/>
-          </a:xfrm>
-          <a:prstGeom prst="line">
-            <a:avLst/>
-          </a:prstGeom>
-          <a:ln>
-            <a:solidFill>
-              <a:srgbClr val="6B1979"/>
-            </a:solidFill>
-          </a:ln>
-          <a:effectLst>
-            <a:glow rad="63500">
-              <a:srgbClr val="6B1979">
-                <a:alpha val="40000"/>
-              </a:srgbClr>
-            </a:glow>
-          </a:effectLst>
-        </p:spPr>
-        <p:style>
-          <a:lnRef idx="1">
-            <a:schemeClr val="accent1"/>
-          </a:lnRef>
-          <a:fillRef idx="0">
-            <a:schemeClr val="accent1"/>
-          </a:fillRef>
-          <a:effectRef idx="0">
-            <a:schemeClr val="accent1"/>
-          </a:effectRef>
-          <a:fontRef idx="minor">
-            <a:schemeClr val="tx1"/>
-          </a:fontRef>
-        </p:style>
-      </p:cxnSp>
-      <p:sp>
-        <p:nvSpPr>
-          <p:cNvPr id="7" name="Título 1">
-            <a:extLst>
-              <a:ext uri="{FF2B5EF4-FFF2-40B4-BE49-F238E27FC236}">
-                <a16:creationId xmlns:a16="http://schemas.microsoft.com/office/drawing/2014/main" id="{3B5F7E5F-06FD-456D-A021-4E43B3F578DE}"/>
-              </a:ext>
-            </a:extLst>
-          </p:cNvPr>
-          <p:cNvSpPr txBox="1">
-            <a:spLocks/>
-          </p:cNvSpPr>
-          <p:nvPr/>
-        </p:nvSpPr>
-        <p:spPr>
-          <a:xfrm>
-            <a:off x="940041" y="3837322"/>
-            <a:ext cx="1396971" cy="622853"/>
-          </a:xfrm>
-          <a:prstGeom prst="rect">
-            <a:avLst/>
-          </a:prstGeom>
-        </p:spPr>
-        <p:txBody>
-          <a:bodyPr vert="horz" lIns="91440" tIns="45720" rIns="91440" bIns="45720" rtlCol="0" anchor="ctr">
-            <a:noAutofit/>
-          </a:bodyPr>
-          <a:lstStyle>
-            <a:lvl1pPr algn="l" defTabSz="914400" rtl="0" eaLnBrk="1" latinLnBrk="0" hangingPunct="1">
-              <a:lnSpc>
-                <a:spcPct val="90000"/>
-              </a:lnSpc>
-              <a:spcBef>
-                <a:spcPct val="0"/>
-              </a:spcBef>
-              <a:buNone/>
-              <a:defRPr sz="4400" kern="1200">
-                <a:solidFill>
-                  <a:schemeClr val="tx1"/>
-                </a:solidFill>
-                <a:latin typeface="+mj-lt"/>
-                <a:ea typeface="+mj-ea"/>
-                <a:cs typeface="+mj-cs"/>
-              </a:defRPr>
-            </a:lvl1pPr>
-          </a:lstStyle>
-          <a:p>
-            <a:pPr marL="342900" indent="-342900">
-              <a:buFont typeface="Arial" panose="020B0604020202020204" pitchFamily="34" charset="0"/>
-              <a:buChar char="•"/>
-            </a:pPr>
-            <a:r>
-              <a:rPr lang="pt-BR" sz="2000" dirty="0" err="1">
-                <a:solidFill>
-                  <a:srgbClr val="B02F75"/>
-                </a:solidFill>
-                <a:latin typeface="Dubai Medium" panose="020B0603030403030204" pitchFamily="34" charset="-78"/>
-                <a:cs typeface="Dubai Medium" panose="020B0603030403030204" pitchFamily="34" charset="-78"/>
-              </a:rPr>
-              <a:t>Kanban</a:t>
-            </a:r>
-            <a:endParaRPr lang="pt-BR" sz="2000" dirty="0">
-              <a:solidFill>
-                <a:srgbClr val="B02F75"/>
-              </a:solidFill>
-              <a:latin typeface="Dubai Medium" panose="020B0603030403030204" pitchFamily="34" charset="-78"/>
-              <a:cs typeface="Dubai Medium" panose="020B0603030403030204" pitchFamily="34" charset="-78"/>
-            </a:endParaRPr>
-          </a:p>
-        </p:txBody>
-      </p:sp>
-      <p:sp>
-        <p:nvSpPr>
-          <p:cNvPr id="9" name="Título 1">
-            <a:extLst>
-              <a:ext uri="{FF2B5EF4-FFF2-40B4-BE49-F238E27FC236}">
-                <a16:creationId xmlns:a16="http://schemas.microsoft.com/office/drawing/2014/main" id="{B3E1F8AF-9C2D-4A4A-B128-57FA6CB66969}"/>
-              </a:ext>
-            </a:extLst>
-          </p:cNvPr>
-          <p:cNvSpPr txBox="1">
-            <a:spLocks/>
-          </p:cNvSpPr>
-          <p:nvPr/>
-        </p:nvSpPr>
-        <p:spPr>
-          <a:xfrm>
-            <a:off x="454477" y="2584612"/>
-            <a:ext cx="5641523" cy="758826"/>
-          </a:xfrm>
-          <a:prstGeom prst="rect">
-            <a:avLst/>
-          </a:prstGeom>
-        </p:spPr>
-        <p:txBody>
-          <a:bodyPr vert="horz" lIns="91440" tIns="45720" rIns="91440" bIns="45720" rtlCol="0" anchor="ctr">
-            <a:normAutofit fontScale="97500"/>
-          </a:bodyPr>
-          <a:lstStyle>
-            <a:lvl1pPr algn="l" defTabSz="914400" rtl="0" eaLnBrk="1" latinLnBrk="0" hangingPunct="1">
-              <a:lnSpc>
-                <a:spcPct val="90000"/>
-              </a:lnSpc>
-              <a:spcBef>
-                <a:spcPct val="0"/>
-              </a:spcBef>
-              <a:buNone/>
-              <a:defRPr sz="4400" kern="1200">
-                <a:solidFill>
-                  <a:schemeClr val="tx1"/>
-                </a:solidFill>
-                <a:latin typeface="+mj-lt"/>
-                <a:ea typeface="+mj-ea"/>
-                <a:cs typeface="+mj-cs"/>
-              </a:defRPr>
-            </a:lvl1pPr>
-          </a:lstStyle>
-          <a:p>
-            <a:pPr marL="342900" indent="-342900">
-              <a:buFont typeface="Arial" panose="020B0604020202020204" pitchFamily="34" charset="0"/>
-              <a:buChar char="•"/>
-            </a:pPr>
-            <a:r>
-              <a:rPr lang="pt-BR" sz="2800" dirty="0">
-                <a:solidFill>
-                  <a:srgbClr val="4D3495"/>
-                </a:solidFill>
-                <a:latin typeface="Dubai Medium" panose="020B0603030403030204" pitchFamily="34" charset="-78"/>
-                <a:cs typeface="Dubai Medium" panose="020B0603030403030204" pitchFamily="34" charset="-78"/>
-              </a:rPr>
-              <a:t>Metodologia e especificação</a:t>
-            </a:r>
-          </a:p>
-        </p:txBody>
-      </p:sp>
-      <p:pic>
-        <p:nvPicPr>
-          <p:cNvPr id="13" name="Imagem 12">
-            <a:extLst>
-              <a:ext uri="{FF2B5EF4-FFF2-40B4-BE49-F238E27FC236}">
-                <a16:creationId xmlns:a16="http://schemas.microsoft.com/office/drawing/2014/main" id="{664E6004-83C7-4B41-86A9-6D389EDE7A43}"/>
-              </a:ext>
-            </a:extLst>
-          </p:cNvPr>
-          <p:cNvPicPr>
-            <a:picLocks noChangeAspect="1"/>
-          </p:cNvPicPr>
-          <p:nvPr/>
-        </p:nvPicPr>
-        <p:blipFill>
-          <a:blip r:embed="rId3">
-            <a:extLst>
-              <a:ext uri="{28A0092B-C50C-407E-A947-70E740481C1C}">
-                <a14:useLocalDpi xmlns:a14="http://schemas.microsoft.com/office/drawing/2010/main" val="0"/>
-              </a:ext>
-            </a:extLst>
-          </a:blip>
-          <a:stretch>
-            <a:fillRect/>
-          </a:stretch>
-        </p:blipFill>
-        <p:spPr>
-          <a:xfrm>
-            <a:off x="5559305" y="3326110"/>
-            <a:ext cx="1522683" cy="1522683"/>
-          </a:xfrm>
-          <a:prstGeom prst="rect">
-            <a:avLst/>
-          </a:prstGeom>
-        </p:spPr>
-      </p:pic>
-      <p:pic>
-        <p:nvPicPr>
-          <p:cNvPr id="15" name="Imagem 14" descr="Tela de computador com texto preto sobre fundo branco&#10;&#10;Descrição gerada automaticamente">
-            <a:extLst>
-              <a:ext uri="{FF2B5EF4-FFF2-40B4-BE49-F238E27FC236}">
-                <a16:creationId xmlns:a16="http://schemas.microsoft.com/office/drawing/2014/main" id="{840A4703-1C9D-45D8-A2E8-692A55113BF0}"/>
-              </a:ext>
-            </a:extLst>
-          </p:cNvPr>
-          <p:cNvPicPr>
-            <a:picLocks noChangeAspect="1"/>
-          </p:cNvPicPr>
-          <p:nvPr/>
-        </p:nvPicPr>
-        <p:blipFill>
-          <a:blip r:embed="rId4">
-            <a:extLst>
-              <a:ext uri="{28A0092B-C50C-407E-A947-70E740481C1C}">
-                <a14:useLocalDpi xmlns:a14="http://schemas.microsoft.com/office/drawing/2010/main" val="0"/>
-              </a:ext>
-            </a:extLst>
-          </a:blip>
-          <a:stretch>
-            <a:fillRect/>
-          </a:stretch>
-        </p:blipFill>
-        <p:spPr>
-          <a:xfrm>
-            <a:off x="8889763" y="3274029"/>
-            <a:ext cx="1396971" cy="1396971"/>
-          </a:xfrm>
-          <a:prstGeom prst="rect">
-            <a:avLst/>
-          </a:prstGeom>
-        </p:spPr>
-      </p:pic>
-      <p:pic>
-        <p:nvPicPr>
-          <p:cNvPr id="18" name="Imagem 17" descr="Desenho preto e branco&#10;&#10;Descrição gerada automaticamente">
-            <a:extLst>
-              <a:ext uri="{FF2B5EF4-FFF2-40B4-BE49-F238E27FC236}">
-                <a16:creationId xmlns:a16="http://schemas.microsoft.com/office/drawing/2014/main" id="{FAE33A2A-0055-4879-8B3D-9AB9AF4EF924}"/>
-              </a:ext>
-            </a:extLst>
-          </p:cNvPr>
-          <p:cNvPicPr>
-            <a:picLocks noChangeAspect="1"/>
-          </p:cNvPicPr>
-          <p:nvPr/>
-        </p:nvPicPr>
-        <p:blipFill>
-          <a:blip r:embed="rId5">
-            <a:extLst>
-              <a:ext uri="{28A0092B-C50C-407E-A947-70E740481C1C}">
-                <a14:useLocalDpi xmlns:a14="http://schemas.microsoft.com/office/drawing/2010/main" val="0"/>
-              </a:ext>
-            </a:extLst>
-          </a:blip>
-          <a:stretch>
-            <a:fillRect/>
-          </a:stretch>
-        </p:blipFill>
-        <p:spPr>
-          <a:xfrm>
-            <a:off x="8321531" y="1483019"/>
-            <a:ext cx="1266716" cy="1298517"/>
-          </a:xfrm>
-          <a:prstGeom prst="rect">
-            <a:avLst/>
-          </a:prstGeom>
-        </p:spPr>
-      </p:pic>
-      <p:sp>
-        <p:nvSpPr>
-          <p:cNvPr id="19" name="Título 1">
-            <a:extLst>
-              <a:ext uri="{FF2B5EF4-FFF2-40B4-BE49-F238E27FC236}">
-                <a16:creationId xmlns:a16="http://schemas.microsoft.com/office/drawing/2014/main" id="{E17DFFA1-7804-47BA-AADD-CF79917C97E2}"/>
-              </a:ext>
-            </a:extLst>
-          </p:cNvPr>
-          <p:cNvSpPr txBox="1">
-            <a:spLocks/>
-          </p:cNvSpPr>
-          <p:nvPr/>
-        </p:nvSpPr>
-        <p:spPr>
-          <a:xfrm>
-            <a:off x="538122" y="1827207"/>
-            <a:ext cx="5641523" cy="758826"/>
-          </a:xfrm>
-          <a:prstGeom prst="rect">
-            <a:avLst/>
-          </a:prstGeom>
-        </p:spPr>
-        <p:txBody>
-          <a:bodyPr vert="horz" lIns="91440" tIns="45720" rIns="91440" bIns="45720" rtlCol="0" anchor="ctr">
-            <a:normAutofit fontScale="97500"/>
-          </a:bodyPr>
-          <a:lstStyle>
-            <a:lvl1pPr algn="l" defTabSz="914400" rtl="0" eaLnBrk="1" latinLnBrk="0" hangingPunct="1">
-              <a:lnSpc>
-                <a:spcPct val="90000"/>
-              </a:lnSpc>
-              <a:spcBef>
-                <a:spcPct val="0"/>
-              </a:spcBef>
-              <a:buNone/>
-              <a:defRPr sz="4400" kern="1200">
-                <a:solidFill>
-                  <a:schemeClr val="tx1"/>
-                </a:solidFill>
-                <a:latin typeface="+mj-lt"/>
-                <a:ea typeface="+mj-ea"/>
-                <a:cs typeface="+mj-cs"/>
-              </a:defRPr>
-            </a:lvl1pPr>
-          </a:lstStyle>
-          <a:p>
-            <a:pPr marL="342900" indent="-342900">
-              <a:buFont typeface="Arial" panose="020B0604020202020204" pitchFamily="34" charset="0"/>
-              <a:buChar char="•"/>
-            </a:pPr>
-            <a:r>
-              <a:rPr lang="pt-BR" sz="2800" dirty="0">
-                <a:solidFill>
-                  <a:srgbClr val="4D3495"/>
-                </a:solidFill>
-                <a:latin typeface="Dubai Medium" panose="020B0603030403030204" pitchFamily="34" charset="-78"/>
-                <a:cs typeface="Dubai Medium" panose="020B0603030403030204" pitchFamily="34" charset="-78"/>
-              </a:rPr>
-              <a:t>GitHub</a:t>
-            </a:r>
-          </a:p>
-        </p:txBody>
-      </p:sp>
-      <p:sp>
-        <p:nvSpPr>
-          <p:cNvPr id="20" name="Título 1">
-            <a:extLst>
-              <a:ext uri="{FF2B5EF4-FFF2-40B4-BE49-F238E27FC236}">
-                <a16:creationId xmlns:a16="http://schemas.microsoft.com/office/drawing/2014/main" id="{1ED01C81-02A5-4ACF-9723-C0483241C695}"/>
-              </a:ext>
-            </a:extLst>
-          </p:cNvPr>
-          <p:cNvSpPr txBox="1">
-            <a:spLocks/>
-          </p:cNvSpPr>
-          <p:nvPr/>
-        </p:nvSpPr>
-        <p:spPr>
-          <a:xfrm>
-            <a:off x="518008" y="5057014"/>
-            <a:ext cx="4618968" cy="622853"/>
-          </a:xfrm>
-          <a:prstGeom prst="rect">
-            <a:avLst/>
-          </a:prstGeom>
-        </p:spPr>
-        <p:txBody>
-          <a:bodyPr vert="horz" lIns="91440" tIns="45720" rIns="91440" bIns="45720" rtlCol="0" anchor="ctr">
-            <a:noAutofit/>
-          </a:bodyPr>
-          <a:lstStyle>
-            <a:lvl1pPr algn="l" defTabSz="914400" rtl="0" eaLnBrk="1" latinLnBrk="0" hangingPunct="1">
-              <a:lnSpc>
-                <a:spcPct val="90000"/>
-              </a:lnSpc>
-              <a:spcBef>
-                <a:spcPct val="0"/>
-              </a:spcBef>
-              <a:buNone/>
-              <a:defRPr sz="4400" kern="1200">
-                <a:solidFill>
-                  <a:schemeClr val="tx1"/>
-                </a:solidFill>
-                <a:latin typeface="+mj-lt"/>
-                <a:ea typeface="+mj-ea"/>
-                <a:cs typeface="+mj-cs"/>
-              </a:defRPr>
-            </a:lvl1pPr>
-          </a:lstStyle>
-          <a:p>
-            <a:pPr marL="342900" indent="-342900">
-              <a:buFont typeface="Arial" panose="020B0604020202020204" pitchFamily="34" charset="0"/>
-              <a:buChar char="•"/>
-            </a:pPr>
-            <a:r>
-              <a:rPr lang="pt-BR" sz="2800" dirty="0">
-                <a:solidFill>
-                  <a:srgbClr val="4D3495"/>
-                </a:solidFill>
-                <a:latin typeface="Dubai Medium" panose="020B0603030403030204" pitchFamily="34" charset="-78"/>
-                <a:cs typeface="Dubai Medium" panose="020B0603030403030204" pitchFamily="34" charset="-78"/>
-              </a:rPr>
-              <a:t>Controle de Execução</a:t>
-            </a:r>
-          </a:p>
-        </p:txBody>
-      </p:sp>
-      <p:sp>
-        <p:nvSpPr>
-          <p:cNvPr id="22" name="Título 1">
-            <a:extLst>
-              <a:ext uri="{FF2B5EF4-FFF2-40B4-BE49-F238E27FC236}">
-                <a16:creationId xmlns:a16="http://schemas.microsoft.com/office/drawing/2014/main" id="{0F5474DC-6AEE-4124-9A0B-78C524B3A5DF}"/>
-              </a:ext>
-            </a:extLst>
-          </p:cNvPr>
-          <p:cNvSpPr txBox="1">
-            <a:spLocks/>
-          </p:cNvSpPr>
-          <p:nvPr/>
-        </p:nvSpPr>
-        <p:spPr>
-          <a:xfrm>
-            <a:off x="940043" y="6103769"/>
-            <a:ext cx="1396971" cy="622853"/>
-          </a:xfrm>
-          <a:prstGeom prst="rect">
-            <a:avLst/>
-          </a:prstGeom>
-        </p:spPr>
-        <p:txBody>
-          <a:bodyPr vert="horz" lIns="91440" tIns="45720" rIns="91440" bIns="45720" rtlCol="0" anchor="ctr">
-            <a:noAutofit/>
-          </a:bodyPr>
-          <a:lstStyle>
-            <a:lvl1pPr algn="l" defTabSz="914400" rtl="0" eaLnBrk="1" latinLnBrk="0" hangingPunct="1">
-              <a:lnSpc>
-                <a:spcPct val="90000"/>
-              </a:lnSpc>
-              <a:spcBef>
-                <a:spcPct val="0"/>
-              </a:spcBef>
-              <a:buNone/>
-              <a:defRPr sz="4400" kern="1200">
-                <a:solidFill>
-                  <a:schemeClr val="tx1"/>
-                </a:solidFill>
-                <a:latin typeface="+mj-lt"/>
-                <a:ea typeface="+mj-ea"/>
-                <a:cs typeface="+mj-cs"/>
-              </a:defRPr>
-            </a:lvl1pPr>
-          </a:lstStyle>
-          <a:p>
-            <a:pPr marL="342900" indent="-342900">
-              <a:buFont typeface="Arial" panose="020B0604020202020204" pitchFamily="34" charset="0"/>
-              <a:buChar char="•"/>
-            </a:pPr>
-            <a:r>
-              <a:rPr lang="pt-BR" sz="2000" dirty="0" err="1">
-                <a:solidFill>
-                  <a:srgbClr val="B02F75"/>
-                </a:solidFill>
-                <a:latin typeface="Dubai Medium" panose="020B0603030403030204" pitchFamily="34" charset="-78"/>
-                <a:cs typeface="Dubai Medium" panose="020B0603030403030204" pitchFamily="34" charset="-78"/>
-              </a:rPr>
-              <a:t>Discord</a:t>
-            </a:r>
-            <a:endParaRPr lang="pt-BR" sz="2000" dirty="0">
-              <a:solidFill>
-                <a:srgbClr val="B02F75"/>
-              </a:solidFill>
-              <a:latin typeface="Dubai Medium" panose="020B0603030403030204" pitchFamily="34" charset="-78"/>
-              <a:cs typeface="Dubai Medium" panose="020B0603030403030204" pitchFamily="34" charset="-78"/>
-            </a:endParaRPr>
-          </a:p>
-        </p:txBody>
-      </p:sp>
-      <p:pic>
-        <p:nvPicPr>
-          <p:cNvPr id="24" name="Imagem 23" descr="Uma imagem contendo chapéu, relógio, camisa, quarto&#10;&#10;Descrição gerada automaticamente">
-            <a:extLst>
-              <a:ext uri="{FF2B5EF4-FFF2-40B4-BE49-F238E27FC236}">
-                <a16:creationId xmlns:a16="http://schemas.microsoft.com/office/drawing/2014/main" id="{6FB6EF3B-78AB-4E02-82C0-465DBFE38FCD}"/>
-              </a:ext>
-            </a:extLst>
-          </p:cNvPr>
-          <p:cNvPicPr>
-            <a:picLocks noChangeAspect="1"/>
-          </p:cNvPicPr>
-          <p:nvPr/>
-        </p:nvPicPr>
-        <p:blipFill>
-          <a:blip r:embed="rId6">
-            <a:extLst>
-              <a:ext uri="{28A0092B-C50C-407E-A947-70E740481C1C}">
-                <a14:useLocalDpi xmlns:a14="http://schemas.microsoft.com/office/drawing/2010/main" val="0"/>
-              </a:ext>
-            </a:extLst>
-          </a:blip>
-          <a:stretch>
-            <a:fillRect/>
-          </a:stretch>
-        </p:blipFill>
-        <p:spPr>
-          <a:xfrm>
-            <a:off x="8978616" y="5208213"/>
-            <a:ext cx="1219263" cy="1219263"/>
-          </a:xfrm>
-          <a:prstGeom prst="rect">
-            <a:avLst/>
-          </a:prstGeom>
-        </p:spPr>
-      </p:pic>
-      <p:sp>
-        <p:nvSpPr>
-          <p:cNvPr id="25" name="Título 1">
-            <a:extLst>
-              <a:ext uri="{FF2B5EF4-FFF2-40B4-BE49-F238E27FC236}">
-                <a16:creationId xmlns:a16="http://schemas.microsoft.com/office/drawing/2014/main" id="{88F0DB40-19D6-481C-879D-D31C6B2B5C82}"/>
-              </a:ext>
-            </a:extLst>
-          </p:cNvPr>
-          <p:cNvSpPr txBox="1">
-            <a:spLocks/>
-          </p:cNvSpPr>
-          <p:nvPr/>
-        </p:nvSpPr>
-        <p:spPr>
-          <a:xfrm>
-            <a:off x="940042" y="3306909"/>
-            <a:ext cx="3174755" cy="622853"/>
-          </a:xfrm>
-          <a:prstGeom prst="rect">
-            <a:avLst/>
-          </a:prstGeom>
-        </p:spPr>
-        <p:txBody>
-          <a:bodyPr vert="horz" lIns="91440" tIns="45720" rIns="91440" bIns="45720" rtlCol="0" anchor="ctr">
-            <a:noAutofit/>
-          </a:bodyPr>
-          <a:lstStyle>
-            <a:lvl1pPr algn="l" defTabSz="914400" rtl="0" eaLnBrk="1" latinLnBrk="0" hangingPunct="1">
-              <a:lnSpc>
-                <a:spcPct val="90000"/>
-              </a:lnSpc>
-              <a:spcBef>
-                <a:spcPct val="0"/>
-              </a:spcBef>
-              <a:buNone/>
-              <a:defRPr sz="4400" kern="1200">
-                <a:solidFill>
-                  <a:schemeClr val="tx1"/>
-                </a:solidFill>
-                <a:latin typeface="+mj-lt"/>
-                <a:ea typeface="+mj-ea"/>
-                <a:cs typeface="+mj-cs"/>
-              </a:defRPr>
-            </a:lvl1pPr>
-          </a:lstStyle>
-          <a:p>
-            <a:pPr marL="342900" indent="-342900">
-              <a:buFont typeface="Arial" panose="020B0604020202020204" pitchFamily="34" charset="0"/>
-              <a:buChar char="•"/>
-            </a:pPr>
-            <a:r>
-              <a:rPr lang="pt-BR" sz="2000" dirty="0">
-                <a:solidFill>
-                  <a:srgbClr val="B02F75"/>
-                </a:solidFill>
-                <a:latin typeface="Dubai Medium" panose="020B0603030403030204" pitchFamily="34" charset="-78"/>
-                <a:cs typeface="Dubai Medium" panose="020B0603030403030204" pitchFamily="34" charset="-78"/>
-              </a:rPr>
-              <a:t>Metodologia Scrum</a:t>
-            </a:r>
-          </a:p>
-        </p:txBody>
-      </p:sp>
-      <p:sp>
-        <p:nvSpPr>
-          <p:cNvPr id="26" name="Título 1">
-            <a:extLst>
-              <a:ext uri="{FF2B5EF4-FFF2-40B4-BE49-F238E27FC236}">
-                <a16:creationId xmlns:a16="http://schemas.microsoft.com/office/drawing/2014/main" id="{11EA0AC0-54FF-4220-AE9C-CFAB5437B943}"/>
-              </a:ext>
-            </a:extLst>
-          </p:cNvPr>
-          <p:cNvSpPr txBox="1">
-            <a:spLocks/>
-          </p:cNvSpPr>
-          <p:nvPr/>
-        </p:nvSpPr>
-        <p:spPr>
-          <a:xfrm>
-            <a:off x="940042" y="5653853"/>
-            <a:ext cx="1396971" cy="622853"/>
-          </a:xfrm>
-          <a:prstGeom prst="rect">
-            <a:avLst/>
-          </a:prstGeom>
-        </p:spPr>
-        <p:txBody>
-          <a:bodyPr vert="horz" lIns="91440" tIns="45720" rIns="91440" bIns="45720" rtlCol="0" anchor="ctr">
-            <a:noAutofit/>
-          </a:bodyPr>
-          <a:lstStyle>
-            <a:lvl1pPr algn="l" defTabSz="914400" rtl="0" eaLnBrk="1" latinLnBrk="0" hangingPunct="1">
-              <a:lnSpc>
-                <a:spcPct val="90000"/>
-              </a:lnSpc>
-              <a:spcBef>
-                <a:spcPct val="0"/>
-              </a:spcBef>
-              <a:buNone/>
-              <a:defRPr sz="4400" kern="1200">
-                <a:solidFill>
-                  <a:schemeClr val="tx1"/>
-                </a:solidFill>
-                <a:latin typeface="+mj-lt"/>
-                <a:ea typeface="+mj-ea"/>
-                <a:cs typeface="+mj-cs"/>
-              </a:defRPr>
-            </a:lvl1pPr>
-          </a:lstStyle>
-          <a:p>
-            <a:pPr marL="342900" indent="-342900">
-              <a:buFont typeface="Arial" panose="020B0604020202020204" pitchFamily="34" charset="0"/>
-              <a:buChar char="•"/>
-            </a:pPr>
-            <a:r>
-              <a:rPr lang="pt-BR" sz="2000" dirty="0" err="1">
-                <a:solidFill>
-                  <a:srgbClr val="B02F75"/>
-                </a:solidFill>
-                <a:latin typeface="Dubai Medium" panose="020B0603030403030204" pitchFamily="34" charset="-78"/>
-                <a:cs typeface="Dubai Medium" panose="020B0603030403030204" pitchFamily="34" charset="-78"/>
-              </a:rPr>
-              <a:t>Planner</a:t>
-            </a:r>
-            <a:endParaRPr lang="pt-BR" sz="2000" dirty="0">
-              <a:solidFill>
-                <a:srgbClr val="B02F75"/>
-              </a:solidFill>
-              <a:latin typeface="Dubai Medium" panose="020B0603030403030204" pitchFamily="34" charset="-78"/>
-              <a:cs typeface="Dubai Medium" panose="020B0603030403030204" pitchFamily="34" charset="-78"/>
-            </a:endParaRPr>
-          </a:p>
-        </p:txBody>
-      </p:sp>
-      <p:pic>
-        <p:nvPicPr>
-          <p:cNvPr id="28" name="Imagem 27" descr="Uma imagem contendo relógio&#10;&#10;Descrição gerada automaticamente">
-            <a:extLst>
-              <a:ext uri="{FF2B5EF4-FFF2-40B4-BE49-F238E27FC236}">
-                <a16:creationId xmlns:a16="http://schemas.microsoft.com/office/drawing/2014/main" id="{E36447D3-C1F6-4088-8559-CD4D0DC20288}"/>
-              </a:ext>
-            </a:extLst>
-          </p:cNvPr>
-          <p:cNvPicPr>
-            <a:picLocks noChangeAspect="1"/>
-          </p:cNvPicPr>
-          <p:nvPr/>
-        </p:nvPicPr>
-        <p:blipFill rotWithShape="1">
-          <a:blip r:embed="rId7">
-            <a:extLst>
-              <a:ext uri="{28A0092B-C50C-407E-A947-70E740481C1C}">
-                <a14:useLocalDpi xmlns:a14="http://schemas.microsoft.com/office/drawing/2010/main" val="0"/>
-              </a:ext>
-            </a:extLst>
-          </a:blip>
-          <a:srcRect l="39889" t="28413" r="38869" b="25211"/>
-          <a:stretch/>
-        </p:blipFill>
-        <p:spPr>
-          <a:xfrm>
-            <a:off x="5823688" y="5368440"/>
-            <a:ext cx="993918" cy="1139272"/>
-          </a:xfrm>
-          <a:prstGeom prst="rect">
-            <a:avLst/>
-          </a:prstGeom>
-        </p:spPr>
-      </p:pic>
-      <p:sp>
-        <p:nvSpPr>
-          <p:cNvPr id="17" name="Título 1">
-            <a:extLst>
-              <a:ext uri="{FF2B5EF4-FFF2-40B4-BE49-F238E27FC236}">
-                <a16:creationId xmlns:a16="http://schemas.microsoft.com/office/drawing/2014/main" id="{DE9E4F40-71B9-4085-95FA-A0FEF0D7D45B}"/>
-              </a:ext>
-            </a:extLst>
-          </p:cNvPr>
-          <p:cNvSpPr txBox="1">
-            <a:spLocks/>
-          </p:cNvSpPr>
-          <p:nvPr/>
-        </p:nvSpPr>
-        <p:spPr>
-          <a:xfrm>
-            <a:off x="940041" y="4373707"/>
-            <a:ext cx="3711472" cy="622853"/>
-          </a:xfrm>
-          <a:prstGeom prst="rect">
-            <a:avLst/>
-          </a:prstGeom>
-        </p:spPr>
-        <p:txBody>
-          <a:bodyPr vert="horz" lIns="91440" tIns="45720" rIns="91440" bIns="45720" rtlCol="0" anchor="ctr">
-            <a:noAutofit/>
-          </a:bodyPr>
-          <a:lstStyle>
-            <a:lvl1pPr algn="l" defTabSz="914400" rtl="0" eaLnBrk="1" latinLnBrk="0" hangingPunct="1">
-              <a:lnSpc>
-                <a:spcPct val="90000"/>
-              </a:lnSpc>
-              <a:spcBef>
-                <a:spcPct val="0"/>
-              </a:spcBef>
-              <a:buNone/>
-              <a:defRPr sz="4400" kern="1200">
-                <a:solidFill>
-                  <a:schemeClr val="tx1"/>
-                </a:solidFill>
-                <a:latin typeface="+mj-lt"/>
-                <a:ea typeface="+mj-ea"/>
-                <a:cs typeface="+mj-cs"/>
-              </a:defRPr>
-            </a:lvl1pPr>
-          </a:lstStyle>
-          <a:p>
-            <a:pPr marL="342900" indent="-342900">
-              <a:buFont typeface="Arial" panose="020B0604020202020204" pitchFamily="34" charset="0"/>
-              <a:buChar char="•"/>
-            </a:pPr>
-            <a:r>
-              <a:rPr lang="pt-BR" sz="2000" dirty="0">
-                <a:solidFill>
-                  <a:srgbClr val="B02F75"/>
-                </a:solidFill>
-                <a:latin typeface="Dubai Medium" panose="020B0603030403030204" pitchFamily="34" charset="-78"/>
-                <a:cs typeface="Dubai Medium" panose="020B0603030403030204" pitchFamily="34" charset="-78"/>
-              </a:rPr>
-              <a:t>Padrão de projeto no Java</a:t>
-            </a:r>
-          </a:p>
-        </p:txBody>
-      </p:sp>
-    </p:spTree>
-    <p:extLst>
-      <p:ext uri="{BB962C8B-B14F-4D97-AF65-F5344CB8AC3E}">
-        <p14:creationId xmlns:p14="http://schemas.microsoft.com/office/powerpoint/2010/main" val="3470094145"/>
-      </p:ext>
-    </p:extLst>
-  </p:cSld>
-  <p:clrMapOvr>
-    <a:masterClrMapping/>
-  </p:clrMapOvr>
-</p:sld>
-</file>
-
 <file path=ppt/slides/slide7.xml><?xml version="1.0" encoding="utf-8"?>
 <p:sld xmlns:a="http://schemas.openxmlformats.org/drawingml/2006/main" xmlns:r="http://schemas.openxmlformats.org/officeDocument/2006/relationships" xmlns:p="http://schemas.openxmlformats.org/presentationml/2006/main">
   <p:cSld>
@@ -11116,13 +11274,13 @@
         </p:nvSpPr>
         <p:spPr>
           <a:xfrm>
-            <a:off x="454478" y="450851"/>
-            <a:ext cx="4682497" cy="758825"/>
+            <a:off x="646082" y="333768"/>
+            <a:ext cx="4747552" cy="758825"/>
           </a:xfrm>
         </p:spPr>
         <p:txBody>
           <a:bodyPr>
-            <a:noAutofit/>
+            <a:normAutofit/>
           </a:bodyPr>
           <a:lstStyle/>
           <a:p>
@@ -11134,46 +11292,11 @@
                 <a:latin typeface="Dubai Medium" panose="020B0603030403030204" pitchFamily="34" charset="-78"/>
                 <a:cs typeface="Dubai Medium" panose="020B0603030403030204" pitchFamily="34" charset="-78"/>
               </a:rPr>
-              <a:t>Orçamento do Projeto</a:t>
-            </a:r>
-          </a:p>
-        </p:txBody>
-      </p:sp>
-      <p:pic>
-        <p:nvPicPr>
-          <p:cNvPr id="6" name="Espaço Reservado para Conteúdo 5" descr="Uma imagem contendo desenho&#10;&#10;Descrição gerada automaticamente">
-            <a:extLst>
-              <a:ext uri="{FF2B5EF4-FFF2-40B4-BE49-F238E27FC236}">
-                <a16:creationId xmlns:a16="http://schemas.microsoft.com/office/drawing/2014/main" id="{2791291C-2F25-4C38-8180-07D1AFDDB93F}"/>
-              </a:ext>
-            </a:extLst>
-          </p:cNvPr>
-          <p:cNvPicPr>
-            <a:picLocks noGrp="1" noChangeAspect="1"/>
-          </p:cNvPicPr>
-          <p:nvPr>
-            <p:ph idx="1"/>
-          </p:nvPr>
-        </p:nvPicPr>
-        <p:blipFill>
-          <a:blip r:embed="rId2">
-            <a:extLst>
-              <a:ext uri="{28A0092B-C50C-407E-A947-70E740481C1C}">
-                <a14:useLocalDpi xmlns:a14="http://schemas.microsoft.com/office/drawing/2010/main" val="0"/>
-              </a:ext>
-            </a:extLst>
-          </a:blip>
-          <a:stretch>
-            <a:fillRect/>
-          </a:stretch>
-        </p:blipFill>
-        <p:spPr>
-          <a:xfrm>
-            <a:off x="10286734" y="-387713"/>
-            <a:ext cx="1905266" cy="1905266"/>
-          </a:xfrm>
-        </p:spPr>
-      </p:pic>
+              <a:t>Nosso site</a:t>
+            </a:r>
+          </a:p>
+        </p:txBody>
+      </p:sp>
       <p:cxnSp>
         <p:nvCxnSpPr>
           <p:cNvPr id="10" name="Conector reto 9">
@@ -11190,8 +11313,8 @@
         </p:nvCxnSpPr>
         <p:spPr>
           <a:xfrm flipH="1">
-            <a:off x="2" y="981076"/>
-            <a:ext cx="4859865" cy="0"/>
+            <a:off x="1" y="981076"/>
+            <a:ext cx="3619499" cy="0"/>
           </a:xfrm>
           <a:prstGeom prst="line">
             <a:avLst/>
@@ -11224,582 +11347,76 @@
           </a:fontRef>
         </p:style>
       </p:cxnSp>
-      <p:sp>
-        <p:nvSpPr>
-          <p:cNvPr id="9" name="Título 1">
-            <a:extLst>
-              <a:ext uri="{FF2B5EF4-FFF2-40B4-BE49-F238E27FC236}">
-                <a16:creationId xmlns:a16="http://schemas.microsoft.com/office/drawing/2014/main" id="{B3E1F8AF-9C2D-4A4A-B128-57FA6CB66969}"/>
-              </a:ext>
-            </a:extLst>
-          </p:cNvPr>
-          <p:cNvSpPr txBox="1">
-            <a:spLocks/>
-          </p:cNvSpPr>
+      <p:pic>
+        <p:nvPicPr>
+          <p:cNvPr id="7" name="Espaço Reservado para Conteúdo 5" descr="Uma imagem contendo desenho&#10;&#10;Descrição gerada automaticamente">
+            <a:extLst>
+              <a:ext uri="{FF2B5EF4-FFF2-40B4-BE49-F238E27FC236}">
+                <a16:creationId xmlns:a16="http://schemas.microsoft.com/office/drawing/2014/main" id="{0ACEF69C-A13B-4E42-B000-34DD5A462017}"/>
+              </a:ext>
+            </a:extLst>
+          </p:cNvPr>
+          <p:cNvPicPr>
+            <a:picLocks noChangeAspect="1"/>
+          </p:cNvPicPr>
           <p:nvPr/>
-        </p:nvSpPr>
-        <p:spPr>
-          <a:xfrm>
-            <a:off x="4596923" y="1567439"/>
-            <a:ext cx="929234" cy="758826"/>
+        </p:nvPicPr>
+        <p:blipFill>
+          <a:blip r:embed="rId2">
+            <a:extLst>
+              <a:ext uri="{28A0092B-C50C-407E-A947-70E740481C1C}">
+                <a14:useLocalDpi xmlns:a14="http://schemas.microsoft.com/office/drawing/2010/main" val="0"/>
+              </a:ext>
+            </a:extLst>
+          </a:blip>
+          <a:stretch>
+            <a:fillRect/>
+          </a:stretch>
+        </p:blipFill>
+        <p:spPr>
+          <a:xfrm>
+            <a:off x="10286734" y="-387713"/>
+            <a:ext cx="1905266" cy="1905266"/>
           </a:xfrm>
           <a:prstGeom prst="rect">
             <a:avLst/>
           </a:prstGeom>
         </p:spPr>
-        <p:txBody>
-          <a:bodyPr vert="horz" lIns="91440" tIns="45720" rIns="91440" bIns="45720" rtlCol="0" anchor="ctr">
-            <a:normAutofit fontScale="97500"/>
-          </a:bodyPr>
-          <a:lstStyle>
-            <a:lvl1pPr algn="l" defTabSz="914400" rtl="0" eaLnBrk="1" latinLnBrk="0" hangingPunct="1">
-              <a:lnSpc>
-                <a:spcPct val="90000"/>
-              </a:lnSpc>
-              <a:spcBef>
-                <a:spcPct val="0"/>
-              </a:spcBef>
-              <a:buNone/>
-              <a:defRPr sz="4400" kern="1200">
-                <a:solidFill>
-                  <a:schemeClr val="tx1"/>
-                </a:solidFill>
-                <a:latin typeface="+mj-lt"/>
-                <a:ea typeface="+mj-ea"/>
-                <a:cs typeface="+mj-cs"/>
-              </a:defRPr>
-            </a:lvl1pPr>
-          </a:lstStyle>
-          <a:p>
-            <a:r>
-              <a:rPr lang="pt-BR" sz="2800" dirty="0">
-                <a:solidFill>
-                  <a:srgbClr val="FFC000"/>
-                </a:solidFill>
-                <a:latin typeface="Dubai Medium" panose="020B0603030403030204" pitchFamily="34" charset="-78"/>
-                <a:cs typeface="Dubai Medium" panose="020B0603030403030204" pitchFamily="34" charset="-78"/>
-              </a:rPr>
-              <a:t>AWS</a:t>
-            </a:r>
-          </a:p>
-        </p:txBody>
-      </p:sp>
-      <p:sp>
-        <p:nvSpPr>
-          <p:cNvPr id="19" name="Título 1">
-            <a:extLst>
-              <a:ext uri="{FF2B5EF4-FFF2-40B4-BE49-F238E27FC236}">
-                <a16:creationId xmlns:a16="http://schemas.microsoft.com/office/drawing/2014/main" id="{E17DFFA1-7804-47BA-AADD-CF79917C97E2}"/>
-              </a:ext>
-            </a:extLst>
-          </p:cNvPr>
-          <p:cNvSpPr txBox="1">
-            <a:spLocks/>
-          </p:cNvSpPr>
+      </p:pic>
+      <p:pic>
+        <p:nvPicPr>
+          <p:cNvPr id="3" name="Imagem 2">
+            <a:extLst>
+              <a:ext uri="{FF2B5EF4-FFF2-40B4-BE49-F238E27FC236}">
+                <a16:creationId xmlns:a16="http://schemas.microsoft.com/office/drawing/2014/main" id="{A8B27CFD-14FE-4C48-9269-EDA1C068F410}"/>
+              </a:ext>
+            </a:extLst>
+          </p:cNvPr>
+          <p:cNvPicPr>
+            <a:picLocks noChangeAspect="1"/>
+          </p:cNvPicPr>
           <p:nvPr/>
-        </p:nvSpPr>
-        <p:spPr>
-          <a:xfrm>
-            <a:off x="505737" y="2262622"/>
-            <a:ext cx="2264949" cy="624936"/>
+        </p:nvPicPr>
+        <p:blipFill>
+          <a:blip r:embed="rId3"/>
+          <a:stretch>
+            <a:fillRect/>
+          </a:stretch>
+        </p:blipFill>
+        <p:spPr>
+          <a:xfrm>
+            <a:off x="952367" y="1409307"/>
+            <a:ext cx="10287000" cy="5114925"/>
           </a:xfrm>
           <a:prstGeom prst="rect">
             <a:avLst/>
           </a:prstGeom>
         </p:spPr>
-        <p:txBody>
-          <a:bodyPr vert="horz" lIns="91440" tIns="45720" rIns="91440" bIns="45720" rtlCol="0" anchor="ctr">
-            <a:normAutofit fontScale="97500"/>
-          </a:bodyPr>
-          <a:lstStyle>
-            <a:lvl1pPr algn="l" defTabSz="914400" rtl="0" eaLnBrk="1" latinLnBrk="0" hangingPunct="1">
-              <a:lnSpc>
-                <a:spcPct val="90000"/>
-              </a:lnSpc>
-              <a:spcBef>
-                <a:spcPct val="0"/>
-              </a:spcBef>
-              <a:buNone/>
-              <a:defRPr sz="4400" kern="1200">
-                <a:solidFill>
-                  <a:schemeClr val="tx1"/>
-                </a:solidFill>
-                <a:latin typeface="+mj-lt"/>
-                <a:ea typeface="+mj-ea"/>
-                <a:cs typeface="+mj-cs"/>
-              </a:defRPr>
-            </a:lvl1pPr>
-          </a:lstStyle>
-          <a:p>
-            <a:pPr marL="342900" indent="-342900">
-              <a:buFont typeface="Arial" panose="020B0604020202020204" pitchFamily="34" charset="0"/>
-              <a:buChar char="•"/>
-            </a:pPr>
-            <a:r>
-              <a:rPr lang="pt-BR" sz="2000" dirty="0">
-                <a:solidFill>
-                  <a:srgbClr val="4D3495"/>
-                </a:solidFill>
-                <a:latin typeface="Dubai Medium" panose="020B0603030403030204" pitchFamily="34" charset="-78"/>
-                <a:cs typeface="Dubai Medium" panose="020B0603030403030204" pitchFamily="34" charset="-78"/>
-              </a:rPr>
-              <a:t>Maquina Virtual</a:t>
-            </a:r>
-          </a:p>
-        </p:txBody>
-      </p:sp>
-      <p:sp>
-        <p:nvSpPr>
-          <p:cNvPr id="21" name="Título 1">
-            <a:extLst>
-              <a:ext uri="{FF2B5EF4-FFF2-40B4-BE49-F238E27FC236}">
-                <a16:creationId xmlns:a16="http://schemas.microsoft.com/office/drawing/2014/main" id="{7BDB8907-E996-491E-8C66-0FF68089ADAC}"/>
-              </a:ext>
-            </a:extLst>
-          </p:cNvPr>
-          <p:cNvSpPr txBox="1">
-            <a:spLocks/>
-          </p:cNvSpPr>
-          <p:nvPr/>
-        </p:nvSpPr>
-        <p:spPr>
-          <a:xfrm>
-            <a:off x="9638773" y="1567439"/>
-            <a:ext cx="1236826" cy="758826"/>
-          </a:xfrm>
-          <a:prstGeom prst="rect">
-            <a:avLst/>
-          </a:prstGeom>
-        </p:spPr>
-        <p:txBody>
-          <a:bodyPr vert="horz" lIns="91440" tIns="45720" rIns="91440" bIns="45720" rtlCol="0" anchor="ctr">
-            <a:normAutofit fontScale="97500"/>
-          </a:bodyPr>
-          <a:lstStyle>
-            <a:lvl1pPr algn="l" defTabSz="914400" rtl="0" eaLnBrk="1" latinLnBrk="0" hangingPunct="1">
-              <a:lnSpc>
-                <a:spcPct val="90000"/>
-              </a:lnSpc>
-              <a:spcBef>
-                <a:spcPct val="0"/>
-              </a:spcBef>
-              <a:buNone/>
-              <a:defRPr sz="4400" kern="1200">
-                <a:solidFill>
-                  <a:schemeClr val="tx1"/>
-                </a:solidFill>
-                <a:latin typeface="+mj-lt"/>
-                <a:ea typeface="+mj-ea"/>
-                <a:cs typeface="+mj-cs"/>
-              </a:defRPr>
-            </a:lvl1pPr>
-          </a:lstStyle>
-          <a:p>
-            <a:r>
-              <a:rPr lang="pt-BR" sz="2800" dirty="0">
-                <a:solidFill>
-                  <a:srgbClr val="0091C4"/>
-                </a:solidFill>
-                <a:latin typeface="Dubai Medium" panose="020B0603030403030204" pitchFamily="34" charset="-78"/>
-                <a:cs typeface="Dubai Medium" panose="020B0603030403030204" pitchFamily="34" charset="-78"/>
-              </a:rPr>
-              <a:t>AZURE</a:t>
-            </a:r>
-          </a:p>
-        </p:txBody>
-      </p:sp>
-      <p:sp>
-        <p:nvSpPr>
-          <p:cNvPr id="4" name="Retângulo 3">
-            <a:extLst>
-              <a:ext uri="{FF2B5EF4-FFF2-40B4-BE49-F238E27FC236}">
-                <a16:creationId xmlns:a16="http://schemas.microsoft.com/office/drawing/2014/main" id="{B9162A2E-49C7-4BCC-AA83-301EC4529547}"/>
-              </a:ext>
-            </a:extLst>
-          </p:cNvPr>
-          <p:cNvSpPr/>
-          <p:nvPr/>
-        </p:nvSpPr>
-        <p:spPr>
-          <a:xfrm>
-            <a:off x="505737" y="3429000"/>
-            <a:ext cx="2397470" cy="400110"/>
-          </a:xfrm>
-          <a:prstGeom prst="rect">
-            <a:avLst/>
-          </a:prstGeom>
-        </p:spPr>
-        <p:txBody>
-          <a:bodyPr wrap="square">
-            <a:spAutoFit/>
-          </a:bodyPr>
-          <a:lstStyle/>
-          <a:p>
-            <a:pPr marL="342900" indent="-342900">
-              <a:buFont typeface="Arial" panose="020B0604020202020204" pitchFamily="34" charset="0"/>
-              <a:buChar char="•"/>
-            </a:pPr>
-            <a:r>
-              <a:rPr lang="pt-BR" sz="2000" dirty="0">
-                <a:solidFill>
-                  <a:srgbClr val="4D3495"/>
-                </a:solidFill>
-                <a:latin typeface="Dubai Medium" panose="020B0603030403030204" pitchFamily="34" charset="-78"/>
-                <a:cs typeface="Dubai Medium" panose="020B0603030403030204" pitchFamily="34" charset="-78"/>
-              </a:rPr>
-              <a:t>Volume</a:t>
-            </a:r>
-          </a:p>
-        </p:txBody>
-      </p:sp>
-      <p:sp>
-        <p:nvSpPr>
-          <p:cNvPr id="5" name="Retângulo 4">
-            <a:extLst>
-              <a:ext uri="{FF2B5EF4-FFF2-40B4-BE49-F238E27FC236}">
-                <a16:creationId xmlns:a16="http://schemas.microsoft.com/office/drawing/2014/main" id="{3D0815CD-71A3-422E-8858-8743A189F833}"/>
-              </a:ext>
-            </a:extLst>
-          </p:cNvPr>
-          <p:cNvSpPr/>
-          <p:nvPr/>
-        </p:nvSpPr>
-        <p:spPr>
-          <a:xfrm>
-            <a:off x="8872190" y="2593149"/>
-            <a:ext cx="2769989" cy="369332"/>
-          </a:xfrm>
-          <a:prstGeom prst="rect">
-            <a:avLst/>
-          </a:prstGeom>
-        </p:spPr>
-        <p:txBody>
-          <a:bodyPr wrap="none">
-            <a:spAutoFit/>
-          </a:bodyPr>
-          <a:lstStyle/>
-          <a:p>
-            <a:r>
-              <a:rPr lang="pt-BR" dirty="0">
-                <a:solidFill>
-                  <a:srgbClr val="4D3495"/>
-                </a:solidFill>
-                <a:latin typeface="Dubai Medium" panose="020B0603030403030204" pitchFamily="34" charset="-78"/>
-                <a:cs typeface="Dubai Medium" panose="020B0603030403030204" pitchFamily="34" charset="-78"/>
-              </a:rPr>
-              <a:t>Compute </a:t>
-            </a:r>
-            <a:r>
-              <a:rPr lang="pt-BR" dirty="0" err="1">
-                <a:solidFill>
-                  <a:srgbClr val="4D3495"/>
-                </a:solidFill>
-                <a:latin typeface="Dubai Medium" panose="020B0603030403030204" pitchFamily="34" charset="-78"/>
-                <a:cs typeface="Dubai Medium" panose="020B0603030403030204" pitchFamily="34" charset="-78"/>
-              </a:rPr>
-              <a:t>Gen</a:t>
-            </a:r>
-            <a:r>
-              <a:rPr lang="pt-BR" dirty="0">
-                <a:solidFill>
-                  <a:srgbClr val="4D3495"/>
-                </a:solidFill>
-                <a:latin typeface="Dubai Medium" panose="020B0603030403030204" pitchFamily="34" charset="-78"/>
-                <a:cs typeface="Dubai Medium" panose="020B0603030403030204" pitchFamily="34" charset="-78"/>
-              </a:rPr>
-              <a:t> 5 (1 VCORE)</a:t>
-            </a:r>
-            <a:endParaRPr lang="pt-BR" dirty="0"/>
-          </a:p>
-        </p:txBody>
-      </p:sp>
-      <p:sp>
-        <p:nvSpPr>
-          <p:cNvPr id="8" name="Retângulo 7">
-            <a:extLst>
-              <a:ext uri="{FF2B5EF4-FFF2-40B4-BE49-F238E27FC236}">
-                <a16:creationId xmlns:a16="http://schemas.microsoft.com/office/drawing/2014/main" id="{E59CAE42-A25E-4968-A308-5CE812D0A3F3}"/>
-              </a:ext>
-            </a:extLst>
-          </p:cNvPr>
-          <p:cNvSpPr/>
-          <p:nvPr/>
-        </p:nvSpPr>
-        <p:spPr>
-          <a:xfrm>
-            <a:off x="9397525" y="2191485"/>
-            <a:ext cx="1719317" cy="369332"/>
-          </a:xfrm>
-          <a:prstGeom prst="rect">
-            <a:avLst/>
-          </a:prstGeom>
-        </p:spPr>
-        <p:txBody>
-          <a:bodyPr wrap="none">
-            <a:spAutoFit/>
-          </a:bodyPr>
-          <a:lstStyle/>
-          <a:p>
-            <a:r>
-              <a:rPr lang="pt-BR" dirty="0">
-                <a:solidFill>
-                  <a:srgbClr val="4D3495"/>
-                </a:solidFill>
-                <a:latin typeface="Dubai Medium" panose="020B0603030403030204" pitchFamily="34" charset="-78"/>
-                <a:cs typeface="Dubai Medium" panose="020B0603030403030204" pitchFamily="34" charset="-78"/>
-              </a:rPr>
-              <a:t>24,48 USD/mês</a:t>
-            </a:r>
-            <a:endParaRPr lang="pt-BR" dirty="0"/>
-          </a:p>
-        </p:txBody>
-      </p:sp>
-      <p:sp>
-        <p:nvSpPr>
-          <p:cNvPr id="11" name="Retângulo 10">
-            <a:extLst>
-              <a:ext uri="{FF2B5EF4-FFF2-40B4-BE49-F238E27FC236}">
-                <a16:creationId xmlns:a16="http://schemas.microsoft.com/office/drawing/2014/main" id="{724617D7-E480-4F10-9F09-7063FDC9C622}"/>
-              </a:ext>
-            </a:extLst>
-          </p:cNvPr>
-          <p:cNvSpPr/>
-          <p:nvPr/>
-        </p:nvSpPr>
-        <p:spPr>
-          <a:xfrm>
-            <a:off x="4277316" y="2223817"/>
-            <a:ext cx="1719317" cy="369332"/>
-          </a:xfrm>
-          <a:prstGeom prst="rect">
-            <a:avLst/>
-          </a:prstGeom>
-        </p:spPr>
-        <p:txBody>
-          <a:bodyPr wrap="none">
-            <a:spAutoFit/>
-          </a:bodyPr>
-          <a:lstStyle/>
-          <a:p>
-            <a:r>
-              <a:rPr lang="pt-BR" dirty="0">
-                <a:solidFill>
-                  <a:srgbClr val="4D3495"/>
-                </a:solidFill>
-                <a:latin typeface="Dubai Medium" panose="020B0603030403030204" pitchFamily="34" charset="-78"/>
-                <a:cs typeface="Dubai Medium" panose="020B0603030403030204" pitchFamily="34" charset="-78"/>
-              </a:rPr>
-              <a:t>8,352 USD/mês</a:t>
-            </a:r>
-            <a:endParaRPr lang="pt-BR" dirty="0"/>
-          </a:p>
-        </p:txBody>
-      </p:sp>
-      <p:sp>
-        <p:nvSpPr>
-          <p:cNvPr id="12" name="Retângulo 11">
-            <a:extLst>
-              <a:ext uri="{FF2B5EF4-FFF2-40B4-BE49-F238E27FC236}">
-                <a16:creationId xmlns:a16="http://schemas.microsoft.com/office/drawing/2014/main" id="{BB4BC6E9-6867-4E77-B839-8E5DFC02120D}"/>
-              </a:ext>
-            </a:extLst>
-          </p:cNvPr>
-          <p:cNvSpPr/>
-          <p:nvPr/>
-        </p:nvSpPr>
-        <p:spPr>
-          <a:xfrm>
-            <a:off x="4549925" y="2592589"/>
-            <a:ext cx="1023229" cy="369332"/>
-          </a:xfrm>
-          <a:prstGeom prst="rect">
-            <a:avLst/>
-          </a:prstGeom>
-        </p:spPr>
-        <p:txBody>
-          <a:bodyPr wrap="none">
-            <a:spAutoFit/>
-          </a:bodyPr>
-          <a:lstStyle/>
-          <a:p>
-            <a:r>
-              <a:rPr lang="pt-BR" dirty="0">
-                <a:solidFill>
-                  <a:srgbClr val="4D3495"/>
-                </a:solidFill>
-                <a:latin typeface="Dubai Medium" panose="020B0603030403030204" pitchFamily="34" charset="-78"/>
-                <a:cs typeface="Dubai Medium" panose="020B0603030403030204" pitchFamily="34" charset="-78"/>
-              </a:rPr>
-              <a:t>T2.micro</a:t>
-            </a:r>
-            <a:endParaRPr lang="pt-BR" dirty="0"/>
-          </a:p>
-        </p:txBody>
-      </p:sp>
-      <p:sp>
-        <p:nvSpPr>
-          <p:cNvPr id="27" name="Retângulo 26">
-            <a:extLst>
-              <a:ext uri="{FF2B5EF4-FFF2-40B4-BE49-F238E27FC236}">
-                <a16:creationId xmlns:a16="http://schemas.microsoft.com/office/drawing/2014/main" id="{9709D8A1-E82B-42F3-B724-C1A812834B21}"/>
-              </a:ext>
-            </a:extLst>
-          </p:cNvPr>
-          <p:cNvSpPr/>
-          <p:nvPr/>
-        </p:nvSpPr>
-        <p:spPr>
-          <a:xfrm>
-            <a:off x="9638773" y="3829110"/>
-            <a:ext cx="1170219" cy="400110"/>
-          </a:xfrm>
-          <a:prstGeom prst="rect">
-            <a:avLst/>
-          </a:prstGeom>
-        </p:spPr>
-        <p:txBody>
-          <a:bodyPr wrap="square">
-            <a:spAutoFit/>
-          </a:bodyPr>
-          <a:lstStyle/>
-          <a:p>
-            <a:r>
-              <a:rPr lang="pt-BR" sz="2000" dirty="0">
-                <a:solidFill>
-                  <a:srgbClr val="4D3495"/>
-                </a:solidFill>
-                <a:latin typeface="Dubai Medium" panose="020B0603030403030204" pitchFamily="34" charset="-78"/>
-                <a:cs typeface="Dubai Medium" panose="020B0603030403030204" pitchFamily="34" charset="-78"/>
-              </a:rPr>
-              <a:t>1000 GB</a:t>
-            </a:r>
-          </a:p>
-        </p:txBody>
-      </p:sp>
-      <p:sp>
-        <p:nvSpPr>
-          <p:cNvPr id="29" name="Retângulo 28">
-            <a:extLst>
-              <a:ext uri="{FF2B5EF4-FFF2-40B4-BE49-F238E27FC236}">
-                <a16:creationId xmlns:a16="http://schemas.microsoft.com/office/drawing/2014/main" id="{C5141A75-FF48-4A91-AD78-DC381DE67A3C}"/>
-              </a:ext>
-            </a:extLst>
-          </p:cNvPr>
-          <p:cNvSpPr/>
-          <p:nvPr/>
-        </p:nvSpPr>
-        <p:spPr>
-          <a:xfrm>
-            <a:off x="9288793" y="3445523"/>
-            <a:ext cx="2397470" cy="400110"/>
-          </a:xfrm>
-          <a:prstGeom prst="rect">
-            <a:avLst/>
-          </a:prstGeom>
-        </p:spPr>
-        <p:txBody>
-          <a:bodyPr wrap="square">
-            <a:spAutoFit/>
-          </a:bodyPr>
-          <a:lstStyle/>
-          <a:p>
-            <a:r>
-              <a:rPr lang="pt-BR" sz="2000" dirty="0">
-                <a:solidFill>
-                  <a:srgbClr val="4D3495"/>
-                </a:solidFill>
-                <a:latin typeface="Dubai Medium" panose="020B0603030403030204" pitchFamily="34" charset="-78"/>
-                <a:cs typeface="Dubai Medium" panose="020B0603030403030204" pitchFamily="34" charset="-78"/>
-              </a:rPr>
-              <a:t>100 USD/mês</a:t>
-            </a:r>
-          </a:p>
-        </p:txBody>
-      </p:sp>
-      <p:sp>
-        <p:nvSpPr>
-          <p:cNvPr id="30" name="Retângulo 29">
-            <a:extLst>
-              <a:ext uri="{FF2B5EF4-FFF2-40B4-BE49-F238E27FC236}">
-                <a16:creationId xmlns:a16="http://schemas.microsoft.com/office/drawing/2014/main" id="{1AC2BADF-4D98-4C57-8BD4-817204128E02}"/>
-              </a:ext>
-            </a:extLst>
-          </p:cNvPr>
-          <p:cNvSpPr/>
-          <p:nvPr/>
-        </p:nvSpPr>
-        <p:spPr>
-          <a:xfrm>
-            <a:off x="4277316" y="3407235"/>
-            <a:ext cx="2397470" cy="400110"/>
-          </a:xfrm>
-          <a:prstGeom prst="rect">
-            <a:avLst/>
-          </a:prstGeom>
-        </p:spPr>
-        <p:txBody>
-          <a:bodyPr wrap="square">
-            <a:spAutoFit/>
-          </a:bodyPr>
-          <a:lstStyle/>
-          <a:p>
-            <a:r>
-              <a:rPr lang="pt-BR" sz="2000" dirty="0">
-                <a:solidFill>
-                  <a:srgbClr val="4D3495"/>
-                </a:solidFill>
-                <a:latin typeface="Dubai Medium" panose="020B0603030403030204" pitchFamily="34" charset="-78"/>
-                <a:cs typeface="Dubai Medium" panose="020B0603030403030204" pitchFamily="34" charset="-78"/>
-              </a:rPr>
-              <a:t>2075 USD/mês</a:t>
-            </a:r>
-          </a:p>
-        </p:txBody>
-      </p:sp>
-      <p:sp>
-        <p:nvSpPr>
-          <p:cNvPr id="31" name="Retângulo 30">
-            <a:extLst>
-              <a:ext uri="{FF2B5EF4-FFF2-40B4-BE49-F238E27FC236}">
-                <a16:creationId xmlns:a16="http://schemas.microsoft.com/office/drawing/2014/main" id="{69B0868B-5A57-4096-A28A-E6A4A41EABD4}"/>
-              </a:ext>
-            </a:extLst>
-          </p:cNvPr>
-          <p:cNvSpPr/>
-          <p:nvPr/>
-        </p:nvSpPr>
-        <p:spPr>
-          <a:xfrm>
-            <a:off x="3938239" y="3776007"/>
-            <a:ext cx="2397470" cy="400110"/>
-          </a:xfrm>
-          <a:prstGeom prst="rect">
-            <a:avLst/>
-          </a:prstGeom>
-        </p:spPr>
-        <p:txBody>
-          <a:bodyPr wrap="square">
-            <a:spAutoFit/>
-          </a:bodyPr>
-          <a:lstStyle/>
-          <a:p>
-            <a:r>
-              <a:rPr lang="pt-BR" sz="2000" dirty="0">
-                <a:solidFill>
-                  <a:srgbClr val="4D3495"/>
-                </a:solidFill>
-                <a:latin typeface="Dubai Medium" panose="020B0603030403030204" pitchFamily="34" charset="-78"/>
-                <a:cs typeface="Dubai Medium" panose="020B0603030403030204" pitchFamily="34" charset="-78"/>
-              </a:rPr>
-              <a:t>1000 GB  3000 IOPS </a:t>
-            </a:r>
-          </a:p>
-        </p:txBody>
-      </p:sp>
+      </p:pic>
     </p:spTree>
     <p:extLst>
       <p:ext uri="{BB962C8B-B14F-4D97-AF65-F5344CB8AC3E}">
-        <p14:creationId xmlns:p14="http://schemas.microsoft.com/office/powerpoint/2010/main" val="2595325839"/>
+        <p14:creationId xmlns:p14="http://schemas.microsoft.com/office/powerpoint/2010/main" val="3009486538"/>
       </p:ext>
     </p:extLst>
   </p:cSld>
@@ -11844,25 +11461,25 @@
         </p:nvSpPr>
         <p:spPr>
           <a:xfrm>
-            <a:off x="454478" y="450851"/>
-            <a:ext cx="4409069" cy="758825"/>
+            <a:off x="476602" y="444965"/>
+            <a:ext cx="6056720" cy="660399"/>
           </a:xfrm>
         </p:spPr>
         <p:txBody>
           <a:bodyPr>
-            <a:normAutofit/>
+            <a:noAutofit/>
           </a:bodyPr>
           <a:lstStyle/>
           <a:p>
             <a:r>
-              <a:rPr lang="pt-BR" sz="3200" dirty="0">
+              <a:rPr lang="pt-BR" sz="3600" dirty="0">
                 <a:solidFill>
                   <a:srgbClr val="4DB033"/>
                 </a:solidFill>
                 <a:latin typeface="Dubai Medium" panose="020B0603030403030204" pitchFamily="34" charset="-78"/>
                 <a:cs typeface="Dubai Medium" panose="020B0603030403030204" pitchFamily="34" charset="-78"/>
               </a:rPr>
-              <a:t>Diagrama de Classes</a:t>
+              <a:t>E como o sistema funciona?</a:t>
             </a:r>
           </a:p>
         </p:txBody>
@@ -11883,8 +11500,8 @@
         </p:nvCxnSpPr>
         <p:spPr>
           <a:xfrm flipH="1">
-            <a:off x="0" y="981076"/>
-            <a:ext cx="4067177" cy="0"/>
+            <a:off x="2" y="981076"/>
+            <a:ext cx="3156153" cy="0"/>
           </a:xfrm>
           <a:prstGeom prst="line">
             <a:avLst/>
@@ -11919,10 +11536,10 @@
       </p:cxnSp>
       <p:pic>
         <p:nvPicPr>
-          <p:cNvPr id="5" name="Espaço Reservado para Conteúdo 5" descr="Uma imagem contendo desenho&#10;&#10;Descrição gerada automaticamente">
-            <a:extLst>
-              <a:ext uri="{FF2B5EF4-FFF2-40B4-BE49-F238E27FC236}">
-                <a16:creationId xmlns:a16="http://schemas.microsoft.com/office/drawing/2014/main" id="{E3A68BA6-C565-404A-85FD-C016A2F4F627}"/>
+          <p:cNvPr id="6" name="Espaço Reservado para Conteúdo 5" descr="Uma imagem contendo desenho&#10;&#10;Descrição gerada automaticamente">
+            <a:extLst>
+              <a:ext uri="{FF2B5EF4-FFF2-40B4-BE49-F238E27FC236}">
+                <a16:creationId xmlns:a16="http://schemas.microsoft.com/office/drawing/2014/main" id="{47A08B82-963C-4891-9394-22966D814E73}"/>
               </a:ext>
             </a:extLst>
           </p:cNvPr>
@@ -11955,10 +11572,10 @@
       </p:pic>
       <p:pic>
         <p:nvPicPr>
-          <p:cNvPr id="6" name="Imagem 5" descr="Tela de computador com texto preto sobre fundo branco&#10;&#10;Descrição gerada automaticamente">
-            <a:extLst>
-              <a:ext uri="{FF2B5EF4-FFF2-40B4-BE49-F238E27FC236}">
-                <a16:creationId xmlns:a16="http://schemas.microsoft.com/office/drawing/2014/main" id="{56C49DCB-D846-4315-85FC-9BEFF5734437}"/>
+          <p:cNvPr id="20" name="Imagem 19" descr="Uma imagem contendo animal, invertebrado, luz, desenho&#10;&#10;Descrição gerada automaticamente">
+            <a:extLst>
+              <a:ext uri="{FF2B5EF4-FFF2-40B4-BE49-F238E27FC236}">
+                <a16:creationId xmlns:a16="http://schemas.microsoft.com/office/drawing/2014/main" id="{B8A26010-3201-4C94-A90B-94D89BEF6E37}"/>
               </a:ext>
             </a:extLst>
           </p:cNvPr>
@@ -11967,7 +11584,7 @@
           </p:cNvPicPr>
           <p:nvPr/>
         </p:nvPicPr>
-        <p:blipFill rotWithShape="1">
+        <p:blipFill>
           <a:blip r:embed="rId3">
             <a:extLst>
               <a:ext uri="{28A0092B-C50C-407E-A947-70E740481C1C}">
@@ -11975,13 +11592,14 @@
               </a:ext>
             </a:extLst>
           </a:blip>
-          <a:srcRect r="28913" b="9612"/>
-          <a:stretch/>
+          <a:stretch>
+            <a:fillRect/>
+          </a:stretch>
         </p:blipFill>
         <p:spPr>
           <a:xfrm>
-            <a:off x="1298713" y="1241767"/>
-            <a:ext cx="8666922" cy="5172187"/>
+            <a:off x="9723897" y="2546696"/>
+            <a:ext cx="3481514" cy="1442121"/>
           </a:xfrm>
           <a:prstGeom prst="rect">
             <a:avLst/>
@@ -11990,10 +11608,10 @@
       </p:pic>
       <p:pic>
         <p:nvPicPr>
-          <p:cNvPr id="7" name="Imagem 6" descr="Tela de computador com texto preto sobre fundo branco&#10;&#10;Descrição gerada automaticamente">
-            <a:extLst>
-              <a:ext uri="{FF2B5EF4-FFF2-40B4-BE49-F238E27FC236}">
-                <a16:creationId xmlns:a16="http://schemas.microsoft.com/office/drawing/2014/main" id="{B839AB15-4F7D-4DA4-8072-E55A5261477F}"/>
+          <p:cNvPr id="3" name="Imagem 2">
+            <a:extLst>
+              <a:ext uri="{FF2B5EF4-FFF2-40B4-BE49-F238E27FC236}">
+                <a16:creationId xmlns:a16="http://schemas.microsoft.com/office/drawing/2014/main" id="{28325296-8EEF-4C43-A05B-3803C166578B}"/>
               </a:ext>
             </a:extLst>
           </p:cNvPr>
@@ -12002,21 +11620,46 @@
           </p:cNvPicPr>
           <p:nvPr/>
         </p:nvPicPr>
-        <p:blipFill rotWithShape="1">
-          <a:blip r:embed="rId3">
-            <a:extLst>
-              <a:ext uri="{28A0092B-C50C-407E-A947-70E740481C1C}">
-                <a14:useLocalDpi xmlns:a14="http://schemas.microsoft.com/office/drawing/2010/main" val="0"/>
-              </a:ext>
-            </a:extLst>
-          </a:blip>
-          <a:srcRect r="28913" b="9612"/>
-          <a:stretch/>
+        <p:blipFill>
+          <a:blip r:embed="rId4"/>
+          <a:stretch>
+            <a:fillRect/>
+          </a:stretch>
         </p:blipFill>
         <p:spPr>
           <a:xfrm>
-            <a:off x="234635" y="-6615"/>
-            <a:ext cx="11502887" cy="6864615"/>
+            <a:off x="5223927" y="1752038"/>
+            <a:ext cx="5062807" cy="4660997"/>
+          </a:xfrm>
+          <a:prstGeom prst="rect">
+            <a:avLst/>
+          </a:prstGeom>
+        </p:spPr>
+      </p:pic>
+      <p:pic>
+        <p:nvPicPr>
+          <p:cNvPr id="5" name="Imagem 4">
+            <a:extLst>
+              <a:ext uri="{FF2B5EF4-FFF2-40B4-BE49-F238E27FC236}">
+                <a16:creationId xmlns:a16="http://schemas.microsoft.com/office/drawing/2014/main" id="{DA1C2D19-6C41-471B-92B5-C83E261F70E4}"/>
+              </a:ext>
+            </a:extLst>
+          </p:cNvPr>
+          <p:cNvPicPr>
+            <a:picLocks noChangeAspect="1"/>
+          </p:cNvPicPr>
+          <p:nvPr/>
+        </p:nvPicPr>
+        <p:blipFill>
+          <a:blip r:embed="rId5"/>
+          <a:stretch>
+            <a:fillRect/>
+          </a:stretch>
+        </p:blipFill>
+        <p:spPr>
+          <a:xfrm>
+            <a:off x="121464" y="2099941"/>
+            <a:ext cx="4666636" cy="3777753"/>
           </a:xfrm>
           <a:prstGeom prst="rect">
             <a:avLst/>
@@ -12026,88 +11669,13 @@
     </p:spTree>
     <p:extLst>
       <p:ext uri="{BB962C8B-B14F-4D97-AF65-F5344CB8AC3E}">
-        <p14:creationId xmlns:p14="http://schemas.microsoft.com/office/powerpoint/2010/main" val="2891506774"/>
+        <p14:creationId xmlns:p14="http://schemas.microsoft.com/office/powerpoint/2010/main" val="1105126272"/>
       </p:ext>
     </p:extLst>
   </p:cSld>
   <p:clrMapOvr>
     <a:masterClrMapping/>
   </p:clrMapOvr>
-  <p:timing>
-    <p:tnLst>
-      <p:par>
-        <p:cTn id="1" dur="indefinite" restart="never" nodeType="tmRoot">
-          <p:childTnLst>
-            <p:seq concurrent="1" nextAc="seek">
-              <p:cTn id="2" dur="indefinite" nodeType="mainSeq">
-                <p:childTnLst>
-                  <p:par>
-                    <p:cTn id="3" fill="hold">
-                      <p:stCondLst>
-                        <p:cond delay="indefinite"/>
-                      </p:stCondLst>
-                      <p:childTnLst>
-                        <p:par>
-                          <p:cTn id="4" fill="hold">
-                            <p:stCondLst>
-                              <p:cond delay="0"/>
-                            </p:stCondLst>
-                            <p:childTnLst>
-                              <p:par>
-                                <p:cTn id="5" presetID="1" presetClass="entr" presetSubtype="0" fill="hold" nodeType="clickEffect">
-                                  <p:stCondLst>
-                                    <p:cond delay="0"/>
-                                  </p:stCondLst>
-                                  <p:childTnLst>
-                                    <p:set>
-                                      <p:cBhvr>
-                                        <p:cTn id="6" dur="1" fill="hold">
-                                          <p:stCondLst>
-                                            <p:cond delay="0"/>
-                                          </p:stCondLst>
-                                        </p:cTn>
-                                        <p:tgtEl>
-                                          <p:spTgt spid="7"/>
-                                        </p:tgtEl>
-                                        <p:attrNameLst>
-                                          <p:attrName>style.visibility</p:attrName>
-                                        </p:attrNameLst>
-                                      </p:cBhvr>
-                                      <p:to>
-                                        <p:strVal val="visible"/>
-                                      </p:to>
-                                    </p:set>
-                                  </p:childTnLst>
-                                </p:cTn>
-                              </p:par>
-                            </p:childTnLst>
-                          </p:cTn>
-                        </p:par>
-                      </p:childTnLst>
-                    </p:cTn>
-                  </p:par>
-                </p:childTnLst>
-              </p:cTn>
-              <p:prevCondLst>
-                <p:cond evt="onPrev" delay="0">
-                  <p:tgtEl>
-                    <p:sldTgt/>
-                  </p:tgtEl>
-                </p:cond>
-              </p:prevCondLst>
-              <p:nextCondLst>
-                <p:cond evt="onNext" delay="0">
-                  <p:tgtEl>
-                    <p:sldTgt/>
-                  </p:tgtEl>
-                </p:cond>
-              </p:nextCondLst>
-            </p:seq>
-          </p:childTnLst>
-        </p:cTn>
-      </p:par>
-    </p:tnLst>
-  </p:timing>
 </p:sld>
 </file>
 
@@ -12146,8 +11714,8 @@
         </p:nvSpPr>
         <p:spPr>
           <a:xfrm>
-            <a:off x="454478" y="450851"/>
-            <a:ext cx="4409069" cy="758825"/>
+            <a:off x="473529" y="462039"/>
+            <a:ext cx="3393621" cy="679383"/>
           </a:xfrm>
         </p:spPr>
         <p:txBody>
@@ -12157,15 +11725,22 @@
           <a:lstStyle/>
           <a:p>
             <a:r>
-              <a:rPr lang="pt-BR" sz="3200" dirty="0">
+              <a:rPr lang="pt-BR" sz="3600" dirty="0">
                 <a:solidFill>
                   <a:srgbClr val="4DB033"/>
                 </a:solidFill>
                 <a:latin typeface="Dubai Medium" panose="020B0603030403030204" pitchFamily="34" charset="-78"/>
                 <a:cs typeface="Dubai Medium" panose="020B0603030403030204" pitchFamily="34" charset="-78"/>
               </a:rPr>
-              <a:t>Diagrama de Arquitetura</a:t>
-            </a:r>
+              <a:t>Inovação - RPA</a:t>
+            </a:r>
+            <a:endParaRPr lang="pt-BR" sz="3200" dirty="0">
+              <a:solidFill>
+                <a:srgbClr val="4DB033"/>
+              </a:solidFill>
+              <a:latin typeface="Dubai Medium" panose="020B0603030403030204" pitchFamily="34" charset="-78"/>
+              <a:cs typeface="Dubai Medium" panose="020B0603030403030204" pitchFamily="34" charset="-78"/>
+            </a:endParaRPr>
           </a:p>
         </p:txBody>
       </p:sp>
@@ -12185,8 +11760,8 @@
         </p:nvCxnSpPr>
         <p:spPr>
           <a:xfrm flipH="1">
-            <a:off x="0" y="981076"/>
-            <a:ext cx="4067177" cy="0"/>
+            <a:off x="1" y="981076"/>
+            <a:ext cx="2000249" cy="0"/>
           </a:xfrm>
           <a:prstGeom prst="line">
             <a:avLst/>
@@ -12221,10 +11796,10 @@
       </p:cxnSp>
       <p:pic>
         <p:nvPicPr>
-          <p:cNvPr id="5" name="Espaço Reservado para Conteúdo 5" descr="Uma imagem contendo desenho&#10;&#10;Descrição gerada automaticamente">
-            <a:extLst>
-              <a:ext uri="{FF2B5EF4-FFF2-40B4-BE49-F238E27FC236}">
-                <a16:creationId xmlns:a16="http://schemas.microsoft.com/office/drawing/2014/main" id="{E3A68BA6-C565-404A-85FD-C016A2F4F627}"/>
+          <p:cNvPr id="6" name="Espaço Reservado para Conteúdo 5" descr="Uma imagem contendo desenho&#10;&#10;Descrição gerada automaticamente">
+            <a:extLst>
+              <a:ext uri="{FF2B5EF4-FFF2-40B4-BE49-F238E27FC236}">
+                <a16:creationId xmlns:a16="http://schemas.microsoft.com/office/drawing/2014/main" id="{91101F4B-3D5E-4DA2-B01E-F889604FDF48}"/>
               </a:ext>
             </a:extLst>
           </p:cNvPr>
@@ -12255,17 +11830,139 @@
           </a:prstGeom>
         </p:spPr>
       </p:pic>
+      <p:sp>
+        <p:nvSpPr>
+          <p:cNvPr id="7" name="Título 1">
+            <a:extLst>
+              <a:ext uri="{FF2B5EF4-FFF2-40B4-BE49-F238E27FC236}">
+                <a16:creationId xmlns:a16="http://schemas.microsoft.com/office/drawing/2014/main" id="{5ABAEEBF-E8EA-48ED-A9D5-D5A1A7CBD0FD}"/>
+              </a:ext>
+            </a:extLst>
+          </p:cNvPr>
+          <p:cNvSpPr txBox="1">
+            <a:spLocks/>
+          </p:cNvSpPr>
+          <p:nvPr/>
+        </p:nvSpPr>
+        <p:spPr>
+          <a:xfrm>
+            <a:off x="344875" y="1533424"/>
+            <a:ext cx="8838882" cy="3522455"/>
+          </a:xfrm>
+          <a:prstGeom prst="rect">
+            <a:avLst/>
+          </a:prstGeom>
+        </p:spPr>
+        <p:txBody>
+          <a:bodyPr vert="horz" lIns="91440" tIns="45720" rIns="91440" bIns="45720" rtlCol="0" anchor="ctr">
+            <a:normAutofit fontScale="97500"/>
+          </a:bodyPr>
+          <a:lstStyle>
+            <a:lvl1pPr algn="l" defTabSz="914400" rtl="0" eaLnBrk="1" latinLnBrk="0" hangingPunct="1">
+              <a:lnSpc>
+                <a:spcPct val="90000"/>
+              </a:lnSpc>
+              <a:spcBef>
+                <a:spcPct val="0"/>
+              </a:spcBef>
+              <a:buNone/>
+              <a:defRPr sz="4400" kern="1200">
+                <a:solidFill>
+                  <a:schemeClr val="tx1"/>
+                </a:solidFill>
+                <a:latin typeface="+mj-lt"/>
+                <a:ea typeface="+mj-ea"/>
+                <a:cs typeface="+mj-cs"/>
+              </a:defRPr>
+            </a:lvl1pPr>
+          </a:lstStyle>
+          <a:p>
+            <a:pPr marL="342900" indent="-342900">
+              <a:buFont typeface="Arial" panose="020B0604020202020204" pitchFamily="34" charset="0"/>
+              <a:buChar char="•"/>
+            </a:pPr>
+            <a:r>
+              <a:rPr lang="pt-BR" sz="2800" dirty="0">
+                <a:solidFill>
+                  <a:srgbClr val="4D3495"/>
+                </a:solidFill>
+                <a:latin typeface="Dubai Medium" panose="020B0603030403030204" pitchFamily="34" charset="-78"/>
+                <a:cs typeface="Dubai Medium" panose="020B0603030403030204" pitchFamily="34" charset="-78"/>
+              </a:rPr>
+              <a:t>O que é um “RPA”?</a:t>
+            </a:r>
+          </a:p>
+          <a:p>
+            <a:pPr marL="342900" indent="-342900">
+              <a:buFont typeface="Arial" panose="020B0604020202020204" pitchFamily="34" charset="0"/>
+              <a:buChar char="•"/>
+            </a:pPr>
+            <a:endParaRPr lang="pt-BR" sz="2800" dirty="0">
+              <a:solidFill>
+                <a:srgbClr val="4D3495"/>
+              </a:solidFill>
+              <a:latin typeface="Dubai Medium" panose="020B0603030403030204" pitchFamily="34" charset="-78"/>
+              <a:cs typeface="Dubai Medium" panose="020B0603030403030204" pitchFamily="34" charset="-78"/>
+            </a:endParaRPr>
+          </a:p>
+          <a:p>
+            <a:pPr marL="342900" indent="-342900">
+              <a:buFont typeface="Arial" panose="020B0604020202020204" pitchFamily="34" charset="0"/>
+              <a:buChar char="•"/>
+            </a:pPr>
+            <a:r>
+              <a:rPr lang="pt-BR" sz="2800" dirty="0">
+                <a:solidFill>
+                  <a:srgbClr val="4D3495"/>
+                </a:solidFill>
+                <a:latin typeface="Dubai Medium" panose="020B0603030403030204" pitchFamily="34" charset="-78"/>
+                <a:cs typeface="Dubai Medium" panose="020B0603030403030204" pitchFamily="34" charset="-78"/>
+              </a:rPr>
+              <a:t>A importância do RPA no mercado</a:t>
+            </a:r>
+          </a:p>
+          <a:p>
+            <a:pPr marL="342900" indent="-342900">
+              <a:buFont typeface="Arial" panose="020B0604020202020204" pitchFamily="34" charset="0"/>
+              <a:buChar char="•"/>
+            </a:pPr>
+            <a:endParaRPr lang="pt-BR" sz="2800" dirty="0">
+              <a:solidFill>
+                <a:srgbClr val="4D3495"/>
+              </a:solidFill>
+              <a:latin typeface="Dubai Medium" panose="020B0603030403030204" pitchFamily="34" charset="-78"/>
+              <a:cs typeface="Dubai Medium" panose="020B0603030403030204" pitchFamily="34" charset="-78"/>
+            </a:endParaRPr>
+          </a:p>
+          <a:p>
+            <a:pPr marL="342900" indent="-342900">
+              <a:buFont typeface="Arial" panose="020B0604020202020204" pitchFamily="34" charset="0"/>
+              <a:buChar char="•"/>
+            </a:pPr>
+            <a:r>
+              <a:rPr lang="pt-BR" sz="2800" dirty="0">
+                <a:solidFill>
+                  <a:srgbClr val="4D3495"/>
+                </a:solidFill>
+                <a:latin typeface="Dubai Medium" panose="020B0603030403030204" pitchFamily="34" charset="-78"/>
+                <a:cs typeface="Dubai Medium" panose="020B0603030403030204" pitchFamily="34" charset="-78"/>
+              </a:rPr>
+              <a:t>Como o RPA fez a diferença em nossa empresa</a:t>
+            </a:r>
+          </a:p>
+        </p:txBody>
+      </p:sp>
       <p:pic>
         <p:nvPicPr>
-          <p:cNvPr id="4" name="Imagem 3" descr="Tela de vídeo game&#10;&#10;Descrição gerada automaticamente">
-            <a:extLst>
-              <a:ext uri="{FF2B5EF4-FFF2-40B4-BE49-F238E27FC236}">
-                <a16:creationId xmlns:a16="http://schemas.microsoft.com/office/drawing/2014/main" id="{A6CDCDD0-2BF1-4931-8031-8A7C09C7DE42}"/>
+          <p:cNvPr id="1026" name="Picture 2" descr="PRTi Digital: Parceiro Autorizado da UiPath no Brasil - PRTi Digital">
+            <a:extLst>
+              <a:ext uri="{FF2B5EF4-FFF2-40B4-BE49-F238E27FC236}">
+                <a16:creationId xmlns:a16="http://schemas.microsoft.com/office/drawing/2014/main" id="{41114AAA-660E-404C-B12E-B78F415A3FF9}"/>
               </a:ext>
             </a:extLst>
           </p:cNvPr>
           <p:cNvPicPr>
-            <a:picLocks noChangeAspect="1"/>
+            <a:picLocks noChangeAspect="1" noChangeArrowheads="1"/>
           </p:cNvPicPr>
           <p:nvPr/>
         </p:nvPicPr>
@@ -12277,24 +11974,35 @@
               </a:ext>
             </a:extLst>
           </a:blip>
+          <a:srcRect/>
           <a:stretch>
             <a:fillRect/>
           </a:stretch>
         </p:blipFill>
-        <p:spPr>
-          <a:xfrm>
-            <a:off x="2033588" y="1209676"/>
-            <a:ext cx="7775122" cy="5553658"/>
+        <p:spPr bwMode="auto">
+          <a:xfrm>
+            <a:off x="8082766" y="2036588"/>
+            <a:ext cx="3764359" cy="1362698"/>
           </a:xfrm>
           <a:prstGeom prst="rect">
             <a:avLst/>
           </a:prstGeom>
+          <a:noFill/>
+          <a:extLst>
+            <a:ext uri="{909E8E84-426E-40DD-AFC4-6F175D3DCCD1}">
+              <a14:hiddenFill xmlns:a14="http://schemas.microsoft.com/office/drawing/2010/main">
+                <a:solidFill>
+                  <a:srgbClr val="FFFFFF"/>
+                </a:solidFill>
+              </a14:hiddenFill>
+            </a:ext>
+          </a:extLst>
         </p:spPr>
       </p:pic>
     </p:spTree>
     <p:extLst>
       <p:ext uri="{BB962C8B-B14F-4D97-AF65-F5344CB8AC3E}">
-        <p14:creationId xmlns:p14="http://schemas.microsoft.com/office/powerpoint/2010/main" val="3229527684"/>
+        <p14:creationId xmlns:p14="http://schemas.microsoft.com/office/powerpoint/2010/main" val="3480676095"/>
       </p:ext>
     </p:extLst>
   </p:cSld>

</xml_diff>